<commit_message>
Combining the two motivating example subfigures into one
</commit_message>
<xml_diff>
--- a/figures/Figures.pptx
+++ b/figures/Figures.pptx
@@ -7,6 +7,7 @@
   <p:sldIdLst>
     <p:sldId id="257" r:id="rId2"/>
     <p:sldId id="258" r:id="rId3"/>
+    <p:sldId id="259" r:id="rId4"/>
   </p:sldIdLst>
   <p:sldSz cx="9144000" cy="6858000" type="letter"/>
   <p:notesSz cx="9601200" cy="7315200"/>
@@ -4331,8 +4332,8 @@
         </p:nvSpPr>
         <p:spPr>
           <a:xfrm>
-            <a:off x="913330" y="1526775"/>
-            <a:ext cx="3786238" cy="3970318"/>
+            <a:off x="913330" y="799056"/>
+            <a:ext cx="3786238" cy="5078314"/>
           </a:xfrm>
           <a:prstGeom prst="rect">
             <a:avLst/>
@@ -4372,22 +4373,45 @@
               </a:tabLst>
             </a:pPr>
             <a:r>
-              <a:rPr lang="en-US" sz="1800" dirty="0">
-                <a:solidFill>
-                  <a:srgbClr val="000000"/>
-                </a:solidFill>
-                <a:latin typeface="Courier"/>
-                <a:cs typeface="Courier"/>
-              </a:rPr>
-              <a:t>List&lt;Integer&gt; list = </a:t>
-            </a:r>
-            <a:endParaRPr lang="en-US" sz="1800" dirty="0" smtClean="0">
-              <a:solidFill>
-                <a:srgbClr val="000000"/>
-              </a:solidFill>
-              <a:latin typeface="Courier"/>
-              <a:cs typeface="Courier"/>
-            </a:endParaRPr>
+              <a:rPr lang="en-US" sz="1800" b="1" dirty="0">
+                <a:solidFill>
+                  <a:srgbClr val="008000"/>
+                </a:solidFill>
+                <a:latin typeface="Courier"/>
+                <a:cs typeface="Courier"/>
+              </a:rPr>
+              <a:t>/</a:t>
+            </a:r>
+            <a:r>
+              <a:rPr lang="en-US" sz="1800" b="1" dirty="0" smtClean="0">
+                <a:solidFill>
+                  <a:srgbClr val="008000"/>
+                </a:solidFill>
+                <a:latin typeface="Courier"/>
+                <a:cs typeface="Courier"/>
+              </a:rPr>
+              <a:t>/ </a:t>
+            </a:r>
+            <a:r>
+              <a:rPr lang="en-US" sz="1800" b="1" dirty="0" err="1" smtClean="0">
+                <a:solidFill>
+                  <a:srgbClr val="008000"/>
+                </a:solidFill>
+                <a:latin typeface="Courier"/>
+                <a:cs typeface="Courier"/>
+              </a:rPr>
+              <a:t>ArrayList</a:t>
+            </a:r>
+            <a:r>
+              <a:rPr lang="en-US" sz="1800" b="1" dirty="0" smtClean="0">
+                <a:solidFill>
+                  <a:srgbClr val="008000"/>
+                </a:solidFill>
+                <a:latin typeface="Courier"/>
+                <a:cs typeface="Courier"/>
+              </a:rPr>
+              <a:t> of symbolic</a:t>
+            </a:r>
           </a:p>
           <a:p>
             <a:pPr>
@@ -4417,182 +4441,14 @@
               </a:tabLst>
             </a:pPr>
             <a:r>
-              <a:rPr lang="en-US" sz="1800" b="1" dirty="0">
-                <a:solidFill>
-                  <a:srgbClr val="000000"/>
-                </a:solidFill>
-                <a:latin typeface="Courier"/>
-                <a:cs typeface="Courier"/>
-              </a:rPr>
-              <a:t> </a:t>
-            </a:r>
-            <a:r>
               <a:rPr lang="en-US" sz="1800" b="1" dirty="0" smtClean="0">
                 <a:solidFill>
-                  <a:srgbClr val="000000"/>
-                </a:solidFill>
-                <a:latin typeface="Courier"/>
-                <a:cs typeface="Courier"/>
-              </a:rPr>
-              <a:t> </a:t>
-            </a:r>
-            <a:r>
-              <a:rPr lang="en-US" sz="1800" b="1" dirty="0" smtClean="0">
-                <a:solidFill>
-                  <a:srgbClr val="000080"/>
-                </a:solidFill>
-                <a:latin typeface="Courier"/>
-                <a:cs typeface="Courier"/>
-              </a:rPr>
-              <a:t>new </a:t>
-            </a:r>
-            <a:r>
-              <a:rPr lang="en-US" sz="1800" dirty="0" err="1">
-                <a:solidFill>
-                  <a:srgbClr val="000000"/>
-                </a:solidFill>
-                <a:latin typeface="Courier"/>
-                <a:cs typeface="Courier"/>
-              </a:rPr>
-              <a:t>ArrayList</a:t>
-            </a:r>
-            <a:r>
-              <a:rPr lang="en-US" sz="1800" dirty="0">
-                <a:solidFill>
-                  <a:srgbClr val="000000"/>
-                </a:solidFill>
-                <a:latin typeface="Courier"/>
-                <a:cs typeface="Courier"/>
-              </a:rPr>
-              <a:t>&lt;&gt;(</a:t>
-            </a:r>
-            <a:r>
-              <a:rPr lang="en-US" sz="1800" dirty="0">
-                <a:solidFill>
-                  <a:srgbClr val="0000FF"/>
-                </a:solidFill>
-                <a:latin typeface="Courier"/>
-                <a:cs typeface="Courier"/>
-              </a:rPr>
-              <a:t>200</a:t>
-            </a:r>
-            <a:r>
-              <a:rPr lang="en-US" sz="1800" dirty="0">
-                <a:solidFill>
-                  <a:srgbClr val="000000"/>
-                </a:solidFill>
-                <a:latin typeface="Courier"/>
-                <a:cs typeface="Courier"/>
-              </a:rPr>
-              <a:t>);</a:t>
-            </a:r>
-            <a:br>
-              <a:rPr lang="en-US" sz="1800" dirty="0">
-                <a:solidFill>
-                  <a:srgbClr val="000000"/>
-                </a:solidFill>
-                <a:latin typeface="Courier"/>
-                <a:cs typeface="Courier"/>
-              </a:rPr>
-            </a:br>
-            <a:r>
-              <a:rPr lang="en-US" sz="1800" dirty="0">
-                <a:solidFill>
-                  <a:srgbClr val="000000"/>
-                </a:solidFill>
-                <a:latin typeface="Courier"/>
-                <a:cs typeface="Courier"/>
-              </a:rPr>
-              <a:t>...</a:t>
-            </a:r>
-            <a:br>
-              <a:rPr lang="en-US" sz="1800" dirty="0">
-                <a:solidFill>
-                  <a:srgbClr val="000000"/>
-                </a:solidFill>
-                <a:latin typeface="Courier"/>
-                <a:cs typeface="Courier"/>
-              </a:rPr>
-            </a:br>
-            <a:r>
-              <a:rPr lang="en-US" sz="1800" b="1" dirty="0">
-                <a:solidFill>
-                  <a:srgbClr val="000080"/>
-                </a:solidFill>
-                <a:latin typeface="Courier"/>
-                <a:cs typeface="Courier"/>
-              </a:rPr>
-              <a:t>for </a:t>
-            </a:r>
-            <a:r>
-              <a:rPr lang="en-US" sz="1800" dirty="0">
-                <a:solidFill>
-                  <a:srgbClr val="000000"/>
-                </a:solidFill>
-                <a:latin typeface="Courier"/>
-                <a:cs typeface="Courier"/>
-              </a:rPr>
-              <a:t>(</a:t>
-            </a:r>
-            <a:r>
-              <a:rPr lang="en-US" sz="1800" b="1" dirty="0" err="1">
-                <a:solidFill>
-                  <a:srgbClr val="000080"/>
-                </a:solidFill>
-                <a:latin typeface="Courier"/>
-                <a:cs typeface="Courier"/>
-              </a:rPr>
-              <a:t>int</a:t>
-            </a:r>
-            <a:r>
-              <a:rPr lang="en-US" sz="1800" b="1" dirty="0">
-                <a:solidFill>
-                  <a:srgbClr val="000080"/>
-                </a:solidFill>
-                <a:latin typeface="Courier"/>
-                <a:cs typeface="Courier"/>
-              </a:rPr>
-              <a:t> </a:t>
-            </a:r>
-            <a:r>
-              <a:rPr lang="en-US" sz="1800" dirty="0" err="1">
-                <a:solidFill>
-                  <a:srgbClr val="000000"/>
-                </a:solidFill>
-                <a:latin typeface="Courier"/>
-                <a:cs typeface="Courier"/>
-              </a:rPr>
-              <a:t>i</a:t>
-            </a:r>
-            <a:r>
-              <a:rPr lang="en-US" sz="1800" dirty="0">
-                <a:solidFill>
-                  <a:srgbClr val="000000"/>
-                </a:solidFill>
-                <a:latin typeface="Courier"/>
-                <a:cs typeface="Courier"/>
-              </a:rPr>
-              <a:t> = </a:t>
-            </a:r>
-            <a:r>
-              <a:rPr lang="en-US" sz="1800" dirty="0">
-                <a:solidFill>
-                  <a:srgbClr val="0000FF"/>
-                </a:solidFill>
-                <a:latin typeface="Courier"/>
-                <a:cs typeface="Courier"/>
-              </a:rPr>
-              <a:t>0</a:t>
-            </a:r>
-            <a:r>
-              <a:rPr lang="en-US" sz="1800" dirty="0">
-                <a:solidFill>
-                  <a:srgbClr val="000000"/>
-                </a:solidFill>
-                <a:latin typeface="Courier"/>
-                <a:cs typeface="Courier"/>
-              </a:rPr>
-              <a:t>; </a:t>
+                  <a:srgbClr val="008000"/>
+                </a:solidFill>
+                <a:latin typeface="Courier"/>
+                <a:cs typeface="Courier"/>
+              </a:rPr>
+              <a:t>// integers</a:t>
             </a:r>
             <a:endParaRPr lang="en-US" sz="1800" dirty="0" smtClean="0">
               <a:solidFill>
@@ -4630,16 +4486,6 @@
               </a:tabLst>
             </a:pPr>
             <a:r>
-              <a:rPr lang="en-US" sz="1800" dirty="0">
-                <a:solidFill>
-                  <a:srgbClr val="000000"/>
-                </a:solidFill>
-                <a:latin typeface="Courier"/>
-                <a:cs typeface="Courier"/>
-              </a:rPr>
-              <a:t> </a:t>
-            </a:r>
-            <a:r>
               <a:rPr lang="en-US" sz="1800" dirty="0" smtClean="0">
                 <a:solidFill>
                   <a:srgbClr val="000000"/>
@@ -4647,57 +4493,17 @@
                 <a:latin typeface="Courier"/>
                 <a:cs typeface="Courier"/>
               </a:rPr>
-              <a:t>    </a:t>
-            </a:r>
-            <a:r>
-              <a:rPr lang="en-US" sz="1800" dirty="0" err="1" smtClean="0">
-                <a:solidFill>
-                  <a:srgbClr val="000000"/>
-                </a:solidFill>
-                <a:latin typeface="Courier"/>
-                <a:cs typeface="Courier"/>
-              </a:rPr>
-              <a:t>i</a:t>
-            </a:r>
-            <a:r>
-              <a:rPr lang="en-US" sz="1800" dirty="0" smtClean="0">
-                <a:solidFill>
-                  <a:srgbClr val="000000"/>
-                </a:solidFill>
-                <a:latin typeface="Courier"/>
-                <a:cs typeface="Courier"/>
-              </a:rPr>
-              <a:t> </a:t>
-            </a:r>
-            <a:r>
-              <a:rPr lang="en-US" sz="1800" dirty="0">
-                <a:solidFill>
-                  <a:srgbClr val="000000"/>
-                </a:solidFill>
-                <a:latin typeface="Courier"/>
-                <a:cs typeface="Courier"/>
-              </a:rPr>
-              <a:t>&lt; </a:t>
-            </a:r>
-            <a:r>
-              <a:rPr lang="en-US" sz="1800" dirty="0" err="1">
-                <a:solidFill>
-                  <a:srgbClr val="000000"/>
-                </a:solidFill>
-                <a:latin typeface="Courier"/>
-                <a:cs typeface="Courier"/>
-              </a:rPr>
-              <a:t>list.size</a:t>
-            </a:r>
-            <a:r>
-              <a:rPr lang="en-US" sz="1800" dirty="0">
-                <a:solidFill>
-                  <a:srgbClr val="000000"/>
-                </a:solidFill>
-                <a:latin typeface="Courier"/>
-                <a:cs typeface="Courier"/>
-              </a:rPr>
-              <a:t>(); </a:t>
+              <a:t>List</a:t>
+            </a:r>
+            <a:r>
+              <a:rPr lang="en-US" sz="1800" dirty="0">
+                <a:solidFill>
+                  <a:srgbClr val="000000"/>
+                </a:solidFill>
+                <a:latin typeface="Courier"/>
+                <a:cs typeface="Courier"/>
+              </a:rPr>
+              <a:t>&lt;Integer&gt; list = </a:t>
             </a:r>
             <a:endParaRPr lang="en-US" sz="1800" dirty="0" smtClean="0">
               <a:solidFill>
@@ -4735,7 +4541,7 @@
               </a:tabLst>
             </a:pPr>
             <a:r>
-              <a:rPr lang="en-US" sz="1800" dirty="0">
+              <a:rPr lang="en-US" sz="1800" b="1" dirty="0">
                 <a:solidFill>
                   <a:srgbClr val="000000"/>
                 </a:solidFill>
@@ -4745,17 +4551,135 @@
               <a:t> </a:t>
             </a:r>
             <a:r>
-              <a:rPr lang="en-US" sz="1800" dirty="0" smtClean="0">
-                <a:solidFill>
-                  <a:srgbClr val="000000"/>
-                </a:solidFill>
-                <a:latin typeface="Courier"/>
-                <a:cs typeface="Courier"/>
-              </a:rPr>
-              <a:t>    </a:t>
-            </a:r>
-            <a:r>
-              <a:rPr lang="en-US" sz="1800" dirty="0" err="1" smtClean="0">
+              <a:rPr lang="en-US" sz="1800" b="1" dirty="0" smtClean="0">
+                <a:solidFill>
+                  <a:srgbClr val="000000"/>
+                </a:solidFill>
+                <a:latin typeface="Courier"/>
+                <a:cs typeface="Courier"/>
+              </a:rPr>
+              <a:t> </a:t>
+            </a:r>
+            <a:r>
+              <a:rPr lang="en-US" sz="1800" b="1" dirty="0" smtClean="0">
+                <a:solidFill>
+                  <a:srgbClr val="000080"/>
+                </a:solidFill>
+                <a:latin typeface="Courier"/>
+                <a:cs typeface="Courier"/>
+              </a:rPr>
+              <a:t>new </a:t>
+            </a:r>
+            <a:r>
+              <a:rPr lang="en-US" sz="1800" dirty="0" err="1">
+                <a:solidFill>
+                  <a:srgbClr val="000000"/>
+                </a:solidFill>
+                <a:latin typeface="Courier"/>
+                <a:cs typeface="Courier"/>
+              </a:rPr>
+              <a:t>ArrayList</a:t>
+            </a:r>
+            <a:r>
+              <a:rPr lang="en-US" sz="1800" dirty="0">
+                <a:solidFill>
+                  <a:srgbClr val="000000"/>
+                </a:solidFill>
+                <a:latin typeface="Courier"/>
+                <a:cs typeface="Courier"/>
+              </a:rPr>
+              <a:t>&lt;&gt;(</a:t>
+            </a:r>
+            <a:r>
+              <a:rPr lang="en-US" sz="1800" dirty="0">
+                <a:solidFill>
+                  <a:srgbClr val="0000FF"/>
+                </a:solidFill>
+                <a:latin typeface="Courier"/>
+                <a:cs typeface="Courier"/>
+              </a:rPr>
+              <a:t>200</a:t>
+            </a:r>
+            <a:r>
+              <a:rPr lang="en-US" sz="1800" dirty="0">
+                <a:solidFill>
+                  <a:srgbClr val="000000"/>
+                </a:solidFill>
+                <a:latin typeface="Courier"/>
+                <a:cs typeface="Courier"/>
+              </a:rPr>
+              <a:t>);</a:t>
+            </a:r>
+            <a:br>
+              <a:rPr lang="en-US" sz="1800" dirty="0">
+                <a:solidFill>
+                  <a:srgbClr val="000000"/>
+                </a:solidFill>
+                <a:latin typeface="Courier"/>
+                <a:cs typeface="Courier"/>
+              </a:rPr>
+            </a:br>
+            <a:r>
+              <a:rPr lang="en-US" sz="1800" dirty="0">
+                <a:solidFill>
+                  <a:srgbClr val="000000"/>
+                </a:solidFill>
+                <a:latin typeface="Courier"/>
+                <a:cs typeface="Courier"/>
+              </a:rPr>
+              <a:t>...</a:t>
+            </a:r>
+            <a:br>
+              <a:rPr lang="en-US" sz="1800" dirty="0">
+                <a:solidFill>
+                  <a:srgbClr val="000000"/>
+                </a:solidFill>
+                <a:latin typeface="Courier"/>
+                <a:cs typeface="Courier"/>
+              </a:rPr>
+            </a:br>
+            <a:r>
+              <a:rPr lang="en-US" sz="1800" b="1" dirty="0">
+                <a:solidFill>
+                  <a:srgbClr val="000080"/>
+                </a:solidFill>
+                <a:latin typeface="Courier"/>
+                <a:cs typeface="Courier"/>
+              </a:rPr>
+              <a:t>for </a:t>
+            </a:r>
+            <a:r>
+              <a:rPr lang="en-US" sz="1800" dirty="0">
+                <a:solidFill>
+                  <a:srgbClr val="000000"/>
+                </a:solidFill>
+                <a:latin typeface="Courier"/>
+                <a:cs typeface="Courier"/>
+              </a:rPr>
+              <a:t>(</a:t>
+            </a:r>
+            <a:r>
+              <a:rPr lang="en-US" sz="1800" b="1" dirty="0" err="1">
+                <a:solidFill>
+                  <a:srgbClr val="000080"/>
+                </a:solidFill>
+                <a:latin typeface="Courier"/>
+                <a:cs typeface="Courier"/>
+              </a:rPr>
+              <a:t>int</a:t>
+            </a:r>
+            <a:r>
+              <a:rPr lang="en-US" sz="1800" b="1" dirty="0">
+                <a:solidFill>
+                  <a:srgbClr val="000080"/>
+                </a:solidFill>
+                <a:latin typeface="Courier"/>
+                <a:cs typeface="Courier"/>
+              </a:rPr>
+              <a:t> </a:t>
+            </a:r>
+            <a:r>
+              <a:rPr lang="en-US" sz="1800" dirty="0" err="1">
                 <a:solidFill>
                   <a:srgbClr val="000000"/>
                 </a:solidFill>
@@ -4772,46 +4696,7 @@
                 <a:latin typeface="Courier"/>
                 <a:cs typeface="Courier"/>
               </a:rPr>
-              <a:t>++) {</a:t>
-            </a:r>
-            <a:br>
-              <a:rPr lang="en-US" sz="1800" dirty="0">
-                <a:solidFill>
-                  <a:srgbClr val="000000"/>
-                </a:solidFill>
-                <a:latin typeface="Courier"/>
-                <a:cs typeface="Courier"/>
-              </a:rPr>
-            </a:br>
-            <a:r>
-              <a:rPr lang="en-US" sz="1800" dirty="0">
-                <a:solidFill>
-                  <a:srgbClr val="000000"/>
-                </a:solidFill>
-                <a:latin typeface="Courier"/>
-                <a:cs typeface="Courier"/>
-              </a:rPr>
-              <a:t>    </a:t>
-            </a:r>
-            <a:r>
-              <a:rPr lang="en-US" sz="1800" b="1" dirty="0">
-                <a:solidFill>
-                  <a:srgbClr val="000080"/>
-                </a:solidFill>
-                <a:latin typeface="Courier"/>
-                <a:cs typeface="Courier"/>
-              </a:rPr>
-              <a:t>if </a:t>
-            </a:r>
-            <a:r>
-              <a:rPr lang="en-US" sz="1800" dirty="0">
-                <a:solidFill>
-                  <a:srgbClr val="000000"/>
-                </a:solidFill>
-                <a:latin typeface="Courier"/>
-                <a:cs typeface="Courier"/>
-              </a:rPr>
-              <a:t>(i%</a:t>
+              <a:t> = </a:t>
             </a:r>
             <a:r>
               <a:rPr lang="en-US" sz="1800" dirty="0">
@@ -4821,37 +4706,17 @@
                 <a:latin typeface="Courier"/>
                 <a:cs typeface="Courier"/>
               </a:rPr>
-              <a:t>2 </a:t>
-            </a:r>
-            <a:r>
-              <a:rPr lang="en-US" sz="1800" dirty="0">
-                <a:solidFill>
-                  <a:srgbClr val="000000"/>
-                </a:solidFill>
-                <a:latin typeface="Courier"/>
-                <a:cs typeface="Courier"/>
-              </a:rPr>
-              <a:t>== </a:t>
-            </a:r>
-            <a:r>
-              <a:rPr lang="en-US" sz="1800" dirty="0">
-                <a:solidFill>
-                  <a:srgbClr val="0000FF"/>
-                </a:solidFill>
-                <a:latin typeface="Courier"/>
-                <a:cs typeface="Courier"/>
-              </a:rPr>
-              <a:t>0 </a:t>
-            </a:r>
-            <a:r>
-              <a:rPr lang="en-US" sz="1800" dirty="0">
-                <a:solidFill>
-                  <a:srgbClr val="000000"/>
-                </a:solidFill>
-                <a:latin typeface="Courier"/>
-                <a:cs typeface="Courier"/>
-              </a:rPr>
-              <a:t>&amp;&amp; </a:t>
+              <a:t>0</a:t>
+            </a:r>
+            <a:r>
+              <a:rPr lang="en-US" sz="1800" dirty="0">
+                <a:solidFill>
+                  <a:srgbClr val="000000"/>
+                </a:solidFill>
+                <a:latin typeface="Courier"/>
+                <a:cs typeface="Courier"/>
+              </a:rPr>
+              <a:t>; </a:t>
             </a:r>
             <a:endParaRPr lang="en-US" sz="1800" dirty="0" smtClean="0">
               <a:solidFill>
@@ -4906,6 +4771,401 @@
                 <a:latin typeface="Courier"/>
                 <a:cs typeface="Courier"/>
               </a:rPr>
+              <a:t>    </a:t>
+            </a:r>
+            <a:r>
+              <a:rPr lang="en-US" sz="1800" dirty="0" err="1" smtClean="0">
+                <a:solidFill>
+                  <a:srgbClr val="000000"/>
+                </a:solidFill>
+                <a:latin typeface="Courier"/>
+                <a:cs typeface="Courier"/>
+              </a:rPr>
+              <a:t>i</a:t>
+            </a:r>
+            <a:r>
+              <a:rPr lang="en-US" sz="1800" dirty="0" smtClean="0">
+                <a:solidFill>
+                  <a:srgbClr val="000000"/>
+                </a:solidFill>
+                <a:latin typeface="Courier"/>
+                <a:cs typeface="Courier"/>
+              </a:rPr>
+              <a:t> </a:t>
+            </a:r>
+            <a:r>
+              <a:rPr lang="en-US" sz="1800" dirty="0">
+                <a:solidFill>
+                  <a:srgbClr val="000000"/>
+                </a:solidFill>
+                <a:latin typeface="Courier"/>
+                <a:cs typeface="Courier"/>
+              </a:rPr>
+              <a:t>&lt; </a:t>
+            </a:r>
+            <a:r>
+              <a:rPr lang="en-US" sz="1800" dirty="0" err="1">
+                <a:solidFill>
+                  <a:srgbClr val="000000"/>
+                </a:solidFill>
+                <a:latin typeface="Courier"/>
+                <a:cs typeface="Courier"/>
+              </a:rPr>
+              <a:t>list.size</a:t>
+            </a:r>
+            <a:r>
+              <a:rPr lang="en-US" sz="1800" dirty="0">
+                <a:solidFill>
+                  <a:srgbClr val="000000"/>
+                </a:solidFill>
+                <a:latin typeface="Courier"/>
+                <a:cs typeface="Courier"/>
+              </a:rPr>
+              <a:t>(); </a:t>
+            </a:r>
+            <a:endParaRPr lang="en-US" sz="1800" dirty="0" smtClean="0">
+              <a:solidFill>
+                <a:srgbClr val="000000"/>
+              </a:solidFill>
+              <a:latin typeface="Courier"/>
+              <a:cs typeface="Courier"/>
+            </a:endParaRPr>
+          </a:p>
+          <a:p>
+            <a:pPr>
+              <a:spcBef>
+                <a:spcPts val="0"/>
+              </a:spcBef>
+              <a:spcAft>
+                <a:spcPts val="0"/>
+              </a:spcAft>
+              <a:tabLst>
+                <a:tab pos="581660" algn="l"/>
+                <a:tab pos="1163320" algn="l"/>
+                <a:tab pos="1744980" algn="l"/>
+                <a:tab pos="2326640" algn="l"/>
+                <a:tab pos="2908300" algn="l"/>
+                <a:tab pos="3489960" algn="l"/>
+                <a:tab pos="4071620" algn="l"/>
+                <a:tab pos="4653280" algn="l"/>
+                <a:tab pos="5234940" algn="l"/>
+                <a:tab pos="5816600" algn="l"/>
+                <a:tab pos="6398260" algn="l"/>
+                <a:tab pos="6979920" algn="l"/>
+                <a:tab pos="7561580" algn="l"/>
+                <a:tab pos="8143240" algn="l"/>
+                <a:tab pos="8724900" algn="l"/>
+                <a:tab pos="9306560" algn="l"/>
+              </a:tabLst>
+            </a:pPr>
+            <a:r>
+              <a:rPr lang="en-US" sz="1800" dirty="0">
+                <a:solidFill>
+                  <a:srgbClr val="000000"/>
+                </a:solidFill>
+                <a:latin typeface="Courier"/>
+                <a:cs typeface="Courier"/>
+              </a:rPr>
+              <a:t> </a:t>
+            </a:r>
+            <a:r>
+              <a:rPr lang="en-US" sz="1800" dirty="0" smtClean="0">
+                <a:solidFill>
+                  <a:srgbClr val="000000"/>
+                </a:solidFill>
+                <a:latin typeface="Courier"/>
+                <a:cs typeface="Courier"/>
+              </a:rPr>
+              <a:t>    </a:t>
+            </a:r>
+            <a:r>
+              <a:rPr lang="en-US" sz="1800" dirty="0" err="1" smtClean="0">
+                <a:solidFill>
+                  <a:srgbClr val="000000"/>
+                </a:solidFill>
+                <a:latin typeface="Courier"/>
+                <a:cs typeface="Courier"/>
+              </a:rPr>
+              <a:t>i</a:t>
+            </a:r>
+            <a:r>
+              <a:rPr lang="en-US" sz="1800" dirty="0">
+                <a:solidFill>
+                  <a:srgbClr val="000000"/>
+                </a:solidFill>
+                <a:latin typeface="Courier"/>
+                <a:cs typeface="Courier"/>
+              </a:rPr>
+              <a:t>++) </a:t>
+            </a:r>
+            <a:r>
+              <a:rPr lang="en-US" sz="1800" dirty="0" smtClean="0">
+                <a:solidFill>
+                  <a:srgbClr val="000000"/>
+                </a:solidFill>
+                <a:latin typeface="Courier"/>
+                <a:cs typeface="Courier"/>
+              </a:rPr>
+              <a:t>{</a:t>
+            </a:r>
+          </a:p>
+          <a:p>
+            <a:pPr>
+              <a:spcBef>
+                <a:spcPts val="0"/>
+              </a:spcBef>
+              <a:spcAft>
+                <a:spcPts val="0"/>
+              </a:spcAft>
+              <a:tabLst>
+                <a:tab pos="581660" algn="l"/>
+                <a:tab pos="1163320" algn="l"/>
+                <a:tab pos="1744980" algn="l"/>
+                <a:tab pos="2326640" algn="l"/>
+                <a:tab pos="2908300" algn="l"/>
+                <a:tab pos="3489960" algn="l"/>
+                <a:tab pos="4071620" algn="l"/>
+                <a:tab pos="4653280" algn="l"/>
+                <a:tab pos="5234940" algn="l"/>
+                <a:tab pos="5816600" algn="l"/>
+                <a:tab pos="6398260" algn="l"/>
+                <a:tab pos="6979920" algn="l"/>
+                <a:tab pos="7561580" algn="l"/>
+                <a:tab pos="8143240" algn="l"/>
+                <a:tab pos="8724900" algn="l"/>
+                <a:tab pos="9306560" algn="l"/>
+              </a:tabLst>
+            </a:pPr>
+            <a:r>
+              <a:rPr lang="en-US" sz="1800" b="1" dirty="0" smtClean="0">
+                <a:solidFill>
+                  <a:srgbClr val="008000"/>
+                </a:solidFill>
+                <a:latin typeface="Courier"/>
+                <a:cs typeface="Courier"/>
+              </a:rPr>
+              <a:t>// </a:t>
+            </a:r>
+            <a:r>
+              <a:rPr lang="en-US" sz="1800" b="1" dirty="0" err="1" smtClean="0">
+                <a:solidFill>
+                  <a:srgbClr val="008000"/>
+                </a:solidFill>
+                <a:latin typeface="Courier"/>
+                <a:cs typeface="Courier"/>
+              </a:rPr>
+              <a:t>list.get</a:t>
+            </a:r>
+            <a:r>
+              <a:rPr lang="en-US" sz="1800" b="1" dirty="0" smtClean="0">
+                <a:solidFill>
+                  <a:srgbClr val="008000"/>
+                </a:solidFill>
+                <a:latin typeface="Courier"/>
+                <a:cs typeface="Courier"/>
+              </a:rPr>
+              <a:t>(</a:t>
+            </a:r>
+            <a:r>
+              <a:rPr lang="en-US" sz="1800" b="1" dirty="0" err="1" smtClean="0">
+                <a:solidFill>
+                  <a:srgbClr val="008000"/>
+                </a:solidFill>
+                <a:latin typeface="Courier"/>
+                <a:cs typeface="Courier"/>
+              </a:rPr>
+              <a:t>i</a:t>
+            </a:r>
+            <a:r>
+              <a:rPr lang="en-US" sz="1800" b="1" dirty="0" smtClean="0">
+                <a:solidFill>
+                  <a:srgbClr val="008000"/>
+                </a:solidFill>
+                <a:latin typeface="Courier"/>
+                <a:cs typeface="Courier"/>
+              </a:rPr>
+              <a:t>) returns</a:t>
+            </a:r>
+          </a:p>
+          <a:p>
+            <a:pPr>
+              <a:spcBef>
+                <a:spcPts val="0"/>
+              </a:spcBef>
+              <a:spcAft>
+                <a:spcPts val="0"/>
+              </a:spcAft>
+              <a:tabLst>
+                <a:tab pos="581660" algn="l"/>
+                <a:tab pos="1163320" algn="l"/>
+                <a:tab pos="1744980" algn="l"/>
+                <a:tab pos="2326640" algn="l"/>
+                <a:tab pos="2908300" algn="l"/>
+                <a:tab pos="3489960" algn="l"/>
+                <a:tab pos="4071620" algn="l"/>
+                <a:tab pos="4653280" algn="l"/>
+                <a:tab pos="5234940" algn="l"/>
+                <a:tab pos="5816600" algn="l"/>
+                <a:tab pos="6398260" algn="l"/>
+                <a:tab pos="6979920" algn="l"/>
+                <a:tab pos="7561580" algn="l"/>
+                <a:tab pos="8143240" algn="l"/>
+                <a:tab pos="8724900" algn="l"/>
+                <a:tab pos="9306560" algn="l"/>
+              </a:tabLst>
+            </a:pPr>
+            <a:r>
+              <a:rPr lang="en-US" sz="1800" b="1" dirty="0" smtClean="0">
+                <a:solidFill>
+                  <a:srgbClr val="008000"/>
+                </a:solidFill>
+                <a:latin typeface="Courier"/>
+                <a:cs typeface="Courier"/>
+              </a:rPr>
+              <a:t>// a symbolic integer </a:t>
+            </a:r>
+            <a:r>
+              <a:rPr lang="en-US" sz="1800" dirty="0">
+                <a:solidFill>
+                  <a:srgbClr val="000000"/>
+                </a:solidFill>
+                <a:latin typeface="Courier"/>
+                <a:cs typeface="Courier"/>
+              </a:rPr>
+              <a:t/>
+            </a:r>
+            <a:br>
+              <a:rPr lang="en-US" sz="1800" dirty="0">
+                <a:solidFill>
+                  <a:srgbClr val="000000"/>
+                </a:solidFill>
+                <a:latin typeface="Courier"/>
+                <a:cs typeface="Courier"/>
+              </a:rPr>
+            </a:br>
+            <a:r>
+              <a:rPr lang="en-US" sz="1800" dirty="0">
+                <a:solidFill>
+                  <a:srgbClr val="000000"/>
+                </a:solidFill>
+                <a:latin typeface="Courier"/>
+                <a:cs typeface="Courier"/>
+              </a:rPr>
+              <a:t>    </a:t>
+            </a:r>
+            <a:r>
+              <a:rPr lang="en-US" sz="1800" b="1" dirty="0">
+                <a:solidFill>
+                  <a:srgbClr val="000080"/>
+                </a:solidFill>
+                <a:latin typeface="Courier"/>
+                <a:cs typeface="Courier"/>
+              </a:rPr>
+              <a:t>if </a:t>
+            </a:r>
+            <a:r>
+              <a:rPr lang="en-US" sz="1800" dirty="0">
+                <a:solidFill>
+                  <a:srgbClr val="000000"/>
+                </a:solidFill>
+                <a:latin typeface="Courier"/>
+                <a:cs typeface="Courier"/>
+              </a:rPr>
+              <a:t>(i%</a:t>
+            </a:r>
+            <a:r>
+              <a:rPr lang="en-US" sz="1800" dirty="0">
+                <a:solidFill>
+                  <a:srgbClr val="0000FF"/>
+                </a:solidFill>
+                <a:latin typeface="Courier"/>
+                <a:cs typeface="Courier"/>
+              </a:rPr>
+              <a:t>2 </a:t>
+            </a:r>
+            <a:r>
+              <a:rPr lang="en-US" sz="1800" dirty="0">
+                <a:solidFill>
+                  <a:srgbClr val="000000"/>
+                </a:solidFill>
+                <a:latin typeface="Courier"/>
+                <a:cs typeface="Courier"/>
+              </a:rPr>
+              <a:t>== </a:t>
+            </a:r>
+            <a:r>
+              <a:rPr lang="en-US" sz="1800" dirty="0">
+                <a:solidFill>
+                  <a:srgbClr val="0000FF"/>
+                </a:solidFill>
+                <a:latin typeface="Courier"/>
+                <a:cs typeface="Courier"/>
+              </a:rPr>
+              <a:t>0 </a:t>
+            </a:r>
+            <a:r>
+              <a:rPr lang="en-US" sz="1800" dirty="0">
+                <a:solidFill>
+                  <a:srgbClr val="000000"/>
+                </a:solidFill>
+                <a:latin typeface="Courier"/>
+                <a:cs typeface="Courier"/>
+              </a:rPr>
+              <a:t>&amp;&amp; </a:t>
+            </a:r>
+            <a:endParaRPr lang="en-US" sz="1800" dirty="0" smtClean="0">
+              <a:solidFill>
+                <a:srgbClr val="000000"/>
+              </a:solidFill>
+              <a:latin typeface="Courier"/>
+              <a:cs typeface="Courier"/>
+            </a:endParaRPr>
+          </a:p>
+          <a:p>
+            <a:pPr>
+              <a:spcBef>
+                <a:spcPts val="0"/>
+              </a:spcBef>
+              <a:spcAft>
+                <a:spcPts val="0"/>
+              </a:spcAft>
+              <a:tabLst>
+                <a:tab pos="581660" algn="l"/>
+                <a:tab pos="1163320" algn="l"/>
+                <a:tab pos="1744980" algn="l"/>
+                <a:tab pos="2326640" algn="l"/>
+                <a:tab pos="2908300" algn="l"/>
+                <a:tab pos="3489960" algn="l"/>
+                <a:tab pos="4071620" algn="l"/>
+                <a:tab pos="4653280" algn="l"/>
+                <a:tab pos="5234940" algn="l"/>
+                <a:tab pos="5816600" algn="l"/>
+                <a:tab pos="6398260" algn="l"/>
+                <a:tab pos="6979920" algn="l"/>
+                <a:tab pos="7561580" algn="l"/>
+                <a:tab pos="8143240" algn="l"/>
+                <a:tab pos="8724900" algn="l"/>
+                <a:tab pos="9306560" algn="l"/>
+              </a:tabLst>
+            </a:pPr>
+            <a:r>
+              <a:rPr lang="en-US" sz="1800" dirty="0">
+                <a:solidFill>
+                  <a:srgbClr val="000000"/>
+                </a:solidFill>
+                <a:latin typeface="Courier"/>
+                <a:cs typeface="Courier"/>
+              </a:rPr>
+              <a:t> </a:t>
+            </a:r>
+            <a:r>
+              <a:rPr lang="en-US" sz="1800" dirty="0" smtClean="0">
+                <a:solidFill>
+                  <a:srgbClr val="000000"/>
+                </a:solidFill>
+                <a:latin typeface="Courier"/>
+                <a:cs typeface="Courier"/>
+              </a:rPr>
               <a:t>       </a:t>
             </a:r>
             <a:r>
@@ -4959,7 +5219,7 @@
               <a:t>42</a:t>
             </a:r>
             <a:r>
-              <a:rPr lang="en-US" sz="1800" dirty="0">
+              <a:rPr lang="en-US" sz="1800" dirty="0" smtClean="0">
                 <a:solidFill>
                   <a:srgbClr val="000000"/>
                 </a:solidFill>
@@ -4967,6 +5227,16 @@
                 <a:cs typeface="Courier"/>
               </a:rPr>
               <a:t>)</a:t>
+            </a:r>
+            <a:r>
+              <a:rPr lang="en-US" sz="1800" dirty="0">
+                <a:solidFill>
+                  <a:srgbClr val="000000"/>
+                </a:solidFill>
+                <a:latin typeface="Courier"/>
+                <a:cs typeface="Courier"/>
+              </a:rPr>
+              <a:t/>
             </a:r>
             <a:br>
               <a:rPr lang="en-US" sz="1800" dirty="0">
@@ -6289,10 +6559,2685 @@
           </a:p>
         </p:txBody>
       </p:sp>
+      <p:sp>
+        <p:nvSpPr>
+          <p:cNvPr id="46" name="TextBox 45"/>
+          <p:cNvSpPr txBox="1"/>
+          <p:nvPr/>
+        </p:nvSpPr>
+        <p:spPr>
+          <a:xfrm>
+            <a:off x="3781753" y="2568405"/>
+            <a:ext cx="487408" cy="369332"/>
+          </a:xfrm>
+          <a:prstGeom prst="rect">
+            <a:avLst/>
+          </a:prstGeom>
+          <a:noFill/>
+        </p:spPr>
+        <p:txBody>
+          <a:bodyPr wrap="none" rtlCol="0">
+            <a:spAutoFit/>
+          </a:bodyPr>
+          <a:lstStyle/>
+          <a:p>
+            <a:r>
+              <a:rPr lang="en-US" sz="1800" dirty="0" smtClean="0">
+                <a:solidFill>
+                  <a:srgbClr val="FF0000"/>
+                </a:solidFill>
+              </a:rPr>
+              <a:t>(1)</a:t>
+            </a:r>
+            <a:endParaRPr lang="en-US" sz="1800" dirty="0">
+              <a:solidFill>
+                <a:srgbClr val="FF0000"/>
+              </a:solidFill>
+            </a:endParaRPr>
+          </a:p>
+        </p:txBody>
+      </p:sp>
+      <p:sp>
+        <p:nvSpPr>
+          <p:cNvPr id="47" name="TextBox 46"/>
+          <p:cNvSpPr txBox="1"/>
+          <p:nvPr/>
+        </p:nvSpPr>
+        <p:spPr>
+          <a:xfrm>
+            <a:off x="4319470" y="2735074"/>
+            <a:ext cx="487408" cy="369332"/>
+          </a:xfrm>
+          <a:prstGeom prst="rect">
+            <a:avLst/>
+          </a:prstGeom>
+          <a:noFill/>
+        </p:spPr>
+        <p:txBody>
+          <a:bodyPr wrap="none" rtlCol="0">
+            <a:spAutoFit/>
+          </a:bodyPr>
+          <a:lstStyle/>
+          <a:p>
+            <a:r>
+              <a:rPr lang="en-US" sz="1800" dirty="0" smtClean="0">
+                <a:solidFill>
+                  <a:srgbClr val="FF0000"/>
+                </a:solidFill>
+              </a:rPr>
+              <a:t>(2)</a:t>
+            </a:r>
+            <a:endParaRPr lang="en-US" sz="1800" dirty="0">
+              <a:solidFill>
+                <a:srgbClr val="FF0000"/>
+              </a:solidFill>
+            </a:endParaRPr>
+          </a:p>
+        </p:txBody>
+      </p:sp>
+      <p:sp>
+        <p:nvSpPr>
+          <p:cNvPr id="48" name="TextBox 47"/>
+          <p:cNvSpPr txBox="1"/>
+          <p:nvPr/>
+        </p:nvSpPr>
+        <p:spPr>
+          <a:xfrm>
+            <a:off x="5199691" y="2568405"/>
+            <a:ext cx="487408" cy="369332"/>
+          </a:xfrm>
+          <a:prstGeom prst="rect">
+            <a:avLst/>
+          </a:prstGeom>
+          <a:noFill/>
+        </p:spPr>
+        <p:txBody>
+          <a:bodyPr wrap="none" rtlCol="0">
+            <a:spAutoFit/>
+          </a:bodyPr>
+          <a:lstStyle/>
+          <a:p>
+            <a:r>
+              <a:rPr lang="en-US" sz="1800" dirty="0" smtClean="0">
+                <a:solidFill>
+                  <a:srgbClr val="FF0000"/>
+                </a:solidFill>
+              </a:rPr>
+              <a:t>(3)</a:t>
+            </a:r>
+            <a:endParaRPr lang="en-US" sz="1800" dirty="0">
+              <a:solidFill>
+                <a:srgbClr val="FF0000"/>
+              </a:solidFill>
+            </a:endParaRPr>
+          </a:p>
+        </p:txBody>
+      </p:sp>
     </p:spTree>
     <p:extLst>
       <p:ext uri="{BB962C8B-B14F-4D97-AF65-F5344CB8AC3E}">
         <p14:creationId xmlns:p14="http://schemas.microsoft.com/office/powerpoint/2010/main" val="3584940521"/>
+      </p:ext>
+    </p:extLst>
+  </p:cSld>
+  <p:clrMapOvr>
+    <a:masterClrMapping/>
+  </p:clrMapOvr>
+  <p:transition xmlns:p14="http://schemas.microsoft.com/office/powerpoint/2010/main">
+    <p:fade/>
+  </p:transition>
+</p:sld>
+</file>
+
+<file path=ppt/slides/slide3.xml><?xml version="1.0" encoding="utf-8"?>
+<p:sld xmlns:a="http://schemas.openxmlformats.org/drawingml/2006/main" xmlns:r="http://schemas.openxmlformats.org/officeDocument/2006/relationships" xmlns:p="http://schemas.openxmlformats.org/presentationml/2006/main">
+  <p:cSld>
+    <p:spTree>
+      <p:nvGrpSpPr>
+        <p:cNvPr id="1" name=""/>
+        <p:cNvGrpSpPr/>
+        <p:nvPr/>
+      </p:nvGrpSpPr>
+      <p:grpSpPr>
+        <a:xfrm>
+          <a:off x="0" y="0"/>
+          <a:ext cx="0" cy="0"/>
+          <a:chOff x="0" y="0"/>
+          <a:chExt cx="0" cy="0"/>
+        </a:xfrm>
+      </p:grpSpPr>
+      <p:sp>
+        <p:nvSpPr>
+          <p:cNvPr id="4" name="Slide Number Placeholder 3"/>
+          <p:cNvSpPr>
+            <a:spLocks noGrp="1"/>
+          </p:cNvSpPr>
+          <p:nvPr>
+            <p:ph type="sldNum" sz="quarter" idx="10"/>
+          </p:nvPr>
+        </p:nvSpPr>
+        <p:spPr/>
+        <p:txBody>
+          <a:bodyPr/>
+          <a:lstStyle/>
+          <a:p>
+            <a:pPr>
+              <a:defRPr/>
+            </a:pPr>
+            <a:fld id="{04115896-62BD-42FA-A8CE-89F8BA03C882}" type="slidenum">
+              <a:rPr lang="ko-KR" altLang="en-US" smtClean="0"/>
+              <a:pPr>
+                <a:defRPr/>
+              </a:pPr>
+              <a:t>3</a:t>
+            </a:fld>
+            <a:endParaRPr lang="en-US" altLang="ko-KR" dirty="0"/>
+          </a:p>
+        </p:txBody>
+      </p:sp>
+      <p:sp>
+        <p:nvSpPr>
+          <p:cNvPr id="22" name="TextBox 21"/>
+          <p:cNvSpPr txBox="1"/>
+          <p:nvPr/>
+        </p:nvSpPr>
+        <p:spPr>
+          <a:xfrm>
+            <a:off x="613639" y="513676"/>
+            <a:ext cx="3786238" cy="5572296"/>
+          </a:xfrm>
+          <a:prstGeom prst="rect">
+            <a:avLst/>
+          </a:prstGeom>
+          <a:noFill/>
+        </p:spPr>
+        <p:txBody>
+          <a:bodyPr wrap="none" rtlCol="0">
+            <a:spAutoFit/>
+          </a:bodyPr>
+          <a:lstStyle/>
+          <a:p>
+            <a:pPr>
+              <a:lnSpc>
+                <a:spcPct val="110000"/>
+              </a:lnSpc>
+              <a:spcBef>
+                <a:spcPts val="0"/>
+              </a:spcBef>
+              <a:spcAft>
+                <a:spcPts val="0"/>
+              </a:spcAft>
+              <a:tabLst>
+                <a:tab pos="581660" algn="l"/>
+                <a:tab pos="1163320" algn="l"/>
+                <a:tab pos="1744980" algn="l"/>
+                <a:tab pos="2326640" algn="l"/>
+                <a:tab pos="2908300" algn="l"/>
+                <a:tab pos="3489960" algn="l"/>
+                <a:tab pos="4071620" algn="l"/>
+                <a:tab pos="4653280" algn="l"/>
+                <a:tab pos="5234940" algn="l"/>
+                <a:tab pos="5816600" algn="l"/>
+                <a:tab pos="6398260" algn="l"/>
+                <a:tab pos="6979920" algn="l"/>
+                <a:tab pos="7561580" algn="l"/>
+                <a:tab pos="8143240" algn="l"/>
+                <a:tab pos="8724900" algn="l"/>
+                <a:tab pos="9306560" algn="l"/>
+              </a:tabLst>
+            </a:pPr>
+            <a:r>
+              <a:rPr lang="en-US" sz="1800" b="1" dirty="0">
+                <a:solidFill>
+                  <a:srgbClr val="008000"/>
+                </a:solidFill>
+                <a:latin typeface="Courier"/>
+                <a:cs typeface="Courier"/>
+              </a:rPr>
+              <a:t>/</a:t>
+            </a:r>
+            <a:r>
+              <a:rPr lang="en-US" sz="1800" b="1" dirty="0" smtClean="0">
+                <a:solidFill>
+                  <a:srgbClr val="008000"/>
+                </a:solidFill>
+                <a:latin typeface="Courier"/>
+                <a:cs typeface="Courier"/>
+              </a:rPr>
+              <a:t>/ </a:t>
+            </a:r>
+            <a:r>
+              <a:rPr lang="en-US" sz="1800" b="1" dirty="0" err="1" smtClean="0">
+                <a:solidFill>
+                  <a:srgbClr val="008000"/>
+                </a:solidFill>
+                <a:latin typeface="Courier"/>
+                <a:cs typeface="Courier"/>
+              </a:rPr>
+              <a:t>ArrayList</a:t>
+            </a:r>
+            <a:r>
+              <a:rPr lang="en-US" sz="1800" b="1" dirty="0" smtClean="0">
+                <a:solidFill>
+                  <a:srgbClr val="008000"/>
+                </a:solidFill>
+                <a:latin typeface="Courier"/>
+                <a:cs typeface="Courier"/>
+              </a:rPr>
+              <a:t> of symbolic</a:t>
+            </a:r>
+          </a:p>
+          <a:p>
+            <a:pPr>
+              <a:lnSpc>
+                <a:spcPct val="110000"/>
+              </a:lnSpc>
+              <a:spcBef>
+                <a:spcPts val="0"/>
+              </a:spcBef>
+              <a:spcAft>
+                <a:spcPts val="0"/>
+              </a:spcAft>
+              <a:tabLst>
+                <a:tab pos="581660" algn="l"/>
+                <a:tab pos="1163320" algn="l"/>
+                <a:tab pos="1744980" algn="l"/>
+                <a:tab pos="2326640" algn="l"/>
+                <a:tab pos="2908300" algn="l"/>
+                <a:tab pos="3489960" algn="l"/>
+                <a:tab pos="4071620" algn="l"/>
+                <a:tab pos="4653280" algn="l"/>
+                <a:tab pos="5234940" algn="l"/>
+                <a:tab pos="5816600" algn="l"/>
+                <a:tab pos="6398260" algn="l"/>
+                <a:tab pos="6979920" algn="l"/>
+                <a:tab pos="7561580" algn="l"/>
+                <a:tab pos="8143240" algn="l"/>
+                <a:tab pos="8724900" algn="l"/>
+                <a:tab pos="9306560" algn="l"/>
+              </a:tabLst>
+            </a:pPr>
+            <a:r>
+              <a:rPr lang="en-US" sz="1800" b="1" dirty="0" smtClean="0">
+                <a:solidFill>
+                  <a:srgbClr val="008000"/>
+                </a:solidFill>
+                <a:latin typeface="Courier"/>
+                <a:cs typeface="Courier"/>
+              </a:rPr>
+              <a:t>// integers</a:t>
+            </a:r>
+            <a:endParaRPr lang="en-US" sz="1800" dirty="0" smtClean="0">
+              <a:solidFill>
+                <a:srgbClr val="000000"/>
+              </a:solidFill>
+              <a:latin typeface="Courier"/>
+              <a:cs typeface="Courier"/>
+            </a:endParaRPr>
+          </a:p>
+          <a:p>
+            <a:pPr>
+              <a:lnSpc>
+                <a:spcPct val="110000"/>
+              </a:lnSpc>
+              <a:spcBef>
+                <a:spcPts val="0"/>
+              </a:spcBef>
+              <a:spcAft>
+                <a:spcPts val="0"/>
+              </a:spcAft>
+              <a:tabLst>
+                <a:tab pos="581660" algn="l"/>
+                <a:tab pos="1163320" algn="l"/>
+                <a:tab pos="1744980" algn="l"/>
+                <a:tab pos="2326640" algn="l"/>
+                <a:tab pos="2908300" algn="l"/>
+                <a:tab pos="3489960" algn="l"/>
+                <a:tab pos="4071620" algn="l"/>
+                <a:tab pos="4653280" algn="l"/>
+                <a:tab pos="5234940" algn="l"/>
+                <a:tab pos="5816600" algn="l"/>
+                <a:tab pos="6398260" algn="l"/>
+                <a:tab pos="6979920" algn="l"/>
+                <a:tab pos="7561580" algn="l"/>
+                <a:tab pos="8143240" algn="l"/>
+                <a:tab pos="8724900" algn="l"/>
+                <a:tab pos="9306560" algn="l"/>
+              </a:tabLst>
+            </a:pPr>
+            <a:r>
+              <a:rPr lang="en-US" sz="1800" dirty="0" smtClean="0">
+                <a:solidFill>
+                  <a:srgbClr val="000000"/>
+                </a:solidFill>
+                <a:latin typeface="Courier"/>
+                <a:cs typeface="Courier"/>
+              </a:rPr>
+              <a:t>List</a:t>
+            </a:r>
+            <a:r>
+              <a:rPr lang="en-US" sz="1800" dirty="0">
+                <a:solidFill>
+                  <a:srgbClr val="000000"/>
+                </a:solidFill>
+                <a:latin typeface="Courier"/>
+                <a:cs typeface="Courier"/>
+              </a:rPr>
+              <a:t>&lt;Integer&gt; list = </a:t>
+            </a:r>
+            <a:endParaRPr lang="en-US" sz="1800" dirty="0" smtClean="0">
+              <a:solidFill>
+                <a:srgbClr val="000000"/>
+              </a:solidFill>
+              <a:latin typeface="Courier"/>
+              <a:cs typeface="Courier"/>
+            </a:endParaRPr>
+          </a:p>
+          <a:p>
+            <a:pPr>
+              <a:lnSpc>
+                <a:spcPct val="110000"/>
+              </a:lnSpc>
+              <a:spcBef>
+                <a:spcPts val="0"/>
+              </a:spcBef>
+              <a:spcAft>
+                <a:spcPts val="0"/>
+              </a:spcAft>
+              <a:tabLst>
+                <a:tab pos="581660" algn="l"/>
+                <a:tab pos="1163320" algn="l"/>
+                <a:tab pos="1744980" algn="l"/>
+                <a:tab pos="2326640" algn="l"/>
+                <a:tab pos="2908300" algn="l"/>
+                <a:tab pos="3489960" algn="l"/>
+                <a:tab pos="4071620" algn="l"/>
+                <a:tab pos="4653280" algn="l"/>
+                <a:tab pos="5234940" algn="l"/>
+                <a:tab pos="5816600" algn="l"/>
+                <a:tab pos="6398260" algn="l"/>
+                <a:tab pos="6979920" algn="l"/>
+                <a:tab pos="7561580" algn="l"/>
+                <a:tab pos="8143240" algn="l"/>
+                <a:tab pos="8724900" algn="l"/>
+                <a:tab pos="9306560" algn="l"/>
+              </a:tabLst>
+            </a:pPr>
+            <a:r>
+              <a:rPr lang="en-US" sz="1800" b="1" dirty="0">
+                <a:solidFill>
+                  <a:srgbClr val="000000"/>
+                </a:solidFill>
+                <a:latin typeface="Courier"/>
+                <a:cs typeface="Courier"/>
+              </a:rPr>
+              <a:t> </a:t>
+            </a:r>
+            <a:r>
+              <a:rPr lang="en-US" sz="1800" b="1" dirty="0" smtClean="0">
+                <a:solidFill>
+                  <a:srgbClr val="000000"/>
+                </a:solidFill>
+                <a:latin typeface="Courier"/>
+                <a:cs typeface="Courier"/>
+              </a:rPr>
+              <a:t> </a:t>
+            </a:r>
+            <a:r>
+              <a:rPr lang="en-US" sz="1800" b="1" dirty="0" smtClean="0">
+                <a:solidFill>
+                  <a:srgbClr val="000080"/>
+                </a:solidFill>
+                <a:latin typeface="Courier"/>
+                <a:cs typeface="Courier"/>
+              </a:rPr>
+              <a:t>new </a:t>
+            </a:r>
+            <a:r>
+              <a:rPr lang="en-US" sz="1800" dirty="0" err="1">
+                <a:solidFill>
+                  <a:srgbClr val="000000"/>
+                </a:solidFill>
+                <a:latin typeface="Courier"/>
+                <a:cs typeface="Courier"/>
+              </a:rPr>
+              <a:t>ArrayList</a:t>
+            </a:r>
+            <a:r>
+              <a:rPr lang="en-US" sz="1800" dirty="0">
+                <a:solidFill>
+                  <a:srgbClr val="000000"/>
+                </a:solidFill>
+                <a:latin typeface="Courier"/>
+                <a:cs typeface="Courier"/>
+              </a:rPr>
+              <a:t>&lt;&gt;(</a:t>
+            </a:r>
+            <a:r>
+              <a:rPr lang="en-US" sz="1800" dirty="0">
+                <a:solidFill>
+                  <a:srgbClr val="0000FF"/>
+                </a:solidFill>
+                <a:latin typeface="Courier"/>
+                <a:cs typeface="Courier"/>
+              </a:rPr>
+              <a:t>200</a:t>
+            </a:r>
+            <a:r>
+              <a:rPr lang="en-US" sz="1800" dirty="0">
+                <a:solidFill>
+                  <a:srgbClr val="000000"/>
+                </a:solidFill>
+                <a:latin typeface="Courier"/>
+                <a:cs typeface="Courier"/>
+              </a:rPr>
+              <a:t>);</a:t>
+            </a:r>
+            <a:br>
+              <a:rPr lang="en-US" sz="1800" dirty="0">
+                <a:solidFill>
+                  <a:srgbClr val="000000"/>
+                </a:solidFill>
+                <a:latin typeface="Courier"/>
+                <a:cs typeface="Courier"/>
+              </a:rPr>
+            </a:br>
+            <a:r>
+              <a:rPr lang="en-US" sz="1800" dirty="0">
+                <a:solidFill>
+                  <a:srgbClr val="000000"/>
+                </a:solidFill>
+                <a:latin typeface="Courier"/>
+                <a:cs typeface="Courier"/>
+              </a:rPr>
+              <a:t>...</a:t>
+            </a:r>
+            <a:br>
+              <a:rPr lang="en-US" sz="1800" dirty="0">
+                <a:solidFill>
+                  <a:srgbClr val="000000"/>
+                </a:solidFill>
+                <a:latin typeface="Courier"/>
+                <a:cs typeface="Courier"/>
+              </a:rPr>
+            </a:br>
+            <a:r>
+              <a:rPr lang="en-US" sz="1800" b="1" dirty="0">
+                <a:solidFill>
+                  <a:srgbClr val="000080"/>
+                </a:solidFill>
+                <a:latin typeface="Courier"/>
+                <a:cs typeface="Courier"/>
+              </a:rPr>
+              <a:t>for </a:t>
+            </a:r>
+            <a:r>
+              <a:rPr lang="en-US" sz="1800" dirty="0">
+                <a:solidFill>
+                  <a:srgbClr val="000000"/>
+                </a:solidFill>
+                <a:latin typeface="Courier"/>
+                <a:cs typeface="Courier"/>
+              </a:rPr>
+              <a:t>(</a:t>
+            </a:r>
+            <a:r>
+              <a:rPr lang="en-US" sz="1800" b="1" dirty="0" err="1">
+                <a:solidFill>
+                  <a:srgbClr val="000080"/>
+                </a:solidFill>
+                <a:latin typeface="Courier"/>
+                <a:cs typeface="Courier"/>
+              </a:rPr>
+              <a:t>int</a:t>
+            </a:r>
+            <a:r>
+              <a:rPr lang="en-US" sz="1800" b="1" dirty="0">
+                <a:solidFill>
+                  <a:srgbClr val="000080"/>
+                </a:solidFill>
+                <a:latin typeface="Courier"/>
+                <a:cs typeface="Courier"/>
+              </a:rPr>
+              <a:t> </a:t>
+            </a:r>
+            <a:r>
+              <a:rPr lang="en-US" sz="1800" dirty="0" err="1">
+                <a:solidFill>
+                  <a:srgbClr val="000000"/>
+                </a:solidFill>
+                <a:latin typeface="Courier"/>
+                <a:cs typeface="Courier"/>
+              </a:rPr>
+              <a:t>i</a:t>
+            </a:r>
+            <a:r>
+              <a:rPr lang="en-US" sz="1800" dirty="0">
+                <a:solidFill>
+                  <a:srgbClr val="000000"/>
+                </a:solidFill>
+                <a:latin typeface="Courier"/>
+                <a:cs typeface="Courier"/>
+              </a:rPr>
+              <a:t> = </a:t>
+            </a:r>
+            <a:r>
+              <a:rPr lang="en-US" sz="1800" dirty="0">
+                <a:solidFill>
+                  <a:srgbClr val="0000FF"/>
+                </a:solidFill>
+                <a:latin typeface="Courier"/>
+                <a:cs typeface="Courier"/>
+              </a:rPr>
+              <a:t>0</a:t>
+            </a:r>
+            <a:r>
+              <a:rPr lang="en-US" sz="1800" dirty="0">
+                <a:solidFill>
+                  <a:srgbClr val="000000"/>
+                </a:solidFill>
+                <a:latin typeface="Courier"/>
+                <a:cs typeface="Courier"/>
+              </a:rPr>
+              <a:t>; </a:t>
+            </a:r>
+            <a:endParaRPr lang="en-US" sz="1800" dirty="0" smtClean="0">
+              <a:solidFill>
+                <a:srgbClr val="000000"/>
+              </a:solidFill>
+              <a:latin typeface="Courier"/>
+              <a:cs typeface="Courier"/>
+            </a:endParaRPr>
+          </a:p>
+          <a:p>
+            <a:pPr>
+              <a:lnSpc>
+                <a:spcPct val="110000"/>
+              </a:lnSpc>
+              <a:spcBef>
+                <a:spcPts val="0"/>
+              </a:spcBef>
+              <a:spcAft>
+                <a:spcPts val="0"/>
+              </a:spcAft>
+              <a:tabLst>
+                <a:tab pos="581660" algn="l"/>
+                <a:tab pos="1163320" algn="l"/>
+                <a:tab pos="1744980" algn="l"/>
+                <a:tab pos="2326640" algn="l"/>
+                <a:tab pos="2908300" algn="l"/>
+                <a:tab pos="3489960" algn="l"/>
+                <a:tab pos="4071620" algn="l"/>
+                <a:tab pos="4653280" algn="l"/>
+                <a:tab pos="5234940" algn="l"/>
+                <a:tab pos="5816600" algn="l"/>
+                <a:tab pos="6398260" algn="l"/>
+                <a:tab pos="6979920" algn="l"/>
+                <a:tab pos="7561580" algn="l"/>
+                <a:tab pos="8143240" algn="l"/>
+                <a:tab pos="8724900" algn="l"/>
+                <a:tab pos="9306560" algn="l"/>
+              </a:tabLst>
+            </a:pPr>
+            <a:r>
+              <a:rPr lang="en-US" sz="1800" dirty="0">
+                <a:solidFill>
+                  <a:srgbClr val="000000"/>
+                </a:solidFill>
+                <a:latin typeface="Courier"/>
+                <a:cs typeface="Courier"/>
+              </a:rPr>
+              <a:t> </a:t>
+            </a:r>
+            <a:r>
+              <a:rPr lang="en-US" sz="1800" dirty="0" smtClean="0">
+                <a:solidFill>
+                  <a:srgbClr val="000000"/>
+                </a:solidFill>
+                <a:latin typeface="Courier"/>
+                <a:cs typeface="Courier"/>
+              </a:rPr>
+              <a:t>    </a:t>
+            </a:r>
+            <a:r>
+              <a:rPr lang="en-US" sz="1800" dirty="0" err="1" smtClean="0">
+                <a:solidFill>
+                  <a:srgbClr val="000000"/>
+                </a:solidFill>
+                <a:latin typeface="Courier"/>
+                <a:cs typeface="Courier"/>
+              </a:rPr>
+              <a:t>i</a:t>
+            </a:r>
+            <a:r>
+              <a:rPr lang="en-US" sz="1800" dirty="0" smtClean="0">
+                <a:solidFill>
+                  <a:srgbClr val="000000"/>
+                </a:solidFill>
+                <a:latin typeface="Courier"/>
+                <a:cs typeface="Courier"/>
+              </a:rPr>
+              <a:t> </a:t>
+            </a:r>
+            <a:r>
+              <a:rPr lang="en-US" sz="1800" dirty="0">
+                <a:solidFill>
+                  <a:srgbClr val="000000"/>
+                </a:solidFill>
+                <a:latin typeface="Courier"/>
+                <a:cs typeface="Courier"/>
+              </a:rPr>
+              <a:t>&lt; </a:t>
+            </a:r>
+            <a:r>
+              <a:rPr lang="en-US" sz="1800" dirty="0" err="1">
+                <a:solidFill>
+                  <a:srgbClr val="000000"/>
+                </a:solidFill>
+                <a:latin typeface="Courier"/>
+                <a:cs typeface="Courier"/>
+              </a:rPr>
+              <a:t>list.size</a:t>
+            </a:r>
+            <a:r>
+              <a:rPr lang="en-US" sz="1800" dirty="0">
+                <a:solidFill>
+                  <a:srgbClr val="000000"/>
+                </a:solidFill>
+                <a:latin typeface="Courier"/>
+                <a:cs typeface="Courier"/>
+              </a:rPr>
+              <a:t>(); </a:t>
+            </a:r>
+            <a:endParaRPr lang="en-US" sz="1800" dirty="0" smtClean="0">
+              <a:solidFill>
+                <a:srgbClr val="000000"/>
+              </a:solidFill>
+              <a:latin typeface="Courier"/>
+              <a:cs typeface="Courier"/>
+            </a:endParaRPr>
+          </a:p>
+          <a:p>
+            <a:pPr>
+              <a:lnSpc>
+                <a:spcPct val="110000"/>
+              </a:lnSpc>
+              <a:spcBef>
+                <a:spcPts val="0"/>
+              </a:spcBef>
+              <a:spcAft>
+                <a:spcPts val="0"/>
+              </a:spcAft>
+              <a:tabLst>
+                <a:tab pos="581660" algn="l"/>
+                <a:tab pos="1163320" algn="l"/>
+                <a:tab pos="1744980" algn="l"/>
+                <a:tab pos="2326640" algn="l"/>
+                <a:tab pos="2908300" algn="l"/>
+                <a:tab pos="3489960" algn="l"/>
+                <a:tab pos="4071620" algn="l"/>
+                <a:tab pos="4653280" algn="l"/>
+                <a:tab pos="5234940" algn="l"/>
+                <a:tab pos="5816600" algn="l"/>
+                <a:tab pos="6398260" algn="l"/>
+                <a:tab pos="6979920" algn="l"/>
+                <a:tab pos="7561580" algn="l"/>
+                <a:tab pos="8143240" algn="l"/>
+                <a:tab pos="8724900" algn="l"/>
+                <a:tab pos="9306560" algn="l"/>
+              </a:tabLst>
+            </a:pPr>
+            <a:r>
+              <a:rPr lang="en-US" sz="1800" dirty="0">
+                <a:solidFill>
+                  <a:srgbClr val="000000"/>
+                </a:solidFill>
+                <a:latin typeface="Courier"/>
+                <a:cs typeface="Courier"/>
+              </a:rPr>
+              <a:t> </a:t>
+            </a:r>
+            <a:r>
+              <a:rPr lang="en-US" sz="1800" dirty="0" smtClean="0">
+                <a:solidFill>
+                  <a:srgbClr val="000000"/>
+                </a:solidFill>
+                <a:latin typeface="Courier"/>
+                <a:cs typeface="Courier"/>
+              </a:rPr>
+              <a:t>    </a:t>
+            </a:r>
+            <a:r>
+              <a:rPr lang="en-US" sz="1800" dirty="0" err="1" smtClean="0">
+                <a:solidFill>
+                  <a:srgbClr val="000000"/>
+                </a:solidFill>
+                <a:latin typeface="Courier"/>
+                <a:cs typeface="Courier"/>
+              </a:rPr>
+              <a:t>i</a:t>
+            </a:r>
+            <a:r>
+              <a:rPr lang="en-US" sz="1800" dirty="0">
+                <a:solidFill>
+                  <a:srgbClr val="000000"/>
+                </a:solidFill>
+                <a:latin typeface="Courier"/>
+                <a:cs typeface="Courier"/>
+              </a:rPr>
+              <a:t>++) </a:t>
+            </a:r>
+            <a:r>
+              <a:rPr lang="en-US" sz="1800" dirty="0" smtClean="0">
+                <a:solidFill>
+                  <a:srgbClr val="000000"/>
+                </a:solidFill>
+                <a:latin typeface="Courier"/>
+                <a:cs typeface="Courier"/>
+              </a:rPr>
+              <a:t>{</a:t>
+            </a:r>
+          </a:p>
+          <a:p>
+            <a:pPr>
+              <a:lnSpc>
+                <a:spcPct val="110000"/>
+              </a:lnSpc>
+              <a:spcBef>
+                <a:spcPts val="0"/>
+              </a:spcBef>
+              <a:spcAft>
+                <a:spcPts val="0"/>
+              </a:spcAft>
+              <a:tabLst>
+                <a:tab pos="581660" algn="l"/>
+                <a:tab pos="1163320" algn="l"/>
+                <a:tab pos="1744980" algn="l"/>
+                <a:tab pos="2326640" algn="l"/>
+                <a:tab pos="2908300" algn="l"/>
+                <a:tab pos="3489960" algn="l"/>
+                <a:tab pos="4071620" algn="l"/>
+                <a:tab pos="4653280" algn="l"/>
+                <a:tab pos="5234940" algn="l"/>
+                <a:tab pos="5816600" algn="l"/>
+                <a:tab pos="6398260" algn="l"/>
+                <a:tab pos="6979920" algn="l"/>
+                <a:tab pos="7561580" algn="l"/>
+                <a:tab pos="8143240" algn="l"/>
+                <a:tab pos="8724900" algn="l"/>
+                <a:tab pos="9306560" algn="l"/>
+              </a:tabLst>
+            </a:pPr>
+            <a:r>
+              <a:rPr lang="en-US" sz="1800" b="1" dirty="0" smtClean="0">
+                <a:solidFill>
+                  <a:srgbClr val="008000"/>
+                </a:solidFill>
+                <a:latin typeface="Courier"/>
+                <a:cs typeface="Courier"/>
+              </a:rPr>
+              <a:t>// </a:t>
+            </a:r>
+            <a:r>
+              <a:rPr lang="en-US" sz="1800" b="1" dirty="0" err="1" smtClean="0">
+                <a:solidFill>
+                  <a:srgbClr val="008000"/>
+                </a:solidFill>
+                <a:latin typeface="Courier"/>
+                <a:cs typeface="Courier"/>
+              </a:rPr>
+              <a:t>list.get</a:t>
+            </a:r>
+            <a:r>
+              <a:rPr lang="en-US" sz="1800" b="1" dirty="0" smtClean="0">
+                <a:solidFill>
+                  <a:srgbClr val="008000"/>
+                </a:solidFill>
+                <a:latin typeface="Courier"/>
+                <a:cs typeface="Courier"/>
+              </a:rPr>
+              <a:t>(</a:t>
+            </a:r>
+            <a:r>
+              <a:rPr lang="en-US" sz="1800" b="1" dirty="0" err="1" smtClean="0">
+                <a:solidFill>
+                  <a:srgbClr val="008000"/>
+                </a:solidFill>
+                <a:latin typeface="Courier"/>
+                <a:cs typeface="Courier"/>
+              </a:rPr>
+              <a:t>i</a:t>
+            </a:r>
+            <a:r>
+              <a:rPr lang="en-US" sz="1800" b="1" dirty="0" smtClean="0">
+                <a:solidFill>
+                  <a:srgbClr val="008000"/>
+                </a:solidFill>
+                <a:latin typeface="Courier"/>
+                <a:cs typeface="Courier"/>
+              </a:rPr>
+              <a:t>) returns</a:t>
+            </a:r>
+          </a:p>
+          <a:p>
+            <a:pPr>
+              <a:lnSpc>
+                <a:spcPct val="110000"/>
+              </a:lnSpc>
+              <a:spcBef>
+                <a:spcPts val="0"/>
+              </a:spcBef>
+              <a:spcAft>
+                <a:spcPts val="0"/>
+              </a:spcAft>
+              <a:tabLst>
+                <a:tab pos="581660" algn="l"/>
+                <a:tab pos="1163320" algn="l"/>
+                <a:tab pos="1744980" algn="l"/>
+                <a:tab pos="2326640" algn="l"/>
+                <a:tab pos="2908300" algn="l"/>
+                <a:tab pos="3489960" algn="l"/>
+                <a:tab pos="4071620" algn="l"/>
+                <a:tab pos="4653280" algn="l"/>
+                <a:tab pos="5234940" algn="l"/>
+                <a:tab pos="5816600" algn="l"/>
+                <a:tab pos="6398260" algn="l"/>
+                <a:tab pos="6979920" algn="l"/>
+                <a:tab pos="7561580" algn="l"/>
+                <a:tab pos="8143240" algn="l"/>
+                <a:tab pos="8724900" algn="l"/>
+                <a:tab pos="9306560" algn="l"/>
+              </a:tabLst>
+            </a:pPr>
+            <a:r>
+              <a:rPr lang="en-US" sz="1800" b="1" dirty="0" smtClean="0">
+                <a:solidFill>
+                  <a:srgbClr val="008000"/>
+                </a:solidFill>
+                <a:latin typeface="Courier"/>
+                <a:cs typeface="Courier"/>
+              </a:rPr>
+              <a:t>// symbolic integer </a:t>
+            </a:r>
+            <a:r>
+              <a:rPr lang="en-US" sz="1800" dirty="0">
+                <a:solidFill>
+                  <a:srgbClr val="000000"/>
+                </a:solidFill>
+                <a:latin typeface="Courier"/>
+                <a:cs typeface="Courier"/>
+              </a:rPr>
+              <a:t/>
+            </a:r>
+            <a:br>
+              <a:rPr lang="en-US" sz="1800" dirty="0">
+                <a:solidFill>
+                  <a:srgbClr val="000000"/>
+                </a:solidFill>
+                <a:latin typeface="Courier"/>
+                <a:cs typeface="Courier"/>
+              </a:rPr>
+            </a:br>
+            <a:r>
+              <a:rPr lang="en-US" sz="1800" dirty="0">
+                <a:solidFill>
+                  <a:srgbClr val="000000"/>
+                </a:solidFill>
+                <a:latin typeface="Courier"/>
+                <a:cs typeface="Courier"/>
+              </a:rPr>
+              <a:t>    </a:t>
+            </a:r>
+            <a:r>
+              <a:rPr lang="en-US" sz="1800" b="1" dirty="0">
+                <a:solidFill>
+                  <a:srgbClr val="000080"/>
+                </a:solidFill>
+                <a:latin typeface="Courier"/>
+                <a:cs typeface="Courier"/>
+              </a:rPr>
+              <a:t>if </a:t>
+            </a:r>
+            <a:r>
+              <a:rPr lang="en-US" sz="1800" dirty="0">
+                <a:solidFill>
+                  <a:srgbClr val="000000"/>
+                </a:solidFill>
+                <a:latin typeface="Courier"/>
+                <a:cs typeface="Courier"/>
+              </a:rPr>
+              <a:t>(i%</a:t>
+            </a:r>
+            <a:r>
+              <a:rPr lang="en-US" sz="1800" dirty="0">
+                <a:solidFill>
+                  <a:srgbClr val="0000FF"/>
+                </a:solidFill>
+                <a:latin typeface="Courier"/>
+                <a:cs typeface="Courier"/>
+              </a:rPr>
+              <a:t>2 </a:t>
+            </a:r>
+            <a:r>
+              <a:rPr lang="en-US" sz="1800" dirty="0">
+                <a:solidFill>
+                  <a:srgbClr val="000000"/>
+                </a:solidFill>
+                <a:latin typeface="Courier"/>
+                <a:cs typeface="Courier"/>
+              </a:rPr>
+              <a:t>== </a:t>
+            </a:r>
+            <a:r>
+              <a:rPr lang="en-US" sz="1800" dirty="0">
+                <a:solidFill>
+                  <a:srgbClr val="0000FF"/>
+                </a:solidFill>
+                <a:latin typeface="Courier"/>
+                <a:cs typeface="Courier"/>
+              </a:rPr>
+              <a:t>0 </a:t>
+            </a:r>
+            <a:r>
+              <a:rPr lang="en-US" sz="1800" dirty="0">
+                <a:solidFill>
+                  <a:srgbClr val="000000"/>
+                </a:solidFill>
+                <a:latin typeface="Courier"/>
+                <a:cs typeface="Courier"/>
+              </a:rPr>
+              <a:t>&amp;&amp; </a:t>
+            </a:r>
+            <a:endParaRPr lang="en-US" sz="1800" dirty="0" smtClean="0">
+              <a:solidFill>
+                <a:srgbClr val="000000"/>
+              </a:solidFill>
+              <a:latin typeface="Courier"/>
+              <a:cs typeface="Courier"/>
+            </a:endParaRPr>
+          </a:p>
+          <a:p>
+            <a:pPr>
+              <a:lnSpc>
+                <a:spcPct val="110000"/>
+              </a:lnSpc>
+              <a:spcBef>
+                <a:spcPts val="0"/>
+              </a:spcBef>
+              <a:spcAft>
+                <a:spcPts val="0"/>
+              </a:spcAft>
+              <a:tabLst>
+                <a:tab pos="581660" algn="l"/>
+                <a:tab pos="1163320" algn="l"/>
+                <a:tab pos="1744980" algn="l"/>
+                <a:tab pos="2326640" algn="l"/>
+                <a:tab pos="2908300" algn="l"/>
+                <a:tab pos="3489960" algn="l"/>
+                <a:tab pos="4071620" algn="l"/>
+                <a:tab pos="4653280" algn="l"/>
+                <a:tab pos="5234940" algn="l"/>
+                <a:tab pos="5816600" algn="l"/>
+                <a:tab pos="6398260" algn="l"/>
+                <a:tab pos="6979920" algn="l"/>
+                <a:tab pos="7561580" algn="l"/>
+                <a:tab pos="8143240" algn="l"/>
+                <a:tab pos="8724900" algn="l"/>
+                <a:tab pos="9306560" algn="l"/>
+              </a:tabLst>
+            </a:pPr>
+            <a:r>
+              <a:rPr lang="en-US" sz="1800" dirty="0">
+                <a:solidFill>
+                  <a:srgbClr val="000000"/>
+                </a:solidFill>
+                <a:latin typeface="Courier"/>
+                <a:cs typeface="Courier"/>
+              </a:rPr>
+              <a:t> </a:t>
+            </a:r>
+            <a:r>
+              <a:rPr lang="en-US" sz="1800" dirty="0" smtClean="0">
+                <a:solidFill>
+                  <a:srgbClr val="000000"/>
+                </a:solidFill>
+                <a:latin typeface="Courier"/>
+                <a:cs typeface="Courier"/>
+              </a:rPr>
+              <a:t>       </a:t>
+            </a:r>
+            <a:r>
+              <a:rPr lang="en-US" sz="1800" dirty="0" err="1" smtClean="0">
+                <a:solidFill>
+                  <a:srgbClr val="000000"/>
+                </a:solidFill>
+                <a:latin typeface="Courier"/>
+                <a:cs typeface="Courier"/>
+              </a:rPr>
+              <a:t>list.get</a:t>
+            </a:r>
+            <a:r>
+              <a:rPr lang="en-US" sz="1800" dirty="0">
+                <a:solidFill>
+                  <a:srgbClr val="000000"/>
+                </a:solidFill>
+                <a:latin typeface="Courier"/>
+                <a:cs typeface="Courier"/>
+              </a:rPr>
+              <a:t>(</a:t>
+            </a:r>
+            <a:r>
+              <a:rPr lang="en-US" sz="1800" dirty="0" err="1">
+                <a:solidFill>
+                  <a:srgbClr val="000000"/>
+                </a:solidFill>
+                <a:latin typeface="Courier"/>
+                <a:cs typeface="Courier"/>
+              </a:rPr>
+              <a:t>i</a:t>
+            </a:r>
+            <a:r>
+              <a:rPr lang="en-US" sz="1800" dirty="0">
+                <a:solidFill>
+                  <a:srgbClr val="000000"/>
+                </a:solidFill>
+                <a:latin typeface="Courier"/>
+                <a:cs typeface="Courier"/>
+              </a:rPr>
+              <a:t>) == </a:t>
+            </a:r>
+            <a:r>
+              <a:rPr lang="en-US" sz="1800" dirty="0">
+                <a:solidFill>
+                  <a:srgbClr val="0000FF"/>
+                </a:solidFill>
+                <a:latin typeface="Courier"/>
+                <a:cs typeface="Courier"/>
+              </a:rPr>
+              <a:t>42</a:t>
+            </a:r>
+            <a:r>
+              <a:rPr lang="en-US" sz="1800" dirty="0" smtClean="0">
+                <a:solidFill>
+                  <a:srgbClr val="000000"/>
+                </a:solidFill>
+                <a:latin typeface="Courier"/>
+                <a:cs typeface="Courier"/>
+              </a:rPr>
+              <a:t>)</a:t>
+            </a:r>
+            <a:r>
+              <a:rPr lang="en-US" sz="1800" dirty="0">
+                <a:solidFill>
+                  <a:srgbClr val="000000"/>
+                </a:solidFill>
+                <a:latin typeface="Courier"/>
+                <a:cs typeface="Courier"/>
+              </a:rPr>
+              <a:t/>
+            </a:r>
+            <a:br>
+              <a:rPr lang="en-US" sz="1800" dirty="0">
+                <a:solidFill>
+                  <a:srgbClr val="000000"/>
+                </a:solidFill>
+                <a:latin typeface="Courier"/>
+                <a:cs typeface="Courier"/>
+              </a:rPr>
+            </a:br>
+            <a:r>
+              <a:rPr lang="en-US" sz="1800" dirty="0">
+                <a:solidFill>
+                  <a:srgbClr val="000000"/>
+                </a:solidFill>
+                <a:latin typeface="Courier"/>
+                <a:cs typeface="Courier"/>
+              </a:rPr>
+              <a:t>        </a:t>
+            </a:r>
+            <a:r>
+              <a:rPr lang="en-US" sz="1800" b="1" dirty="0">
+                <a:solidFill>
+                  <a:srgbClr val="660E7A"/>
+                </a:solidFill>
+                <a:latin typeface="Courier"/>
+                <a:cs typeface="Courier"/>
+              </a:rPr>
+              <a:t>count</a:t>
+            </a:r>
+            <a:r>
+              <a:rPr lang="en-US" sz="1800" dirty="0">
+                <a:solidFill>
+                  <a:srgbClr val="000000"/>
+                </a:solidFill>
+                <a:latin typeface="Courier"/>
+                <a:cs typeface="Courier"/>
+              </a:rPr>
+              <a:t>++;</a:t>
+            </a:r>
+            <a:br>
+              <a:rPr lang="en-US" sz="1800" dirty="0">
+                <a:solidFill>
+                  <a:srgbClr val="000000"/>
+                </a:solidFill>
+                <a:latin typeface="Courier"/>
+                <a:cs typeface="Courier"/>
+              </a:rPr>
+            </a:br>
+            <a:r>
+              <a:rPr lang="en-US" sz="1800" dirty="0">
+                <a:solidFill>
+                  <a:srgbClr val="000000"/>
+                </a:solidFill>
+                <a:latin typeface="Courier"/>
+                <a:cs typeface="Courier"/>
+              </a:rPr>
+              <a:t>    ...</a:t>
+            </a:r>
+            <a:br>
+              <a:rPr lang="en-US" sz="1800" dirty="0">
+                <a:solidFill>
+                  <a:srgbClr val="000000"/>
+                </a:solidFill>
+                <a:latin typeface="Courier"/>
+                <a:cs typeface="Courier"/>
+              </a:rPr>
+            </a:br>
+            <a:r>
+              <a:rPr lang="en-US" sz="1800" dirty="0">
+                <a:solidFill>
+                  <a:srgbClr val="000000"/>
+                </a:solidFill>
+                <a:latin typeface="Courier"/>
+                <a:cs typeface="Courier"/>
+              </a:rPr>
+              <a:t>}</a:t>
+            </a:r>
+            <a:br>
+              <a:rPr lang="en-US" sz="1800" dirty="0">
+                <a:solidFill>
+                  <a:srgbClr val="000000"/>
+                </a:solidFill>
+                <a:latin typeface="Courier"/>
+                <a:cs typeface="Courier"/>
+              </a:rPr>
+            </a:br>
+            <a:r>
+              <a:rPr lang="en-US" sz="1800" b="1" dirty="0">
+                <a:solidFill>
+                  <a:srgbClr val="000080"/>
+                </a:solidFill>
+                <a:latin typeface="Courier"/>
+                <a:cs typeface="Courier"/>
+              </a:rPr>
+              <a:t>if </a:t>
+            </a:r>
+            <a:r>
+              <a:rPr lang="en-US" sz="1800" dirty="0">
+                <a:solidFill>
+                  <a:srgbClr val="000000"/>
+                </a:solidFill>
+                <a:latin typeface="Courier"/>
+                <a:cs typeface="Courier"/>
+              </a:rPr>
+              <a:t>(</a:t>
+            </a:r>
+            <a:r>
+              <a:rPr lang="en-US" sz="1800" b="1" dirty="0">
+                <a:solidFill>
+                  <a:srgbClr val="660E7A"/>
+                </a:solidFill>
+                <a:latin typeface="Courier"/>
+                <a:cs typeface="Courier"/>
+              </a:rPr>
+              <a:t>count </a:t>
+            </a:r>
+            <a:r>
+              <a:rPr lang="en-US" sz="1800" dirty="0">
+                <a:solidFill>
+                  <a:srgbClr val="000000"/>
+                </a:solidFill>
+                <a:latin typeface="Courier"/>
+                <a:cs typeface="Courier"/>
+              </a:rPr>
+              <a:t>== </a:t>
+            </a:r>
+            <a:r>
+              <a:rPr lang="en-US" sz="1800" dirty="0">
+                <a:solidFill>
+                  <a:srgbClr val="0000FF"/>
+                </a:solidFill>
+                <a:latin typeface="Courier"/>
+                <a:cs typeface="Courier"/>
+              </a:rPr>
+              <a:t>75</a:t>
+            </a:r>
+            <a:r>
+              <a:rPr lang="en-US" sz="1800" dirty="0">
+                <a:solidFill>
+                  <a:srgbClr val="000000"/>
+                </a:solidFill>
+                <a:latin typeface="Courier"/>
+                <a:cs typeface="Courier"/>
+              </a:rPr>
+              <a:t>) {</a:t>
+            </a:r>
+            <a:br>
+              <a:rPr lang="en-US" sz="1800" dirty="0">
+                <a:solidFill>
+                  <a:srgbClr val="000000"/>
+                </a:solidFill>
+                <a:latin typeface="Courier"/>
+                <a:cs typeface="Courier"/>
+              </a:rPr>
+            </a:br>
+            <a:r>
+              <a:rPr lang="en-US" sz="1800" dirty="0">
+                <a:solidFill>
+                  <a:srgbClr val="000000"/>
+                </a:solidFill>
+                <a:latin typeface="Courier"/>
+                <a:cs typeface="Courier"/>
+              </a:rPr>
+              <a:t>    </a:t>
+            </a:r>
+            <a:r>
+              <a:rPr lang="en-US" sz="1800" b="1" dirty="0" smtClean="0">
+                <a:solidFill>
+                  <a:srgbClr val="008000"/>
+                </a:solidFill>
+                <a:latin typeface="Courier"/>
+                <a:cs typeface="Courier"/>
+              </a:rPr>
+              <a:t>//bug</a:t>
+            </a:r>
+          </a:p>
+          <a:p>
+            <a:pPr>
+              <a:lnSpc>
+                <a:spcPct val="110000"/>
+              </a:lnSpc>
+              <a:spcBef>
+                <a:spcPts val="0"/>
+              </a:spcBef>
+              <a:spcAft>
+                <a:spcPts val="0"/>
+              </a:spcAft>
+              <a:tabLst>
+                <a:tab pos="581660" algn="l"/>
+                <a:tab pos="1163320" algn="l"/>
+                <a:tab pos="1744980" algn="l"/>
+                <a:tab pos="2326640" algn="l"/>
+                <a:tab pos="2908300" algn="l"/>
+                <a:tab pos="3489960" algn="l"/>
+                <a:tab pos="4071620" algn="l"/>
+                <a:tab pos="4653280" algn="l"/>
+                <a:tab pos="5234940" algn="l"/>
+                <a:tab pos="5816600" algn="l"/>
+                <a:tab pos="6398260" algn="l"/>
+                <a:tab pos="6979920" algn="l"/>
+                <a:tab pos="7561580" algn="l"/>
+                <a:tab pos="8143240" algn="l"/>
+                <a:tab pos="8724900" algn="l"/>
+                <a:tab pos="9306560" algn="l"/>
+              </a:tabLst>
+            </a:pPr>
+            <a:r>
+              <a:rPr lang="en-US" sz="1800" dirty="0" smtClean="0">
+                <a:solidFill>
+                  <a:srgbClr val="000000"/>
+                </a:solidFill>
+                <a:latin typeface="Courier"/>
+                <a:cs typeface="Courier"/>
+              </a:rPr>
+              <a:t>}</a:t>
+            </a:r>
+            <a:r>
+              <a:rPr lang="en-US" sz="1800" dirty="0" smtClean="0">
+                <a:latin typeface="Courier"/>
+                <a:cs typeface="Courier"/>
+              </a:rPr>
+              <a:t> </a:t>
+            </a:r>
+            <a:endParaRPr lang="en-US" sz="1800" dirty="0">
+              <a:latin typeface="Courier"/>
+              <a:ea typeface="ＭＳ 明朝"/>
+              <a:cs typeface="Courier"/>
+            </a:endParaRPr>
+          </a:p>
+        </p:txBody>
+      </p:sp>
+      <p:sp>
+        <p:nvSpPr>
+          <p:cNvPr id="24" name="TextBox 23"/>
+          <p:cNvSpPr txBox="1"/>
+          <p:nvPr/>
+        </p:nvSpPr>
+        <p:spPr>
+          <a:xfrm>
+            <a:off x="5904665" y="1027362"/>
+            <a:ext cx="2123974" cy="646331"/>
+          </a:xfrm>
+          <a:prstGeom prst="rect">
+            <a:avLst/>
+          </a:prstGeom>
+          <a:noFill/>
+        </p:spPr>
+        <p:txBody>
+          <a:bodyPr wrap="none" rtlCol="0">
+            <a:spAutoFit/>
+          </a:bodyPr>
+          <a:lstStyle/>
+          <a:p>
+            <a:pPr algn="ctr"/>
+            <a:r>
+              <a:rPr lang="en-US" sz="1800" dirty="0">
+                <a:solidFill>
+                  <a:srgbClr val="000000"/>
+                </a:solidFill>
+                <a:latin typeface="Courier"/>
+                <a:cs typeface="Courier"/>
+              </a:rPr>
+              <a:t>List</a:t>
+            </a:r>
+            <a:r>
+              <a:rPr lang="en-US" sz="1800" dirty="0" smtClean="0">
+                <a:solidFill>
+                  <a:srgbClr val="000000"/>
+                </a:solidFill>
+                <a:latin typeface="Courier"/>
+                <a:cs typeface="Courier"/>
+              </a:rPr>
+              <a:t>&lt;</a:t>
+            </a:r>
+            <a:r>
+              <a:rPr lang="en-US" sz="1800" dirty="0" smtClean="0">
+                <a:solidFill>
+                  <a:srgbClr val="20999D"/>
+                </a:solidFill>
+                <a:latin typeface="Courier"/>
+                <a:cs typeface="Courier"/>
+              </a:rPr>
+              <a:t>Integer</a:t>
+            </a:r>
+            <a:r>
+              <a:rPr lang="en-US" sz="1800" dirty="0" smtClean="0">
+                <a:solidFill>
+                  <a:srgbClr val="000000"/>
+                </a:solidFill>
+                <a:latin typeface="Courier"/>
+                <a:cs typeface="Courier"/>
+              </a:rPr>
+              <a:t>&gt;.</a:t>
+            </a:r>
+          </a:p>
+          <a:p>
+            <a:pPr algn="ctr"/>
+            <a:r>
+              <a:rPr lang="en-US" sz="1800" dirty="0" smtClean="0">
+                <a:solidFill>
+                  <a:srgbClr val="000000"/>
+                </a:solidFill>
+                <a:latin typeface="Courier"/>
+                <a:cs typeface="Courier"/>
+              </a:rPr>
+              <a:t>get</a:t>
+            </a:r>
+            <a:r>
+              <a:rPr lang="en-US" sz="1800" dirty="0">
+                <a:solidFill>
+                  <a:srgbClr val="000000"/>
+                </a:solidFill>
+                <a:latin typeface="Courier"/>
+                <a:cs typeface="Courier"/>
+              </a:rPr>
+              <a:t>(</a:t>
+            </a:r>
+            <a:r>
+              <a:rPr lang="en-US" sz="1800" dirty="0" err="1">
+                <a:solidFill>
+                  <a:srgbClr val="000000"/>
+                </a:solidFill>
+                <a:latin typeface="Courier"/>
+                <a:cs typeface="Courier"/>
+              </a:rPr>
+              <a:t>i</a:t>
+            </a:r>
+            <a:r>
+              <a:rPr lang="en-US" sz="1800" dirty="0">
+                <a:solidFill>
+                  <a:srgbClr val="000000"/>
+                </a:solidFill>
+                <a:latin typeface="Courier"/>
+                <a:cs typeface="Courier"/>
+              </a:rPr>
+              <a:t>)</a:t>
+            </a:r>
+            <a:r>
+              <a:rPr lang="en-US" sz="1800" dirty="0">
+                <a:latin typeface="Courier"/>
+                <a:cs typeface="Courier"/>
+              </a:rPr>
+              <a:t> </a:t>
+            </a:r>
+            <a:endParaRPr lang="en-US" sz="1800" dirty="0" smtClean="0">
+              <a:latin typeface="Courier"/>
+              <a:cs typeface="Courier"/>
+            </a:endParaRPr>
+          </a:p>
+        </p:txBody>
+      </p:sp>
+      <p:sp>
+        <p:nvSpPr>
+          <p:cNvPr id="25" name="TextBox 24"/>
+          <p:cNvSpPr txBox="1"/>
+          <p:nvPr/>
+        </p:nvSpPr>
+        <p:spPr>
+          <a:xfrm>
+            <a:off x="5558360" y="2001144"/>
+            <a:ext cx="2816584" cy="646331"/>
+          </a:xfrm>
+          <a:prstGeom prst="rect">
+            <a:avLst/>
+          </a:prstGeom>
+          <a:noFill/>
+        </p:spPr>
+        <p:txBody>
+          <a:bodyPr wrap="none" rtlCol="0">
+            <a:spAutoFit/>
+          </a:bodyPr>
+          <a:lstStyle/>
+          <a:p>
+            <a:pPr algn="ctr"/>
+            <a:r>
+              <a:rPr lang="en-US" sz="1800" dirty="0" err="1" smtClean="0">
+                <a:solidFill>
+                  <a:srgbClr val="000000"/>
+                </a:solidFill>
+                <a:latin typeface="Courier"/>
+                <a:cs typeface="Courier"/>
+              </a:rPr>
+              <a:t>ArrayList</a:t>
+            </a:r>
+            <a:r>
+              <a:rPr lang="en-US" sz="1800" dirty="0" smtClean="0">
+                <a:solidFill>
+                  <a:srgbClr val="000000"/>
+                </a:solidFill>
+                <a:latin typeface="Courier"/>
+                <a:cs typeface="Courier"/>
+              </a:rPr>
+              <a:t>&lt;</a:t>
+            </a:r>
+            <a:r>
+              <a:rPr lang="en-US" sz="1800" dirty="0" smtClean="0">
+                <a:solidFill>
+                  <a:srgbClr val="20999D"/>
+                </a:solidFill>
+                <a:latin typeface="Courier"/>
+                <a:cs typeface="Courier"/>
+              </a:rPr>
+              <a:t>Integer</a:t>
+            </a:r>
+            <a:r>
+              <a:rPr lang="en-US" sz="1800" dirty="0" smtClean="0">
+                <a:solidFill>
+                  <a:srgbClr val="000000"/>
+                </a:solidFill>
+                <a:latin typeface="Courier"/>
+                <a:cs typeface="Courier"/>
+              </a:rPr>
+              <a:t>&gt;.</a:t>
+            </a:r>
+          </a:p>
+          <a:p>
+            <a:pPr algn="ctr"/>
+            <a:r>
+              <a:rPr lang="en-US" sz="1800" dirty="0" smtClean="0">
+                <a:solidFill>
+                  <a:srgbClr val="000000"/>
+                </a:solidFill>
+                <a:latin typeface="Courier"/>
+                <a:cs typeface="Courier"/>
+              </a:rPr>
+              <a:t>get</a:t>
+            </a:r>
+            <a:r>
+              <a:rPr lang="en-US" sz="1800" dirty="0">
+                <a:solidFill>
+                  <a:srgbClr val="000000"/>
+                </a:solidFill>
+                <a:latin typeface="Courier"/>
+                <a:cs typeface="Courier"/>
+              </a:rPr>
+              <a:t>(</a:t>
+            </a:r>
+            <a:r>
+              <a:rPr lang="en-US" sz="1800" dirty="0" err="1">
+                <a:solidFill>
+                  <a:srgbClr val="000000"/>
+                </a:solidFill>
+                <a:latin typeface="Courier"/>
+                <a:cs typeface="Courier"/>
+              </a:rPr>
+              <a:t>i</a:t>
+            </a:r>
+            <a:r>
+              <a:rPr lang="en-US" sz="1800" dirty="0">
+                <a:solidFill>
+                  <a:srgbClr val="000000"/>
+                </a:solidFill>
+                <a:latin typeface="Courier"/>
+                <a:cs typeface="Courier"/>
+              </a:rPr>
+              <a:t>)</a:t>
+            </a:r>
+            <a:r>
+              <a:rPr lang="en-US" sz="1800" dirty="0">
+                <a:latin typeface="Courier"/>
+                <a:cs typeface="Courier"/>
+              </a:rPr>
+              <a:t> </a:t>
+            </a:r>
+            <a:endParaRPr lang="en-US" sz="1800" dirty="0" smtClean="0">
+              <a:latin typeface="Courier"/>
+              <a:cs typeface="Courier"/>
+            </a:endParaRPr>
+          </a:p>
+        </p:txBody>
+      </p:sp>
+      <p:sp>
+        <p:nvSpPr>
+          <p:cNvPr id="26" name="TextBox 25"/>
+          <p:cNvSpPr txBox="1"/>
+          <p:nvPr/>
+        </p:nvSpPr>
+        <p:spPr>
+          <a:xfrm>
+            <a:off x="5040616" y="3109563"/>
+            <a:ext cx="1985452" cy="646331"/>
+          </a:xfrm>
+          <a:prstGeom prst="rect">
+            <a:avLst/>
+          </a:prstGeom>
+          <a:noFill/>
+        </p:spPr>
+        <p:txBody>
+          <a:bodyPr wrap="none" rtlCol="0">
+            <a:spAutoFit/>
+          </a:bodyPr>
+          <a:lstStyle/>
+          <a:p>
+            <a:pPr algn="ctr"/>
+            <a:r>
+              <a:rPr lang="en-US" sz="1800" dirty="0" err="1" smtClean="0">
+                <a:solidFill>
+                  <a:srgbClr val="000000"/>
+                </a:solidFill>
+                <a:latin typeface="Courier"/>
+                <a:cs typeface="Courier"/>
+              </a:rPr>
+              <a:t>ArrayList</a:t>
+            </a:r>
+            <a:r>
+              <a:rPr lang="en-US" sz="1800" dirty="0" smtClean="0">
+                <a:solidFill>
+                  <a:srgbClr val="000000"/>
+                </a:solidFill>
+                <a:latin typeface="Courier"/>
+                <a:cs typeface="Courier"/>
+              </a:rPr>
+              <a:t>&lt;</a:t>
+            </a:r>
+            <a:r>
+              <a:rPr lang="en-US" sz="1800" dirty="0" smtClean="0">
+                <a:solidFill>
+                  <a:srgbClr val="20999D"/>
+                </a:solidFill>
+                <a:latin typeface="Courier"/>
+                <a:cs typeface="Courier"/>
+              </a:rPr>
+              <a:t>E</a:t>
+            </a:r>
+            <a:r>
+              <a:rPr lang="en-US" sz="1800" dirty="0" smtClean="0">
+                <a:solidFill>
+                  <a:srgbClr val="000000"/>
+                </a:solidFill>
+                <a:latin typeface="Courier"/>
+                <a:cs typeface="Courier"/>
+              </a:rPr>
+              <a:t>&gt;.</a:t>
+            </a:r>
+          </a:p>
+          <a:p>
+            <a:pPr algn="ctr"/>
+            <a:r>
+              <a:rPr lang="en-US" sz="1800" dirty="0" err="1" smtClean="0">
+                <a:solidFill>
+                  <a:srgbClr val="000000"/>
+                </a:solidFill>
+                <a:latin typeface="Courier"/>
+                <a:cs typeface="Courier"/>
+              </a:rPr>
+              <a:t>rangeCheck</a:t>
+            </a:r>
+            <a:r>
+              <a:rPr lang="en-US" sz="1800" dirty="0" smtClean="0">
+                <a:solidFill>
+                  <a:srgbClr val="000000"/>
+                </a:solidFill>
+                <a:latin typeface="Courier"/>
+                <a:cs typeface="Courier"/>
+              </a:rPr>
+              <a:t>(</a:t>
+            </a:r>
+            <a:r>
+              <a:rPr lang="en-US" sz="1800" dirty="0" err="1">
+                <a:solidFill>
+                  <a:srgbClr val="000000"/>
+                </a:solidFill>
+                <a:latin typeface="Courier"/>
+                <a:cs typeface="Courier"/>
+              </a:rPr>
+              <a:t>i</a:t>
+            </a:r>
+            <a:r>
+              <a:rPr lang="en-US" sz="1800" dirty="0" smtClean="0">
+                <a:solidFill>
+                  <a:srgbClr val="000000"/>
+                </a:solidFill>
+                <a:latin typeface="Courier"/>
+                <a:cs typeface="Courier"/>
+              </a:rPr>
+              <a:t>)</a:t>
+            </a:r>
+            <a:endParaRPr lang="en-US" sz="1800" dirty="0" smtClean="0">
+              <a:latin typeface="Courier"/>
+              <a:cs typeface="Courier"/>
+            </a:endParaRPr>
+          </a:p>
+        </p:txBody>
+      </p:sp>
+      <p:sp>
+        <p:nvSpPr>
+          <p:cNvPr id="27" name="TextBox 26"/>
+          <p:cNvSpPr txBox="1"/>
+          <p:nvPr/>
+        </p:nvSpPr>
+        <p:spPr>
+          <a:xfrm>
+            <a:off x="4971355" y="3995064"/>
+            <a:ext cx="2123974" cy="646331"/>
+          </a:xfrm>
+          <a:prstGeom prst="rect">
+            <a:avLst/>
+          </a:prstGeom>
+          <a:noFill/>
+        </p:spPr>
+        <p:txBody>
+          <a:bodyPr wrap="none" rtlCol="0">
+            <a:spAutoFit/>
+          </a:bodyPr>
+          <a:lstStyle/>
+          <a:p>
+            <a:pPr algn="ctr"/>
+            <a:r>
+              <a:rPr lang="en-US" sz="1800" dirty="0" err="1" smtClean="0">
+                <a:solidFill>
+                  <a:srgbClr val="000000"/>
+                </a:solidFill>
+                <a:latin typeface="Courier"/>
+                <a:cs typeface="Courier"/>
+              </a:rPr>
+              <a:t>ArrayList</a:t>
+            </a:r>
+            <a:r>
+              <a:rPr lang="en-US" sz="1800" dirty="0" smtClean="0">
+                <a:solidFill>
+                  <a:srgbClr val="000000"/>
+                </a:solidFill>
+                <a:latin typeface="Courier"/>
+                <a:cs typeface="Courier"/>
+              </a:rPr>
+              <a:t>&lt;</a:t>
+            </a:r>
+            <a:r>
+              <a:rPr lang="en-US" sz="1800" dirty="0" smtClean="0">
+                <a:solidFill>
+                  <a:srgbClr val="20999D"/>
+                </a:solidFill>
+                <a:latin typeface="Courier"/>
+                <a:cs typeface="Courier"/>
+              </a:rPr>
+              <a:t>E</a:t>
+            </a:r>
+            <a:r>
+              <a:rPr lang="en-US" sz="1800" dirty="0" smtClean="0">
+                <a:solidFill>
+                  <a:srgbClr val="000000"/>
+                </a:solidFill>
+                <a:latin typeface="Courier"/>
+                <a:cs typeface="Courier"/>
+              </a:rPr>
+              <a:t>&gt;.</a:t>
+            </a:r>
+          </a:p>
+          <a:p>
+            <a:pPr algn="ctr"/>
+            <a:r>
+              <a:rPr lang="en-US" sz="1800" dirty="0" err="1" smtClean="0">
+                <a:solidFill>
+                  <a:srgbClr val="000000"/>
+                </a:solidFill>
+                <a:latin typeface="Courier"/>
+                <a:cs typeface="Courier"/>
+              </a:rPr>
+              <a:t>elementData</a:t>
+            </a:r>
+            <a:r>
+              <a:rPr lang="en-US" sz="1800" dirty="0" smtClean="0">
+                <a:solidFill>
+                  <a:srgbClr val="000000"/>
+                </a:solidFill>
+                <a:latin typeface="Courier"/>
+                <a:cs typeface="Courier"/>
+              </a:rPr>
+              <a:t>(</a:t>
+            </a:r>
+            <a:r>
+              <a:rPr lang="en-US" sz="1800" dirty="0" err="1" smtClean="0">
+                <a:solidFill>
+                  <a:srgbClr val="000000"/>
+                </a:solidFill>
+                <a:latin typeface="Courier"/>
+                <a:cs typeface="Courier"/>
+              </a:rPr>
+              <a:t>i</a:t>
+            </a:r>
+            <a:r>
+              <a:rPr lang="en-US" sz="1800" dirty="0" smtClean="0">
+                <a:solidFill>
+                  <a:srgbClr val="000000"/>
+                </a:solidFill>
+                <a:latin typeface="Courier"/>
+                <a:cs typeface="Courier"/>
+              </a:rPr>
+              <a:t>)</a:t>
+            </a:r>
+            <a:endParaRPr lang="en-US" sz="1800" dirty="0" smtClean="0">
+              <a:latin typeface="Courier"/>
+              <a:cs typeface="Courier"/>
+            </a:endParaRPr>
+          </a:p>
+        </p:txBody>
+      </p:sp>
+      <p:sp>
+        <p:nvSpPr>
+          <p:cNvPr id="28" name="TextBox 27"/>
+          <p:cNvSpPr txBox="1"/>
+          <p:nvPr/>
+        </p:nvSpPr>
+        <p:spPr>
+          <a:xfrm>
+            <a:off x="4971355" y="5322311"/>
+            <a:ext cx="2123974" cy="646331"/>
+          </a:xfrm>
+          <a:prstGeom prst="rect">
+            <a:avLst/>
+          </a:prstGeom>
+          <a:noFill/>
+        </p:spPr>
+        <p:txBody>
+          <a:bodyPr wrap="none" rtlCol="0">
+            <a:spAutoFit/>
+          </a:bodyPr>
+          <a:lstStyle/>
+          <a:p>
+            <a:pPr algn="ctr"/>
+            <a:r>
+              <a:rPr lang="en-US" sz="1800" dirty="0" err="1">
+                <a:solidFill>
+                  <a:srgbClr val="000000"/>
+                </a:solidFill>
+                <a:latin typeface="Courier"/>
+                <a:cs typeface="Courier"/>
+              </a:rPr>
+              <a:t>ArrayList</a:t>
+            </a:r>
+            <a:r>
+              <a:rPr lang="en-US" sz="1800" dirty="0">
+                <a:solidFill>
+                  <a:srgbClr val="000000"/>
+                </a:solidFill>
+                <a:latin typeface="Courier"/>
+                <a:cs typeface="Courier"/>
+              </a:rPr>
+              <a:t>&lt;</a:t>
+            </a:r>
+            <a:r>
+              <a:rPr lang="en-US" sz="1800" dirty="0">
+                <a:solidFill>
+                  <a:srgbClr val="20999D"/>
+                </a:solidFill>
+                <a:latin typeface="Courier"/>
+                <a:cs typeface="Courier"/>
+              </a:rPr>
+              <a:t>E</a:t>
+            </a:r>
+            <a:r>
+              <a:rPr lang="en-US" sz="1800" dirty="0" smtClean="0">
+                <a:solidFill>
+                  <a:srgbClr val="000000"/>
+                </a:solidFill>
+                <a:latin typeface="Courier"/>
+                <a:cs typeface="Courier"/>
+              </a:rPr>
+              <a:t>&gt;.</a:t>
+            </a:r>
+          </a:p>
+          <a:p>
+            <a:pPr algn="ctr"/>
+            <a:r>
+              <a:rPr lang="en-US" sz="1800" b="1" dirty="0" err="1" smtClean="0">
+                <a:solidFill>
+                  <a:srgbClr val="660E7A"/>
+                </a:solidFill>
+                <a:latin typeface="Courier"/>
+                <a:cs typeface="Courier"/>
+              </a:rPr>
+              <a:t>elementData</a:t>
+            </a:r>
+            <a:r>
+              <a:rPr lang="en-US" sz="1800" dirty="0">
+                <a:solidFill>
+                  <a:srgbClr val="000000"/>
+                </a:solidFill>
+                <a:latin typeface="Courier"/>
+                <a:cs typeface="Courier"/>
+              </a:rPr>
+              <a:t>[</a:t>
+            </a:r>
+            <a:r>
+              <a:rPr lang="en-US" sz="1800" dirty="0" err="1" smtClean="0">
+                <a:solidFill>
+                  <a:srgbClr val="000000"/>
+                </a:solidFill>
+                <a:latin typeface="Courier"/>
+                <a:cs typeface="Courier"/>
+              </a:rPr>
+              <a:t>i</a:t>
+            </a:r>
+            <a:r>
+              <a:rPr lang="en-US" sz="1800" dirty="0" smtClean="0">
+                <a:solidFill>
+                  <a:srgbClr val="000000"/>
+                </a:solidFill>
+                <a:latin typeface="Courier"/>
+                <a:cs typeface="Courier"/>
+              </a:rPr>
+              <a:t>]</a:t>
+            </a:r>
+            <a:endParaRPr lang="en-US" sz="1800" dirty="0">
+              <a:latin typeface="Courier"/>
+              <a:cs typeface="Courier"/>
+            </a:endParaRPr>
+          </a:p>
+        </p:txBody>
+      </p:sp>
+      <p:sp>
+        <p:nvSpPr>
+          <p:cNvPr id="29" name="TextBox 28"/>
+          <p:cNvSpPr txBox="1"/>
+          <p:nvPr/>
+        </p:nvSpPr>
+        <p:spPr>
+          <a:xfrm>
+            <a:off x="7281591" y="3109563"/>
+            <a:ext cx="1569886" cy="646331"/>
+          </a:xfrm>
+          <a:prstGeom prst="rect">
+            <a:avLst/>
+          </a:prstGeom>
+          <a:noFill/>
+        </p:spPr>
+        <p:txBody>
+          <a:bodyPr wrap="none" rtlCol="0">
+            <a:spAutoFit/>
+          </a:bodyPr>
+          <a:lstStyle/>
+          <a:p>
+            <a:pPr algn="ctr"/>
+            <a:r>
+              <a:rPr lang="en-US" sz="1800" dirty="0">
+                <a:solidFill>
+                  <a:srgbClr val="000000"/>
+                </a:solidFill>
+                <a:latin typeface="Courier"/>
+                <a:cs typeface="Courier"/>
+              </a:rPr>
+              <a:t>Integer</a:t>
+            </a:r>
+            <a:r>
+              <a:rPr lang="en-US" sz="1800" dirty="0" smtClean="0">
+                <a:solidFill>
+                  <a:srgbClr val="000000"/>
+                </a:solidFill>
+                <a:latin typeface="Courier"/>
+                <a:cs typeface="Courier"/>
+              </a:rPr>
+              <a:t>.</a:t>
+            </a:r>
+          </a:p>
+          <a:p>
+            <a:pPr algn="ctr"/>
+            <a:r>
+              <a:rPr lang="en-US" sz="1800" dirty="0" err="1" smtClean="0">
+                <a:solidFill>
+                  <a:srgbClr val="000000"/>
+                </a:solidFill>
+                <a:latin typeface="Courier"/>
+                <a:cs typeface="Courier"/>
+              </a:rPr>
+              <a:t>intValue</a:t>
+            </a:r>
+            <a:r>
+              <a:rPr lang="en-US" sz="1800" dirty="0">
+                <a:solidFill>
+                  <a:srgbClr val="000000"/>
+                </a:solidFill>
+                <a:latin typeface="Courier"/>
+                <a:cs typeface="Courier"/>
+              </a:rPr>
+              <a:t>(</a:t>
+            </a:r>
+            <a:r>
+              <a:rPr lang="en-US" sz="1800" dirty="0" smtClean="0">
+                <a:solidFill>
+                  <a:srgbClr val="000000"/>
+                </a:solidFill>
+                <a:latin typeface="Courier"/>
+                <a:cs typeface="Courier"/>
+              </a:rPr>
+              <a:t>)</a:t>
+            </a:r>
+            <a:endParaRPr lang="en-US" sz="1800" dirty="0">
+              <a:latin typeface="Courier"/>
+              <a:cs typeface="Courier"/>
+            </a:endParaRPr>
+          </a:p>
+        </p:txBody>
+      </p:sp>
+      <p:sp>
+        <p:nvSpPr>
+          <p:cNvPr id="30" name="TextBox 29"/>
+          <p:cNvSpPr txBox="1"/>
+          <p:nvPr/>
+        </p:nvSpPr>
+        <p:spPr>
+          <a:xfrm>
+            <a:off x="7420113" y="3995064"/>
+            <a:ext cx="1292842" cy="646331"/>
+          </a:xfrm>
+          <a:prstGeom prst="rect">
+            <a:avLst/>
+          </a:prstGeom>
+          <a:noFill/>
+        </p:spPr>
+        <p:txBody>
+          <a:bodyPr wrap="none" rtlCol="0">
+            <a:spAutoFit/>
+          </a:bodyPr>
+          <a:lstStyle/>
+          <a:p>
+            <a:pPr algn="ctr"/>
+            <a:r>
+              <a:rPr lang="en-US" sz="1800" dirty="0" smtClean="0">
+                <a:solidFill>
+                  <a:srgbClr val="000000"/>
+                </a:solidFill>
+                <a:latin typeface="Courier"/>
+                <a:cs typeface="Courier"/>
+              </a:rPr>
+              <a:t>Integer.</a:t>
+            </a:r>
+          </a:p>
+          <a:p>
+            <a:pPr algn="ctr"/>
+            <a:r>
+              <a:rPr lang="en-US" sz="1800" b="1" dirty="0" smtClean="0">
+                <a:solidFill>
+                  <a:srgbClr val="660E7A"/>
+                </a:solidFill>
+                <a:latin typeface="Courier"/>
+                <a:cs typeface="Courier"/>
+              </a:rPr>
+              <a:t>value</a:t>
+            </a:r>
+            <a:endParaRPr lang="en-US" sz="1800" dirty="0">
+              <a:latin typeface="Courier"/>
+              <a:cs typeface="Courier"/>
+            </a:endParaRPr>
+          </a:p>
+        </p:txBody>
+      </p:sp>
+      <p:cxnSp>
+        <p:nvCxnSpPr>
+          <p:cNvPr id="31" name="Straight Arrow Connector 30"/>
+          <p:cNvCxnSpPr>
+            <a:stCxn id="24" idx="2"/>
+            <a:endCxn id="25" idx="0"/>
+          </p:cNvCxnSpPr>
+          <p:nvPr/>
+        </p:nvCxnSpPr>
+        <p:spPr bwMode="auto">
+          <a:xfrm>
+            <a:off x="6966652" y="1673693"/>
+            <a:ext cx="0" cy="327451"/>
+          </a:xfrm>
+          <a:prstGeom prst="straightConnector1">
+            <a:avLst/>
+          </a:prstGeom>
+          <a:noFill/>
+          <a:ln w="6350" cap="flat" cmpd="sng" algn="ctr">
+            <a:solidFill>
+              <a:schemeClr val="tx1"/>
+            </a:solidFill>
+            <a:prstDash val="solid"/>
+            <a:round/>
+            <a:headEnd type="none" w="med" len="med"/>
+            <a:tailEnd type="arrow"/>
+          </a:ln>
+          <a:effectLst/>
+        </p:spPr>
+      </p:cxnSp>
+      <p:cxnSp>
+        <p:nvCxnSpPr>
+          <p:cNvPr id="32" name="Straight Arrow Connector 31"/>
+          <p:cNvCxnSpPr>
+            <a:stCxn id="25" idx="2"/>
+            <a:endCxn id="26" idx="0"/>
+          </p:cNvCxnSpPr>
+          <p:nvPr/>
+        </p:nvCxnSpPr>
+        <p:spPr bwMode="auto">
+          <a:xfrm flipH="1">
+            <a:off x="6033342" y="2647475"/>
+            <a:ext cx="933310" cy="462088"/>
+          </a:xfrm>
+          <a:prstGeom prst="straightConnector1">
+            <a:avLst/>
+          </a:prstGeom>
+          <a:noFill/>
+          <a:ln w="6350" cap="flat" cmpd="sng" algn="ctr">
+            <a:solidFill>
+              <a:srgbClr val="000000"/>
+            </a:solidFill>
+            <a:prstDash val="solid"/>
+            <a:round/>
+            <a:headEnd type="none" w="med" len="med"/>
+            <a:tailEnd type="arrow"/>
+          </a:ln>
+          <a:effectLst/>
+        </p:spPr>
+      </p:cxnSp>
+      <p:cxnSp>
+        <p:nvCxnSpPr>
+          <p:cNvPr id="33" name="Straight Arrow Connector 32"/>
+          <p:cNvCxnSpPr>
+            <a:stCxn id="27" idx="2"/>
+            <a:endCxn id="28" idx="0"/>
+          </p:cNvCxnSpPr>
+          <p:nvPr/>
+        </p:nvCxnSpPr>
+        <p:spPr bwMode="auto">
+          <a:xfrm>
+            <a:off x="6033342" y="4641395"/>
+            <a:ext cx="0" cy="680916"/>
+          </a:xfrm>
+          <a:prstGeom prst="straightConnector1">
+            <a:avLst/>
+          </a:prstGeom>
+          <a:noFill/>
+          <a:ln w="6350" cap="flat" cmpd="sng" algn="ctr">
+            <a:solidFill>
+              <a:schemeClr val="tx1"/>
+            </a:solidFill>
+            <a:prstDash val="solid"/>
+            <a:round/>
+            <a:headEnd type="none" w="med" len="med"/>
+            <a:tailEnd type="arrow"/>
+          </a:ln>
+          <a:effectLst/>
+        </p:spPr>
+      </p:cxnSp>
+      <p:cxnSp>
+        <p:nvCxnSpPr>
+          <p:cNvPr id="34" name="Straight Arrow Connector 33"/>
+          <p:cNvCxnSpPr>
+            <a:stCxn id="29" idx="2"/>
+            <a:endCxn id="30" idx="0"/>
+          </p:cNvCxnSpPr>
+          <p:nvPr/>
+        </p:nvCxnSpPr>
+        <p:spPr bwMode="auto">
+          <a:xfrm>
+            <a:off x="8066534" y="3755894"/>
+            <a:ext cx="0" cy="239170"/>
+          </a:xfrm>
+          <a:prstGeom prst="straightConnector1">
+            <a:avLst/>
+          </a:prstGeom>
+          <a:noFill/>
+          <a:ln w="6350" cap="flat" cmpd="sng" algn="ctr">
+            <a:solidFill>
+              <a:schemeClr val="tx1"/>
+            </a:solidFill>
+            <a:prstDash val="solid"/>
+            <a:round/>
+            <a:headEnd type="none" w="med" len="med"/>
+            <a:tailEnd type="arrow"/>
+          </a:ln>
+          <a:effectLst/>
+        </p:spPr>
+      </p:cxnSp>
+      <p:cxnSp>
+        <p:nvCxnSpPr>
+          <p:cNvPr id="35" name="Straight Arrow Connector 34"/>
+          <p:cNvCxnSpPr>
+            <a:endCxn id="24" idx="0"/>
+          </p:cNvCxnSpPr>
+          <p:nvPr/>
+        </p:nvCxnSpPr>
+        <p:spPr bwMode="auto">
+          <a:xfrm>
+            <a:off x="6966652" y="651216"/>
+            <a:ext cx="0" cy="376146"/>
+          </a:xfrm>
+          <a:prstGeom prst="straightConnector1">
+            <a:avLst/>
+          </a:prstGeom>
+          <a:noFill/>
+          <a:ln w="6350" cap="flat" cmpd="sng" algn="ctr">
+            <a:solidFill>
+              <a:schemeClr val="tx1"/>
+            </a:solidFill>
+            <a:prstDash val="solid"/>
+            <a:round/>
+            <a:headEnd type="none" w="med" len="med"/>
+            <a:tailEnd type="arrow"/>
+          </a:ln>
+          <a:effectLst/>
+        </p:spPr>
+      </p:cxnSp>
+      <p:cxnSp>
+        <p:nvCxnSpPr>
+          <p:cNvPr id="36" name="Straight Arrow Connector 35"/>
+          <p:cNvCxnSpPr>
+            <a:stCxn id="30" idx="2"/>
+          </p:cNvCxnSpPr>
+          <p:nvPr/>
+        </p:nvCxnSpPr>
+        <p:spPr bwMode="auto">
+          <a:xfrm>
+            <a:off x="8066534" y="4641395"/>
+            <a:ext cx="0" cy="523954"/>
+          </a:xfrm>
+          <a:prstGeom prst="straightConnector1">
+            <a:avLst/>
+          </a:prstGeom>
+          <a:noFill/>
+          <a:ln w="6350" cap="flat" cmpd="sng" algn="ctr">
+            <a:solidFill>
+              <a:schemeClr val="tx1"/>
+            </a:solidFill>
+            <a:prstDash val="solid"/>
+            <a:round/>
+            <a:headEnd type="none" w="med" len="med"/>
+            <a:tailEnd type="arrow"/>
+          </a:ln>
+          <a:effectLst/>
+        </p:spPr>
+      </p:cxnSp>
+      <p:cxnSp>
+        <p:nvCxnSpPr>
+          <p:cNvPr id="37" name="Straight Arrow Connector 36"/>
+          <p:cNvCxnSpPr>
+            <a:stCxn id="25" idx="2"/>
+            <a:endCxn id="29" idx="0"/>
+          </p:cNvCxnSpPr>
+          <p:nvPr/>
+        </p:nvCxnSpPr>
+        <p:spPr bwMode="auto">
+          <a:xfrm>
+            <a:off x="6966652" y="2647475"/>
+            <a:ext cx="1099882" cy="462088"/>
+          </a:xfrm>
+          <a:prstGeom prst="straightConnector1">
+            <a:avLst/>
+          </a:prstGeom>
+          <a:noFill/>
+          <a:ln w="6350" cap="flat" cmpd="sng" algn="ctr">
+            <a:solidFill>
+              <a:srgbClr val="000000"/>
+            </a:solidFill>
+            <a:prstDash val="solid"/>
+            <a:round/>
+            <a:headEnd type="none" w="med" len="med"/>
+            <a:tailEnd type="arrow"/>
+          </a:ln>
+          <a:effectLst/>
+        </p:spPr>
+      </p:cxnSp>
+      <p:sp>
+        <p:nvSpPr>
+          <p:cNvPr id="38" name="Freeform 37"/>
+          <p:cNvSpPr/>
+          <p:nvPr/>
+        </p:nvSpPr>
+        <p:spPr>
+          <a:xfrm>
+            <a:off x="6037681" y="2668288"/>
+            <a:ext cx="1154177" cy="1369817"/>
+          </a:xfrm>
+          <a:custGeom>
+            <a:avLst/>
+            <a:gdLst>
+              <a:gd name="connsiteX0" fmla="*/ 927600 w 1154177"/>
+              <a:gd name="connsiteY0" fmla="*/ 0 h 1369817"/>
+              <a:gd name="connsiteX1" fmla="*/ 1141662 w 1154177"/>
+              <a:gd name="connsiteY1" fmla="*/ 984556 h 1369817"/>
+              <a:gd name="connsiteX2" fmla="*/ 599372 w 1154177"/>
+              <a:gd name="connsiteY2" fmla="*/ 1241396 h 1369817"/>
+              <a:gd name="connsiteX3" fmla="*/ 0 w 1154177"/>
+              <a:gd name="connsiteY3" fmla="*/ 1369817 h 1369817"/>
+            </a:gdLst>
+            <a:ahLst/>
+            <a:cxnLst>
+              <a:cxn ang="0">
+                <a:pos x="connsiteX0" y="connsiteY0"/>
+              </a:cxn>
+              <a:cxn ang="0">
+                <a:pos x="connsiteX1" y="connsiteY1"/>
+              </a:cxn>
+              <a:cxn ang="0">
+                <a:pos x="connsiteX2" y="connsiteY2"/>
+              </a:cxn>
+              <a:cxn ang="0">
+                <a:pos x="connsiteX3" y="connsiteY3"/>
+              </a:cxn>
+            </a:cxnLst>
+            <a:rect l="l" t="t" r="r" b="b"/>
+            <a:pathLst>
+              <a:path w="1154177" h="1369817">
+                <a:moveTo>
+                  <a:pt x="927600" y="0"/>
+                </a:moveTo>
+                <a:cubicBezTo>
+                  <a:pt x="1061983" y="388828"/>
+                  <a:pt x="1196367" y="777657"/>
+                  <a:pt x="1141662" y="984556"/>
+                </a:cubicBezTo>
+                <a:cubicBezTo>
+                  <a:pt x="1086957" y="1191455"/>
+                  <a:pt x="789649" y="1177186"/>
+                  <a:pt x="599372" y="1241396"/>
+                </a:cubicBezTo>
+                <a:cubicBezTo>
+                  <a:pt x="409095" y="1305606"/>
+                  <a:pt x="0" y="1369817"/>
+                  <a:pt x="0" y="1369817"/>
+                </a:cubicBezTo>
+              </a:path>
+            </a:pathLst>
+          </a:custGeom>
+          <a:ln>
+            <a:solidFill>
+              <a:srgbClr val="000000"/>
+            </a:solidFill>
+            <a:headEnd type="none"/>
+            <a:tailEnd type="arrow"/>
+          </a:ln>
+        </p:spPr>
+        <p:txBody>
+          <a:bodyPr vert="horz" wrap="square" lIns="91440" tIns="45720" rIns="91440" bIns="45720" numCol="1" rtlCol="0" anchor="t" anchorCtr="0" compatLnSpc="1">
+            <a:prstTxWarp prst="textNoShape">
+              <a:avLst/>
+            </a:prstTxWarp>
+            <a:spAutoFit/>
+          </a:bodyPr>
+          <a:lstStyle/>
+          <a:p>
+            <a:pPr marL="0" marR="0" indent="0" algn="ctr" defTabSz="914400" rtl="0" eaLnBrk="1" fontAlgn="base" latinLnBrk="0" hangingPunct="1">
+              <a:lnSpc>
+                <a:spcPct val="100000"/>
+              </a:lnSpc>
+              <a:spcBef>
+                <a:spcPct val="50000"/>
+              </a:spcBef>
+              <a:spcAft>
+                <a:spcPct val="0"/>
+              </a:spcAft>
+              <a:buClrTx/>
+              <a:buSzTx/>
+              <a:buFontTx/>
+              <a:buNone/>
+              <a:tabLst/>
+            </a:pPr>
+            <a:endParaRPr kumimoji="0" lang="en-US" sz="1200" b="0" i="0" u="none" strike="noStrike" cap="none" normalizeH="0" baseline="0" smtClean="0">
+              <a:ln>
+                <a:noFill/>
+              </a:ln>
+              <a:solidFill>
+                <a:schemeClr val="tx1"/>
+              </a:solidFill>
+              <a:effectLst/>
+              <a:latin typeface="Tahoma" pitchFamily="34" charset="0"/>
+            </a:endParaRPr>
+          </a:p>
+        </p:txBody>
+      </p:sp>
+      <p:sp>
+        <p:nvSpPr>
+          <p:cNvPr id="39" name="TextBox 38"/>
+          <p:cNvSpPr txBox="1"/>
+          <p:nvPr/>
+        </p:nvSpPr>
+        <p:spPr>
+          <a:xfrm>
+            <a:off x="6094761" y="2568405"/>
+            <a:ext cx="487408" cy="369332"/>
+          </a:xfrm>
+          <a:prstGeom prst="rect">
+            <a:avLst/>
+          </a:prstGeom>
+          <a:noFill/>
+        </p:spPr>
+        <p:txBody>
+          <a:bodyPr wrap="none" rtlCol="0">
+            <a:spAutoFit/>
+          </a:bodyPr>
+          <a:lstStyle/>
+          <a:p>
+            <a:r>
+              <a:rPr lang="en-US" sz="1800" dirty="0" smtClean="0">
+                <a:solidFill>
+                  <a:srgbClr val="FF0000"/>
+                </a:solidFill>
+              </a:rPr>
+              <a:t>(1)</a:t>
+            </a:r>
+            <a:endParaRPr lang="en-US" sz="1800" dirty="0">
+              <a:solidFill>
+                <a:srgbClr val="FF0000"/>
+              </a:solidFill>
+            </a:endParaRPr>
+          </a:p>
+        </p:txBody>
+      </p:sp>
+      <p:sp>
+        <p:nvSpPr>
+          <p:cNvPr id="40" name="TextBox 39"/>
+          <p:cNvSpPr txBox="1"/>
+          <p:nvPr/>
+        </p:nvSpPr>
+        <p:spPr>
+          <a:xfrm>
+            <a:off x="6632478" y="2735074"/>
+            <a:ext cx="487408" cy="369332"/>
+          </a:xfrm>
+          <a:prstGeom prst="rect">
+            <a:avLst/>
+          </a:prstGeom>
+          <a:noFill/>
+        </p:spPr>
+        <p:txBody>
+          <a:bodyPr wrap="none" rtlCol="0">
+            <a:spAutoFit/>
+          </a:bodyPr>
+          <a:lstStyle/>
+          <a:p>
+            <a:r>
+              <a:rPr lang="en-US" sz="1800" dirty="0" smtClean="0">
+                <a:solidFill>
+                  <a:srgbClr val="FF0000"/>
+                </a:solidFill>
+              </a:rPr>
+              <a:t>(2)</a:t>
+            </a:r>
+            <a:endParaRPr lang="en-US" sz="1800" dirty="0">
+              <a:solidFill>
+                <a:srgbClr val="FF0000"/>
+              </a:solidFill>
+            </a:endParaRPr>
+          </a:p>
+        </p:txBody>
+      </p:sp>
+      <p:sp>
+        <p:nvSpPr>
+          <p:cNvPr id="41" name="TextBox 40"/>
+          <p:cNvSpPr txBox="1"/>
+          <p:nvPr/>
+        </p:nvSpPr>
+        <p:spPr>
+          <a:xfrm>
+            <a:off x="7512699" y="2568405"/>
+            <a:ext cx="487408" cy="369332"/>
+          </a:xfrm>
+          <a:prstGeom prst="rect">
+            <a:avLst/>
+          </a:prstGeom>
+          <a:noFill/>
+        </p:spPr>
+        <p:txBody>
+          <a:bodyPr wrap="none" rtlCol="0">
+            <a:spAutoFit/>
+          </a:bodyPr>
+          <a:lstStyle/>
+          <a:p>
+            <a:r>
+              <a:rPr lang="en-US" sz="1800" dirty="0" smtClean="0">
+                <a:solidFill>
+                  <a:srgbClr val="FF0000"/>
+                </a:solidFill>
+              </a:rPr>
+              <a:t>(3)</a:t>
+            </a:r>
+            <a:endParaRPr lang="en-US" sz="1800" dirty="0">
+              <a:solidFill>
+                <a:srgbClr val="FF0000"/>
+              </a:solidFill>
+            </a:endParaRPr>
+          </a:p>
+        </p:txBody>
+      </p:sp>
+      <p:sp>
+        <p:nvSpPr>
+          <p:cNvPr id="43" name="Rectangle 42"/>
+          <p:cNvSpPr/>
+          <p:nvPr/>
+        </p:nvSpPr>
+        <p:spPr bwMode="auto">
+          <a:xfrm>
+            <a:off x="1655411" y="3866643"/>
+            <a:ext cx="1741033" cy="399764"/>
+          </a:xfrm>
+          <a:prstGeom prst="rect">
+            <a:avLst/>
+          </a:prstGeom>
+          <a:noFill/>
+          <a:ln w="9525" cap="flat" cmpd="sng" algn="ctr">
+            <a:solidFill>
+              <a:schemeClr val="accent6"/>
+            </a:solidFill>
+            <a:prstDash val="solid"/>
+            <a:round/>
+            <a:headEnd type="none" w="med" len="med"/>
+            <a:tailEnd type="none" w="med" len="med"/>
+          </a:ln>
+          <a:effectLst/>
+        </p:spPr>
+        <p:txBody>
+          <a:bodyPr vert="horz" wrap="square" lIns="91440" tIns="45720" rIns="91440" bIns="45720" numCol="1" rtlCol="0" anchor="t" anchorCtr="0" compatLnSpc="1">
+            <a:prstTxWarp prst="textNoShape">
+              <a:avLst/>
+            </a:prstTxWarp>
+            <a:spAutoFit/>
+          </a:bodyPr>
+          <a:lstStyle/>
+          <a:p>
+            <a:pPr marL="0" marR="0" indent="0" algn="ctr" defTabSz="914400" rtl="0" eaLnBrk="1" fontAlgn="base" latinLnBrk="0" hangingPunct="1">
+              <a:lnSpc>
+                <a:spcPct val="100000"/>
+              </a:lnSpc>
+              <a:spcBef>
+                <a:spcPct val="50000"/>
+              </a:spcBef>
+              <a:spcAft>
+                <a:spcPct val="0"/>
+              </a:spcAft>
+              <a:buClrTx/>
+              <a:buSzTx/>
+              <a:buFontTx/>
+              <a:buNone/>
+              <a:tabLst/>
+            </a:pPr>
+            <a:endParaRPr kumimoji="0" lang="en-US" sz="1200" b="0" i="0" u="none" strike="noStrike" cap="none" normalizeH="0" baseline="0" smtClean="0">
+              <a:ln>
+                <a:noFill/>
+              </a:ln>
+              <a:solidFill>
+                <a:schemeClr val="tx1"/>
+              </a:solidFill>
+              <a:effectLst/>
+              <a:latin typeface="Tahoma" pitchFamily="34" charset="0"/>
+            </a:endParaRPr>
+          </a:p>
+        </p:txBody>
+      </p:sp>
+      <p:sp>
+        <p:nvSpPr>
+          <p:cNvPr id="44" name="Rectangle 43"/>
+          <p:cNvSpPr/>
+          <p:nvPr/>
+        </p:nvSpPr>
+        <p:spPr bwMode="auto">
+          <a:xfrm>
+            <a:off x="4951961" y="622678"/>
+            <a:ext cx="3999413" cy="5463294"/>
+          </a:xfrm>
+          <a:prstGeom prst="rect">
+            <a:avLst/>
+          </a:prstGeom>
+          <a:noFill/>
+          <a:ln w="9525" cap="flat" cmpd="sng" algn="ctr">
+            <a:solidFill>
+              <a:srgbClr val="C00000"/>
+            </a:solidFill>
+            <a:prstDash val="solid"/>
+            <a:round/>
+            <a:headEnd type="none" w="med" len="med"/>
+            <a:tailEnd type="none" w="med" len="med"/>
+          </a:ln>
+          <a:effectLst/>
+        </p:spPr>
+        <p:txBody>
+          <a:bodyPr vert="horz" wrap="square" lIns="91440" tIns="45720" rIns="91440" bIns="45720" numCol="1" rtlCol="0" anchor="t" anchorCtr="0" compatLnSpc="1">
+            <a:prstTxWarp prst="textNoShape">
+              <a:avLst/>
+            </a:prstTxWarp>
+            <a:noAutofit/>
+          </a:bodyPr>
+          <a:lstStyle/>
+          <a:p>
+            <a:pPr marL="0" marR="0" indent="0" algn="ctr" defTabSz="914400" rtl="0" eaLnBrk="1" fontAlgn="base" latinLnBrk="0" hangingPunct="1">
+              <a:lnSpc>
+                <a:spcPct val="100000"/>
+              </a:lnSpc>
+              <a:spcBef>
+                <a:spcPct val="50000"/>
+              </a:spcBef>
+              <a:spcAft>
+                <a:spcPct val="0"/>
+              </a:spcAft>
+              <a:buClrTx/>
+              <a:buSzTx/>
+              <a:buFontTx/>
+              <a:buNone/>
+              <a:tabLst/>
+            </a:pPr>
+            <a:endParaRPr kumimoji="0" lang="en-US" sz="1200" b="0" i="0" u="none" strike="noStrike" cap="none" normalizeH="0" baseline="0" smtClean="0">
+              <a:ln>
+                <a:noFill/>
+              </a:ln>
+              <a:solidFill>
+                <a:schemeClr val="tx1"/>
+              </a:solidFill>
+              <a:effectLst/>
+              <a:latin typeface="Tahoma" pitchFamily="34" charset="0"/>
+            </a:endParaRPr>
+          </a:p>
+        </p:txBody>
+      </p:sp>
+      <p:cxnSp>
+        <p:nvCxnSpPr>
+          <p:cNvPr id="46" name="Straight Arrow Connector 45"/>
+          <p:cNvCxnSpPr/>
+          <p:nvPr/>
+        </p:nvCxnSpPr>
+        <p:spPr bwMode="auto">
+          <a:xfrm flipV="1">
+            <a:off x="3396444" y="651216"/>
+            <a:ext cx="1574911" cy="3215428"/>
+          </a:xfrm>
+          <a:prstGeom prst="straightConnector1">
+            <a:avLst/>
+          </a:prstGeom>
+          <a:noFill/>
+          <a:ln w="9525" cap="flat" cmpd="sng" algn="ctr">
+            <a:solidFill>
+              <a:srgbClr val="C00000"/>
+            </a:solidFill>
+            <a:prstDash val="solid"/>
+            <a:round/>
+            <a:headEnd type="none" w="med" len="med"/>
+            <a:tailEnd type="arrow"/>
+          </a:ln>
+          <a:effectLst/>
+        </p:spPr>
+      </p:cxnSp>
+      <p:cxnSp>
+        <p:nvCxnSpPr>
+          <p:cNvPr id="48" name="Straight Arrow Connector 47"/>
+          <p:cNvCxnSpPr/>
+          <p:nvPr/>
+        </p:nvCxnSpPr>
+        <p:spPr bwMode="auto">
+          <a:xfrm>
+            <a:off x="3396444" y="4266407"/>
+            <a:ext cx="1574911" cy="1702235"/>
+          </a:xfrm>
+          <a:prstGeom prst="straightConnector1">
+            <a:avLst/>
+          </a:prstGeom>
+          <a:noFill/>
+          <a:ln w="9525" cap="flat" cmpd="sng" algn="ctr">
+            <a:solidFill>
+              <a:srgbClr val="C00000"/>
+            </a:solidFill>
+            <a:prstDash val="solid"/>
+            <a:round/>
+            <a:headEnd type="none" w="med" len="med"/>
+            <a:tailEnd type="arrow"/>
+          </a:ln>
+          <a:effectLst/>
+        </p:spPr>
+      </p:cxnSp>
+    </p:spTree>
+    <p:extLst>
+      <p:ext uri="{BB962C8B-B14F-4D97-AF65-F5344CB8AC3E}">
+        <p14:creationId xmlns:p14="http://schemas.microsoft.com/office/powerpoint/2010/main" val="5467138"/>
       </p:ext>
     </p:extLst>
   </p:cSld>

</xml_diff>

<commit_message>
Updating the example combined figure to include the possiblly thrown exception
</commit_message>
<xml_diff>
--- a/figures/Figures.pptx
+++ b/figures/Figures.pptx
@@ -7915,7 +7915,7 @@
         </p:nvSpPr>
         <p:spPr>
           <a:xfrm>
-            <a:off x="5904665" y="1027362"/>
+            <a:off x="5889680" y="856134"/>
             <a:ext cx="2123974" cy="646331"/>
           </a:xfrm>
           <a:prstGeom prst="rect">
@@ -8035,7 +8035,7 @@
         </p:nvSpPr>
         <p:spPr>
           <a:xfrm>
-            <a:off x="5558360" y="2001144"/>
+            <a:off x="5543375" y="1829916"/>
             <a:ext cx="2816584" cy="646331"/>
           </a:xfrm>
           <a:prstGeom prst="rect">
@@ -8155,8 +8155,8 @@
         </p:nvSpPr>
         <p:spPr>
           <a:xfrm>
-            <a:off x="5040616" y="3109563"/>
-            <a:ext cx="1985452" cy="646331"/>
+            <a:off x="5021073" y="2681493"/>
+            <a:ext cx="1985452" cy="1754327"/>
           </a:xfrm>
           <a:prstGeom prst="rect">
             <a:avLst/>
@@ -8253,10 +8253,72 @@
               </a:rPr>
               <a:t>)</a:t>
             </a:r>
+          </a:p>
+          <a:p>
+            <a:pPr algn="ctr"/>
+            <a:r>
+              <a:rPr lang="en-US" sz="1800" b="1" dirty="0" smtClean="0">
+                <a:solidFill>
+                  <a:srgbClr val="000080"/>
+                </a:solidFill>
+                <a:latin typeface="Courier"/>
+                <a:cs typeface="Courier"/>
+              </a:rPr>
+              <a:t>throws </a:t>
+            </a:r>
+          </a:p>
+          <a:p>
+            <a:pPr algn="ctr"/>
+            <a:r>
+              <a:rPr lang="en-US" sz="1800" dirty="0" err="1" smtClean="0">
+                <a:solidFill>
+                  <a:srgbClr val="000000"/>
+                </a:solidFill>
+                <a:latin typeface="Courier"/>
+                <a:cs typeface="Courier"/>
+              </a:rPr>
+              <a:t>IndexOutOf</a:t>
+            </a:r>
             <a:endParaRPr lang="en-US" sz="1800" dirty="0" smtClean="0">
+              <a:solidFill>
+                <a:srgbClr val="000000"/>
+              </a:solidFill>
               <a:latin typeface="Courier"/>
               <a:cs typeface="Courier"/>
             </a:endParaRPr>
+          </a:p>
+          <a:p>
+            <a:pPr algn="ctr"/>
+            <a:r>
+              <a:rPr lang="en-US" sz="1800" dirty="0" smtClean="0">
+                <a:solidFill>
+                  <a:srgbClr val="000000"/>
+                </a:solidFill>
+                <a:latin typeface="Courier"/>
+                <a:cs typeface="Courier"/>
+              </a:rPr>
+              <a:t>Bounds</a:t>
+            </a:r>
+          </a:p>
+          <a:p>
+            <a:pPr algn="ctr"/>
+            <a:r>
+              <a:rPr lang="en-US" sz="1800" dirty="0" smtClean="0">
+                <a:solidFill>
+                  <a:srgbClr val="000000"/>
+                </a:solidFill>
+                <a:latin typeface="Courier"/>
+                <a:cs typeface="Courier"/>
+              </a:rPr>
+              <a:t>Exception</a:t>
+            </a:r>
+            <a:r>
+              <a:rPr lang="en-US" sz="1800" dirty="0" smtClean="0">
+                <a:latin typeface="Courier"/>
+                <a:cs typeface="Courier"/>
+              </a:rPr>
+              <a:t> </a:t>
+            </a:r>
           </a:p>
         </p:txBody>
       </p:sp>
@@ -8268,7 +8330,7 @@
         </p:nvSpPr>
         <p:spPr>
           <a:xfrm>
-            <a:off x="4971355" y="3995064"/>
+            <a:off x="5889680" y="4523017"/>
             <a:ext cx="2123974" cy="646331"/>
           </a:xfrm>
           <a:prstGeom prst="rect">
@@ -8381,7 +8443,7 @@
         </p:nvSpPr>
         <p:spPr>
           <a:xfrm>
-            <a:off x="4971355" y="5322311"/>
+            <a:off x="5889680" y="5422194"/>
             <a:ext cx="2123974" cy="646331"/>
           </a:xfrm>
           <a:prstGeom prst="rect">
@@ -8494,7 +8556,7 @@
         </p:nvSpPr>
         <p:spPr>
           <a:xfrm>
-            <a:off x="7281591" y="3109563"/>
+            <a:off x="7438572" y="2681493"/>
             <a:ext cx="1569886" cy="646331"/>
           </a:xfrm>
           <a:prstGeom prst="rect">
@@ -8577,7 +8639,7 @@
         </p:nvSpPr>
         <p:spPr>
           <a:xfrm>
-            <a:off x="7420113" y="3995064"/>
+            <a:off x="7577094" y="3566994"/>
             <a:ext cx="1292842" cy="646331"/>
           </a:xfrm>
           <a:prstGeom prst="rect">
@@ -8633,7 +8695,7 @@
         </p:nvCxnSpPr>
         <p:spPr bwMode="auto">
           <a:xfrm>
-            <a:off x="6966652" y="1673693"/>
+            <a:off x="6951667" y="1502465"/>
             <a:ext cx="0" cy="327451"/>
           </a:xfrm>
           <a:prstGeom prst="straightConnector1">
@@ -8663,8 +8725,8 @@
         </p:nvCxnSpPr>
         <p:spPr bwMode="auto">
           <a:xfrm flipH="1">
-            <a:off x="6033342" y="2647475"/>
-            <a:ext cx="933310" cy="462088"/>
+            <a:off x="6013799" y="2476247"/>
+            <a:ext cx="937868" cy="205246"/>
           </a:xfrm>
           <a:prstGeom prst="straightConnector1">
             <a:avLst/>
@@ -8685,16 +8747,13 @@
       <p:cxnSp>
         <p:nvCxnSpPr>
           <p:cNvPr id="33" name="Straight Arrow Connector 32"/>
-          <p:cNvCxnSpPr>
-            <a:stCxn id="27" idx="2"/>
-            <a:endCxn id="28" idx="0"/>
-          </p:cNvCxnSpPr>
+          <p:cNvCxnSpPr/>
           <p:nvPr/>
         </p:nvCxnSpPr>
         <p:spPr bwMode="auto">
           <a:xfrm>
-            <a:off x="6033342" y="4641395"/>
-            <a:ext cx="0" cy="680916"/>
+            <a:off x="6951667" y="5169348"/>
+            <a:ext cx="0" cy="252846"/>
           </a:xfrm>
           <a:prstGeom prst="straightConnector1">
             <a:avLst/>
@@ -8723,7 +8782,7 @@
         </p:nvCxnSpPr>
         <p:spPr bwMode="auto">
           <a:xfrm>
-            <a:off x="8066534" y="3755894"/>
+            <a:off x="8223515" y="3327824"/>
             <a:ext cx="0" cy="239170"/>
           </a:xfrm>
           <a:prstGeom prst="straightConnector1">
@@ -8746,14 +8805,15 @@
         <p:nvCxnSpPr>
           <p:cNvPr id="35" name="Straight Arrow Connector 34"/>
           <p:cNvCxnSpPr>
+            <a:stCxn id="44" idx="0"/>
             <a:endCxn id="24" idx="0"/>
           </p:cNvCxnSpPr>
           <p:nvPr/>
         </p:nvCxnSpPr>
         <p:spPr bwMode="auto">
-          <a:xfrm>
-            <a:off x="6966652" y="651216"/>
-            <a:ext cx="0" cy="376146"/>
+          <a:xfrm flipH="1">
+            <a:off x="6951667" y="622678"/>
+            <a:ext cx="6015" cy="233456"/>
           </a:xfrm>
           <a:prstGeom prst="straightConnector1">
             <a:avLst/>
@@ -8781,7 +8841,7 @@
         </p:nvCxnSpPr>
         <p:spPr bwMode="auto">
           <a:xfrm>
-            <a:off x="8066534" y="4641395"/>
+            <a:off x="8223515" y="4213325"/>
             <a:ext cx="0" cy="523954"/>
           </a:xfrm>
           <a:prstGeom prst="straightConnector1">
@@ -8811,8 +8871,8 @@
         </p:nvCxnSpPr>
         <p:spPr bwMode="auto">
           <a:xfrm>
-            <a:off x="6966652" y="2647475"/>
-            <a:ext cx="1099882" cy="462088"/>
+            <a:off x="6951667" y="2476247"/>
+            <a:ext cx="1271848" cy="205246"/>
           </a:xfrm>
           <a:prstGeom prst="straightConnector1">
             <a:avLst/>
@@ -8832,121 +8892,13 @@
       </p:cxnSp>
       <p:sp>
         <p:nvSpPr>
-          <p:cNvPr id="38" name="Freeform 37"/>
-          <p:cNvSpPr/>
-          <p:nvPr/>
-        </p:nvSpPr>
-        <p:spPr>
-          <a:xfrm>
-            <a:off x="6037681" y="2668288"/>
-            <a:ext cx="1154177" cy="1369817"/>
-          </a:xfrm>
-          <a:custGeom>
-            <a:avLst/>
-            <a:gdLst>
-              <a:gd name="connsiteX0" fmla="*/ 927600 w 1154177"/>
-              <a:gd name="connsiteY0" fmla="*/ 0 h 1369817"/>
-              <a:gd name="connsiteX1" fmla="*/ 1141662 w 1154177"/>
-              <a:gd name="connsiteY1" fmla="*/ 984556 h 1369817"/>
-              <a:gd name="connsiteX2" fmla="*/ 599372 w 1154177"/>
-              <a:gd name="connsiteY2" fmla="*/ 1241396 h 1369817"/>
-              <a:gd name="connsiteX3" fmla="*/ 0 w 1154177"/>
-              <a:gd name="connsiteY3" fmla="*/ 1369817 h 1369817"/>
-            </a:gdLst>
-            <a:ahLst/>
-            <a:cxnLst>
-              <a:cxn ang="0">
-                <a:pos x="connsiteX0" y="connsiteY0"/>
-              </a:cxn>
-              <a:cxn ang="0">
-                <a:pos x="connsiteX1" y="connsiteY1"/>
-              </a:cxn>
-              <a:cxn ang="0">
-                <a:pos x="connsiteX2" y="connsiteY2"/>
-              </a:cxn>
-              <a:cxn ang="0">
-                <a:pos x="connsiteX3" y="connsiteY3"/>
-              </a:cxn>
-            </a:cxnLst>
-            <a:rect l="l" t="t" r="r" b="b"/>
-            <a:pathLst>
-              <a:path w="1154177" h="1369817">
-                <a:moveTo>
-                  <a:pt x="927600" y="0"/>
-                </a:moveTo>
-                <a:cubicBezTo>
-                  <a:pt x="1061983" y="388828"/>
-                  <a:pt x="1196367" y="777657"/>
-                  <a:pt x="1141662" y="984556"/>
-                </a:cubicBezTo>
-                <a:cubicBezTo>
-                  <a:pt x="1086957" y="1191455"/>
-                  <a:pt x="789649" y="1177186"/>
-                  <a:pt x="599372" y="1241396"/>
-                </a:cubicBezTo>
-                <a:cubicBezTo>
-                  <a:pt x="409095" y="1305606"/>
-                  <a:pt x="0" y="1369817"/>
-                  <a:pt x="0" y="1369817"/>
-                </a:cubicBezTo>
-              </a:path>
-            </a:pathLst>
-          </a:custGeom>
-          <a:ln>
-            <a:solidFill>
-              <a:srgbClr val="000000"/>
-            </a:solidFill>
-            <a:headEnd type="none"/>
-            <a:tailEnd type="arrow"/>
-          </a:ln>
-        </p:spPr>
-        <p:txBody>
-          <a:bodyPr vert="horz" wrap="square" lIns="91440" tIns="45720" rIns="91440" bIns="45720" numCol="1" rtlCol="0" anchor="t" anchorCtr="0" compatLnSpc="1">
-            <a:prstTxWarp prst="textNoShape">
-              <a:avLst/>
-            </a:prstTxWarp>
-            <a:spAutoFit/>
-          </a:bodyPr>
-          <a:lstStyle/>
-          <a:p>
-            <a:pPr marL="0" marR="0" indent="0" algn="ctr" defTabSz="914400" rtl="0" eaLnBrk="1" fontAlgn="base" latinLnBrk="0" hangingPunct="1">
-              <a:lnSpc>
-                <a:spcPct val="100000"/>
-              </a:lnSpc>
-              <a:spcBef>
-                <a:spcPct val="50000"/>
-              </a:spcBef>
-              <a:spcAft>
-                <a:spcPct val="0"/>
-              </a:spcAft>
-              <a:buClrTx/>
-              <a:buSzTx/>
-              <a:buFontTx/>
-              <a:buNone/>
-              <a:tabLst/>
-            </a:pPr>
-            <a:endParaRPr kumimoji="0" lang="en-US" sz="1200" b="0" i="0" u="none" strike="noStrike" cap="none" normalizeH="0" baseline="0" smtClean="0">
-              <a:ln>
-                <a:noFill/>
-              </a:ln>
-              <a:solidFill>
-                <a:schemeClr val="tx1"/>
-              </a:solidFill>
-              <a:effectLst/>
-              <a:latin typeface="Tahoma" pitchFamily="34" charset="0"/>
-            </a:endParaRPr>
-          </a:p>
-        </p:txBody>
-      </p:sp>
-      <p:sp>
-        <p:nvSpPr>
           <p:cNvPr id="39" name="TextBox 38"/>
           <p:cNvSpPr txBox="1"/>
           <p:nvPr/>
         </p:nvSpPr>
         <p:spPr>
           <a:xfrm>
-            <a:off x="6094761" y="2568405"/>
+            <a:off x="5837883" y="2254487"/>
             <a:ext cx="487408" cy="369332"/>
           </a:xfrm>
           <a:prstGeom prst="rect">
@@ -8984,7 +8936,7 @@
         </p:nvSpPr>
         <p:spPr>
           <a:xfrm>
-            <a:off x="6632478" y="2735074"/>
+            <a:off x="6936559" y="4028659"/>
             <a:ext cx="487408" cy="369332"/>
           </a:xfrm>
           <a:prstGeom prst="rect">
@@ -9022,7 +8974,7 @@
         </p:nvSpPr>
         <p:spPr>
           <a:xfrm>
-            <a:off x="7512699" y="2568405"/>
+            <a:off x="7912287" y="2254487"/>
             <a:ext cx="487408" cy="369332"/>
           </a:xfrm>
           <a:prstGeom prst="rect">
@@ -9124,8 +9076,8 @@
         </p:nvSpPr>
         <p:spPr bwMode="auto">
           <a:xfrm>
-            <a:off x="4951961" y="622678"/>
-            <a:ext cx="3999413" cy="5463294"/>
+            <a:off x="4992531" y="622678"/>
+            <a:ext cx="3930301" cy="5463294"/>
           </a:xfrm>
           <a:prstGeom prst="rect">
             <a:avLst/>
@@ -9225,6 +9177,36 @@
           <a:ln w="9525" cap="flat" cmpd="sng" algn="ctr">
             <a:solidFill>
               <a:srgbClr val="C00000"/>
+            </a:solidFill>
+            <a:prstDash val="solid"/>
+            <a:round/>
+            <a:headEnd type="none" w="med" len="med"/>
+            <a:tailEnd type="arrow"/>
+          </a:ln>
+          <a:effectLst/>
+        </p:spPr>
+      </p:cxnSp>
+      <p:cxnSp>
+        <p:nvCxnSpPr>
+          <p:cNvPr id="72" name="Straight Arrow Connector 71"/>
+          <p:cNvCxnSpPr>
+            <a:stCxn id="25" idx="2"/>
+            <a:endCxn id="27" idx="0"/>
+          </p:cNvCxnSpPr>
+          <p:nvPr/>
+        </p:nvCxnSpPr>
+        <p:spPr bwMode="auto">
+          <a:xfrm>
+            <a:off x="6951667" y="2476247"/>
+            <a:ext cx="0" cy="2046770"/>
+          </a:xfrm>
+          <a:prstGeom prst="straightConnector1">
+            <a:avLst/>
+          </a:prstGeom>
+          <a:noFill/>
+          <a:ln w="9525" cap="flat" cmpd="sng" algn="ctr">
+            <a:solidFill>
+              <a:srgbClr val="000000"/>
             </a:solidFill>
             <a:prstDash val="solid"/>
             <a:round/>

</xml_diff>

<commit_message>
Adding line numbers to the motivating example source code
</commit_message>
<xml_diff>
--- a/figures/Figures.pptx
+++ b/figures/Figures.pptx
@@ -6744,7 +6744,7 @@
         <p:spPr>
           <a:xfrm>
             <a:off x="613639" y="513676"/>
-            <a:ext cx="3786238" cy="5572296"/>
+            <a:ext cx="4083169" cy="5572296"/>
           </a:xfrm>
           <a:prstGeom prst="rect">
             <a:avLst/>
@@ -6757,7 +6757,7 @@
           </a:bodyPr>
           <a:lstStyle/>
           <a:p>
-            <a:pPr>
+            <a:pPr marL="342900" indent="-342900">
               <a:lnSpc>
                 <a:spcPct val="110000"/>
               </a:lnSpc>
@@ -6767,6 +6767,12 @@
               <a:spcAft>
                 <a:spcPts val="0"/>
               </a:spcAft>
+              <a:buClr>
+                <a:schemeClr val="tx1"/>
+              </a:buClr>
+              <a:buSzPct val="90000"/>
+              <a:buFont typeface="Wingdings" charset="2"/>
+              <a:buAutoNum type="arabicPlain"/>
               <a:tabLst>
                 <a:tab pos="581660" algn="l"/>
                 <a:tab pos="1163320" algn="l"/>
@@ -6787,14 +6793,14 @@
               </a:tabLst>
             </a:pPr>
             <a:r>
-              <a:rPr lang="en-US" sz="1800" b="1" dirty="0">
+              <a:rPr lang="en-US" sz="1800" dirty="0" smtClean="0">
                 <a:solidFill>
                   <a:srgbClr val="008000"/>
                 </a:solidFill>
                 <a:latin typeface="Courier"/>
                 <a:cs typeface="Courier"/>
               </a:rPr>
-              <a:t>/</a:t>
+              <a:t> </a:t>
             </a:r>
             <a:r>
               <a:rPr lang="en-US" sz="1800" b="1" dirty="0" smtClean="0">
@@ -6804,7 +6810,7 @@
                 <a:latin typeface="Courier"/>
                 <a:cs typeface="Courier"/>
               </a:rPr>
-              <a:t>/ </a:t>
+              <a:t>// </a:t>
             </a:r>
             <a:r>
               <a:rPr lang="en-US" sz="1800" b="1" dirty="0" err="1" smtClean="0">
@@ -6828,7 +6834,7 @@
             </a:r>
           </a:p>
           <a:p>
-            <a:pPr>
+            <a:pPr marL="342900" indent="-342900">
               <a:lnSpc>
                 <a:spcPct val="110000"/>
               </a:lnSpc>
@@ -6838,6 +6844,12 @@
               <a:spcAft>
                 <a:spcPts val="0"/>
               </a:spcAft>
+              <a:buClr>
+                <a:schemeClr val="tx1"/>
+              </a:buClr>
+              <a:buSzPct val="90000"/>
+              <a:buFont typeface="Wingdings" charset="2"/>
+              <a:buAutoNum type="arabicPlain"/>
               <a:tabLst>
                 <a:tab pos="581660" algn="l"/>
                 <a:tab pos="1163320" algn="l"/>
@@ -6858,6 +6870,16 @@
               </a:tabLst>
             </a:pPr>
             <a:r>
+              <a:rPr lang="en-US" sz="1800" dirty="0" smtClean="0">
+                <a:solidFill>
+                  <a:srgbClr val="008000"/>
+                </a:solidFill>
+                <a:latin typeface="Courier"/>
+                <a:cs typeface="Courier"/>
+              </a:rPr>
+              <a:t> </a:t>
+            </a:r>
+            <a:r>
               <a:rPr lang="en-US" sz="1800" b="1" dirty="0" smtClean="0">
                 <a:solidFill>
                   <a:srgbClr val="008000"/>
@@ -6876,7 +6898,7 @@
             </a:endParaRPr>
           </a:p>
           <a:p>
-            <a:pPr>
+            <a:pPr marL="342900" indent="-342900">
               <a:lnSpc>
                 <a:spcPct val="110000"/>
               </a:lnSpc>
@@ -6886,6 +6908,12 @@
               <a:spcAft>
                 <a:spcPts val="0"/>
               </a:spcAft>
+              <a:buClr>
+                <a:schemeClr val="tx1"/>
+              </a:buClr>
+              <a:buSzPct val="90000"/>
+              <a:buFont typeface="Wingdings" charset="2"/>
+              <a:buAutoNum type="arabicPlain"/>
               <a:tabLst>
                 <a:tab pos="581660" algn="l"/>
                 <a:tab pos="1163320" algn="l"/>
@@ -6913,7 +6941,7 @@
                 <a:latin typeface="Courier"/>
                 <a:cs typeface="Courier"/>
               </a:rPr>
-              <a:t>List</a:t>
+              <a:t> List</a:t>
             </a:r>
             <a:r>
               <a:rPr lang="en-US" sz="1800" dirty="0">
@@ -6934,7 +6962,7 @@
             </a:endParaRPr>
           </a:p>
           <a:p>
-            <a:pPr>
+            <a:pPr marL="342900" indent="-342900">
               <a:lnSpc>
                 <a:spcPct val="110000"/>
               </a:lnSpc>
@@ -6944,6 +6972,12 @@
               <a:spcAft>
                 <a:spcPts val="0"/>
               </a:spcAft>
+              <a:buClr>
+                <a:schemeClr val="tx1"/>
+              </a:buClr>
+              <a:buSzPct val="90000"/>
+              <a:buFont typeface="Wingdings" charset="2"/>
+              <a:buAutoNum type="arabicPlain"/>
               <a:tabLst>
                 <a:tab pos="581660" algn="l"/>
                 <a:tab pos="1163320" algn="l"/>
@@ -6964,7 +6998,7 @@
               </a:tabLst>
             </a:pPr>
             <a:r>
-              <a:rPr lang="en-US" sz="1800" b="1" dirty="0">
+              <a:rPr lang="en-US" sz="1800" dirty="0">
                 <a:solidFill>
                   <a:srgbClr val="000000"/>
                 </a:solidFill>
@@ -6981,7 +7015,7 @@
                 <a:latin typeface="Courier"/>
                 <a:cs typeface="Courier"/>
               </a:rPr>
-              <a:t> </a:t>
+              <a:t>  </a:t>
             </a:r>
             <a:r>
               <a:rPr lang="en-US" sz="1800" b="1" dirty="0" smtClean="0">
@@ -7031,126 +7065,21 @@
                 <a:latin typeface="Courier"/>
                 <a:cs typeface="Courier"/>
               </a:rPr>
-              <a:t>);</a:t>
-            </a:r>
-            <a:br>
-              <a:rPr lang="en-US" sz="1800" dirty="0">
-                <a:solidFill>
-                  <a:srgbClr val="000000"/>
-                </a:solidFill>
-                <a:latin typeface="Courier"/>
-                <a:cs typeface="Courier"/>
-              </a:rPr>
-            </a:br>
-            <a:r>
-              <a:rPr lang="en-US" sz="1800" dirty="0">
-                <a:solidFill>
-                  <a:srgbClr val="000000"/>
-                </a:solidFill>
-                <a:latin typeface="Courier"/>
-                <a:cs typeface="Courier"/>
-              </a:rPr>
-              <a:t>...</a:t>
-            </a:r>
-            <a:br>
-              <a:rPr lang="en-US" sz="1800" dirty="0">
-                <a:solidFill>
-                  <a:srgbClr val="000000"/>
-                </a:solidFill>
-                <a:latin typeface="Courier"/>
-                <a:cs typeface="Courier"/>
-              </a:rPr>
-            </a:br>
-            <a:r>
-              <a:rPr lang="en-US" sz="1800" b="1" dirty="0">
-                <a:solidFill>
-                  <a:srgbClr val="000080"/>
-                </a:solidFill>
-                <a:latin typeface="Courier"/>
-                <a:cs typeface="Courier"/>
-              </a:rPr>
-              <a:t>for </a:t>
-            </a:r>
-            <a:r>
-              <a:rPr lang="en-US" sz="1800" dirty="0">
-                <a:solidFill>
-                  <a:srgbClr val="000000"/>
-                </a:solidFill>
-                <a:latin typeface="Courier"/>
-                <a:cs typeface="Courier"/>
-              </a:rPr>
-              <a:t>(</a:t>
-            </a:r>
-            <a:r>
-              <a:rPr lang="en-US" sz="1800" b="1" dirty="0" err="1">
-                <a:solidFill>
-                  <a:srgbClr val="000080"/>
-                </a:solidFill>
-                <a:latin typeface="Courier"/>
-                <a:cs typeface="Courier"/>
-              </a:rPr>
-              <a:t>int</a:t>
-            </a:r>
-            <a:r>
-              <a:rPr lang="en-US" sz="1800" b="1" dirty="0">
-                <a:solidFill>
-                  <a:srgbClr val="000080"/>
-                </a:solidFill>
-                <a:latin typeface="Courier"/>
-                <a:cs typeface="Courier"/>
-              </a:rPr>
-              <a:t> </a:t>
-            </a:r>
-            <a:r>
-              <a:rPr lang="en-US" sz="1800" dirty="0" err="1">
-                <a:solidFill>
-                  <a:srgbClr val="000000"/>
-                </a:solidFill>
-                <a:latin typeface="Courier"/>
-                <a:cs typeface="Courier"/>
-              </a:rPr>
-              <a:t>i</a:t>
-            </a:r>
-            <a:r>
-              <a:rPr lang="en-US" sz="1800" dirty="0">
-                <a:solidFill>
-                  <a:srgbClr val="000000"/>
-                </a:solidFill>
-                <a:latin typeface="Courier"/>
-                <a:cs typeface="Courier"/>
-              </a:rPr>
-              <a:t> = </a:t>
-            </a:r>
-            <a:r>
-              <a:rPr lang="en-US" sz="1800" dirty="0">
-                <a:solidFill>
-                  <a:srgbClr val="0000FF"/>
-                </a:solidFill>
-                <a:latin typeface="Courier"/>
-                <a:cs typeface="Courier"/>
-              </a:rPr>
-              <a:t>0</a:t>
-            </a:r>
-            <a:r>
-              <a:rPr lang="en-US" sz="1800" dirty="0">
-                <a:solidFill>
-                  <a:srgbClr val="000000"/>
-                </a:solidFill>
-                <a:latin typeface="Courier"/>
-                <a:cs typeface="Courier"/>
-              </a:rPr>
-              <a:t>; </a:t>
-            </a:r>
-            <a:endParaRPr lang="en-US" sz="1800" dirty="0" smtClean="0">
-              <a:solidFill>
-                <a:srgbClr val="000000"/>
-              </a:solidFill>
-              <a:latin typeface="Courier"/>
-              <a:cs typeface="Courier"/>
-            </a:endParaRPr>
-          </a:p>
-          <a:p>
-            <a:pPr>
+              <a:t>)</a:t>
+            </a:r>
+            <a:r>
+              <a:rPr lang="en-US" sz="1800" dirty="0" smtClean="0">
+                <a:solidFill>
+                  <a:srgbClr val="000000"/>
+                </a:solidFill>
+                <a:latin typeface="Courier"/>
+                <a:cs typeface="Courier"/>
+              </a:rPr>
+              <a:t>;</a:t>
+            </a:r>
+          </a:p>
+          <a:p>
+            <a:pPr marL="342900" indent="-342900">
               <a:lnSpc>
                 <a:spcPct val="110000"/>
               </a:lnSpc>
@@ -7160,6 +7089,12 @@
               <a:spcAft>
                 <a:spcPts val="0"/>
               </a:spcAft>
+              <a:buClr>
+                <a:schemeClr val="tx1"/>
+              </a:buClr>
+              <a:buSzPct val="90000"/>
+              <a:buFont typeface="Wingdings" charset="2"/>
+              <a:buAutoNum type="arabicPlain"/>
               <a:tabLst>
                 <a:tab pos="581660" algn="l"/>
                 <a:tab pos="1163320" algn="l"/>
@@ -7180,16 +7115,6 @@
               </a:tabLst>
             </a:pPr>
             <a:r>
-              <a:rPr lang="en-US" sz="1800" dirty="0">
-                <a:solidFill>
-                  <a:srgbClr val="000000"/>
-                </a:solidFill>
-                <a:latin typeface="Courier"/>
-                <a:cs typeface="Courier"/>
-              </a:rPr>
-              <a:t> </a:t>
-            </a:r>
-            <a:r>
               <a:rPr lang="en-US" sz="1800" dirty="0" smtClean="0">
                 <a:solidFill>
                   <a:srgbClr val="000000"/>
@@ -7197,68 +7122,11 @@
                 <a:latin typeface="Courier"/>
                 <a:cs typeface="Courier"/>
               </a:rPr>
-              <a:t>    </a:t>
-            </a:r>
-            <a:r>
-              <a:rPr lang="en-US" sz="1800" dirty="0" err="1" smtClean="0">
-                <a:solidFill>
-                  <a:srgbClr val="000000"/>
-                </a:solidFill>
-                <a:latin typeface="Courier"/>
-                <a:cs typeface="Courier"/>
-              </a:rPr>
-              <a:t>i</a:t>
-            </a:r>
-            <a:r>
-              <a:rPr lang="en-US" sz="1800" dirty="0" smtClean="0">
-                <a:solidFill>
-                  <a:srgbClr val="000000"/>
-                </a:solidFill>
-                <a:latin typeface="Courier"/>
-                <a:cs typeface="Courier"/>
-              </a:rPr>
-              <a:t> </a:t>
-            </a:r>
-            <a:r>
-              <a:rPr lang="en-US" sz="1800" dirty="0">
-                <a:solidFill>
-                  <a:srgbClr val="000000"/>
-                </a:solidFill>
-                <a:latin typeface="Courier"/>
-                <a:cs typeface="Courier"/>
-              </a:rPr>
-              <a:t>&lt; </a:t>
-            </a:r>
-            <a:r>
-              <a:rPr lang="en-US" sz="1800" dirty="0" err="1">
-                <a:solidFill>
-                  <a:srgbClr val="000000"/>
-                </a:solidFill>
-                <a:latin typeface="Courier"/>
-                <a:cs typeface="Courier"/>
-              </a:rPr>
-              <a:t>list.size</a:t>
-            </a:r>
-            <a:r>
-              <a:rPr lang="en-US" sz="1800" dirty="0">
-                <a:solidFill>
-                  <a:srgbClr val="000000"/>
-                </a:solidFill>
-                <a:latin typeface="Courier"/>
-                <a:cs typeface="Courier"/>
-              </a:rPr>
-              <a:t>(); </a:t>
-            </a:r>
-            <a:endParaRPr lang="en-US" sz="1800" dirty="0" smtClean="0">
-              <a:solidFill>
-                <a:srgbClr val="000000"/>
-              </a:solidFill>
-              <a:latin typeface="Courier"/>
-              <a:cs typeface="Courier"/>
-            </a:endParaRPr>
-          </a:p>
-          <a:p>
-            <a:pPr>
+              <a:t> ...</a:t>
+            </a:r>
+          </a:p>
+          <a:p>
+            <a:pPr marL="342900" indent="-342900">
               <a:lnSpc>
                 <a:spcPct val="110000"/>
               </a:lnSpc>
@@ -7268,6 +7136,12 @@
               <a:spcAft>
                 <a:spcPts val="0"/>
               </a:spcAft>
+              <a:buClr>
+                <a:schemeClr val="tx1"/>
+              </a:buClr>
+              <a:buSzPct val="90000"/>
+              <a:buFont typeface="Wingdings" charset="2"/>
+              <a:buAutoNum type="arabicPlain"/>
               <a:tabLst>
                 <a:tab pos="581660" algn="l"/>
                 <a:tab pos="1163320" algn="l"/>
@@ -7288,6 +7162,26 @@
               </a:tabLst>
             </a:pPr>
             <a:r>
+              <a:rPr lang="en-US" sz="1800" dirty="0" smtClean="0">
+                <a:solidFill>
+                  <a:srgbClr val="000000"/>
+                </a:solidFill>
+                <a:latin typeface="Courier"/>
+                <a:cs typeface="Courier"/>
+              </a:rPr>
+              <a:t> </a:t>
+            </a:r>
+            <a:r>
+              <a:rPr lang="en-US" sz="1800" b="1" dirty="0" smtClean="0">
+                <a:solidFill>
+                  <a:srgbClr val="000080"/>
+                </a:solidFill>
+                <a:latin typeface="Courier"/>
+                <a:cs typeface="Courier"/>
+              </a:rPr>
+              <a:t>for </a:t>
+            </a:r>
+            <a:r>
               <a:rPr lang="en-US" sz="1800" dirty="0">
                 <a:solidFill>
                   <a:srgbClr val="000000"/>
@@ -7295,20 +7189,30 @@
                 <a:latin typeface="Courier"/>
                 <a:cs typeface="Courier"/>
               </a:rPr>
+              <a:t>(</a:t>
+            </a:r>
+            <a:r>
+              <a:rPr lang="en-US" sz="1800" b="1" dirty="0" err="1">
+                <a:solidFill>
+                  <a:srgbClr val="000080"/>
+                </a:solidFill>
+                <a:latin typeface="Courier"/>
+                <a:cs typeface="Courier"/>
+              </a:rPr>
+              <a:t>int</a:t>
+            </a:r>
+            <a:r>
+              <a:rPr lang="en-US" sz="1800" b="1" dirty="0">
+                <a:solidFill>
+                  <a:srgbClr val="000080"/>
+                </a:solidFill>
+                <a:latin typeface="Courier"/>
+                <a:cs typeface="Courier"/>
+              </a:rPr>
               <a:t> </a:t>
             </a:r>
             <a:r>
-              <a:rPr lang="en-US" sz="1800" dirty="0" smtClean="0">
-                <a:solidFill>
-                  <a:srgbClr val="000000"/>
-                </a:solidFill>
-                <a:latin typeface="Courier"/>
-                <a:cs typeface="Courier"/>
-              </a:rPr>
-              <a:t>    </a:t>
-            </a:r>
-            <a:r>
-              <a:rPr lang="en-US" sz="1800" dirty="0" err="1" smtClean="0">
+              <a:rPr lang="en-US" sz="1800" dirty="0" err="1">
                 <a:solidFill>
                   <a:srgbClr val="000000"/>
                 </a:solidFill>
@@ -7325,21 +7229,38 @@
                 <a:latin typeface="Courier"/>
                 <a:cs typeface="Courier"/>
               </a:rPr>
-              <a:t>++) </a:t>
-            </a:r>
-            <a:r>
-              <a:rPr lang="en-US" sz="1800" dirty="0" smtClean="0">
-                <a:solidFill>
-                  <a:srgbClr val="000000"/>
-                </a:solidFill>
-                <a:latin typeface="Courier"/>
-                <a:cs typeface="Courier"/>
-              </a:rPr>
-              <a:t>{</a:t>
-            </a:r>
-          </a:p>
-          <a:p>
-            <a:pPr>
+              <a:t> = </a:t>
+            </a:r>
+            <a:r>
+              <a:rPr lang="en-US" sz="1800" dirty="0">
+                <a:solidFill>
+                  <a:srgbClr val="0000FF"/>
+                </a:solidFill>
+                <a:latin typeface="Courier"/>
+                <a:cs typeface="Courier"/>
+              </a:rPr>
+              <a:t>0</a:t>
+            </a:r>
+            <a:r>
+              <a:rPr lang="en-US" sz="1800" dirty="0">
+                <a:solidFill>
+                  <a:srgbClr val="000000"/>
+                </a:solidFill>
+                <a:latin typeface="Courier"/>
+                <a:cs typeface="Courier"/>
+              </a:rPr>
+              <a:t>; </a:t>
+            </a:r>
+            <a:endParaRPr lang="en-US" sz="1800" dirty="0" smtClean="0">
+              <a:solidFill>
+                <a:srgbClr val="000000"/>
+              </a:solidFill>
+              <a:latin typeface="Courier"/>
+              <a:cs typeface="Courier"/>
+            </a:endParaRPr>
+          </a:p>
+          <a:p>
+            <a:pPr marL="342900" indent="-342900">
               <a:lnSpc>
                 <a:spcPct val="110000"/>
               </a:lnSpc>
@@ -7349,6 +7270,12 @@
               <a:spcAft>
                 <a:spcPts val="0"/>
               </a:spcAft>
+              <a:buClr>
+                <a:schemeClr val="tx1"/>
+              </a:buClr>
+              <a:buSzPct val="90000"/>
+              <a:buFont typeface="Wingdings" charset="2"/>
+              <a:buAutoNum type="arabicPlain"/>
               <a:tabLst>
                 <a:tab pos="581660" algn="l"/>
                 <a:tab pos="1163320" algn="l"/>
@@ -7369,39 +7296,29 @@
               </a:tabLst>
             </a:pPr>
             <a:r>
-              <a:rPr lang="en-US" sz="1800" b="1" dirty="0" smtClean="0">
-                <a:solidFill>
-                  <a:srgbClr val="008000"/>
-                </a:solidFill>
-                <a:latin typeface="Courier"/>
-                <a:cs typeface="Courier"/>
-              </a:rPr>
-              <a:t>// </a:t>
-            </a:r>
-            <a:r>
-              <a:rPr lang="en-US" sz="1800" b="1" dirty="0" err="1" smtClean="0">
-                <a:solidFill>
-                  <a:srgbClr val="008000"/>
-                </a:solidFill>
-                <a:latin typeface="Courier"/>
-                <a:cs typeface="Courier"/>
-              </a:rPr>
-              <a:t>list.get</a:t>
-            </a:r>
-            <a:r>
-              <a:rPr lang="en-US" sz="1800" b="1" dirty="0" smtClean="0">
-                <a:solidFill>
-                  <a:srgbClr val="008000"/>
-                </a:solidFill>
-                <a:latin typeface="Courier"/>
-                <a:cs typeface="Courier"/>
-              </a:rPr>
-              <a:t>(</a:t>
-            </a:r>
-            <a:r>
-              <a:rPr lang="en-US" sz="1800" b="1" dirty="0" err="1" smtClean="0">
-                <a:solidFill>
-                  <a:srgbClr val="008000"/>
+              <a:rPr lang="en-US" sz="1800" dirty="0">
+                <a:solidFill>
+                  <a:srgbClr val="000000"/>
+                </a:solidFill>
+                <a:latin typeface="Courier"/>
+                <a:cs typeface="Courier"/>
+              </a:rPr>
+              <a:t> </a:t>
+            </a:r>
+            <a:r>
+              <a:rPr lang="en-US" sz="1800" dirty="0" smtClean="0">
+                <a:solidFill>
+                  <a:srgbClr val="000000"/>
+                </a:solidFill>
+                <a:latin typeface="Courier"/>
+                <a:cs typeface="Courier"/>
+              </a:rPr>
+              <a:t>     </a:t>
+            </a:r>
+            <a:r>
+              <a:rPr lang="en-US" sz="1800" dirty="0" err="1" smtClean="0">
+                <a:solidFill>
+                  <a:srgbClr val="000000"/>
                 </a:solidFill>
                 <a:latin typeface="Courier"/>
                 <a:cs typeface="Courier"/>
@@ -7409,18 +7326,55 @@
               <a:t>i</a:t>
             </a:r>
             <a:r>
-              <a:rPr lang="en-US" sz="1800" b="1" dirty="0" smtClean="0">
-                <a:solidFill>
-                  <a:srgbClr val="008000"/>
-                </a:solidFill>
-                <a:latin typeface="Courier"/>
-                <a:cs typeface="Courier"/>
-              </a:rPr>
-              <a:t>) returns</a:t>
-            </a:r>
-          </a:p>
-          <a:p>
-            <a:pPr>
+              <a:rPr lang="en-US" sz="1800" dirty="0" smtClean="0">
+                <a:solidFill>
+                  <a:srgbClr val="000000"/>
+                </a:solidFill>
+                <a:latin typeface="Courier"/>
+                <a:cs typeface="Courier"/>
+              </a:rPr>
+              <a:t> </a:t>
+            </a:r>
+            <a:r>
+              <a:rPr lang="en-US" sz="1800" dirty="0">
+                <a:solidFill>
+                  <a:srgbClr val="000000"/>
+                </a:solidFill>
+                <a:latin typeface="Courier"/>
+                <a:cs typeface="Courier"/>
+              </a:rPr>
+              <a:t>&lt; </a:t>
+            </a:r>
+            <a:r>
+              <a:rPr lang="en-US" sz="1800" dirty="0" err="1">
+                <a:solidFill>
+                  <a:srgbClr val="000000"/>
+                </a:solidFill>
+                <a:latin typeface="Courier"/>
+                <a:cs typeface="Courier"/>
+              </a:rPr>
+              <a:t>list.size</a:t>
+            </a:r>
+            <a:r>
+              <a:rPr lang="en-US" sz="1800" dirty="0">
+                <a:solidFill>
+                  <a:srgbClr val="000000"/>
+                </a:solidFill>
+                <a:latin typeface="Courier"/>
+                <a:cs typeface="Courier"/>
+              </a:rPr>
+              <a:t>(); </a:t>
+            </a:r>
+            <a:endParaRPr lang="en-US" sz="1800" dirty="0" smtClean="0">
+              <a:solidFill>
+                <a:srgbClr val="000000"/>
+              </a:solidFill>
+              <a:latin typeface="Courier"/>
+              <a:cs typeface="Courier"/>
+            </a:endParaRPr>
+          </a:p>
+          <a:p>
+            <a:pPr marL="342900" indent="-342900">
               <a:lnSpc>
                 <a:spcPct val="110000"/>
               </a:lnSpc>
@@ -7430,6 +7384,12 @@
               <a:spcAft>
                 <a:spcPts val="0"/>
               </a:spcAft>
+              <a:buClr>
+                <a:schemeClr val="tx1"/>
+              </a:buClr>
+              <a:buSzPct val="90000"/>
+              <a:buFont typeface="Wingdings" charset="2"/>
+              <a:buAutoNum type="arabicPlain"/>
               <a:tabLst>
                 <a:tab pos="581660" algn="l"/>
                 <a:tab pos="1163320" algn="l"/>
@@ -7450,16 +7410,6 @@
               </a:tabLst>
             </a:pPr>
             <a:r>
-              <a:rPr lang="en-US" sz="1800" b="1" dirty="0" smtClean="0">
-                <a:solidFill>
-                  <a:srgbClr val="008000"/>
-                </a:solidFill>
-                <a:latin typeface="Courier"/>
-                <a:cs typeface="Courier"/>
-              </a:rPr>
-              <a:t>// symbolic integer </a:t>
-            </a:r>
-            <a:r>
               <a:rPr lang="en-US" sz="1800" dirty="0">
                 <a:solidFill>
                   <a:srgbClr val="000000"/>
@@ -7467,9 +7417,29 @@
                 <a:latin typeface="Courier"/>
                 <a:cs typeface="Courier"/>
               </a:rPr>
-              <a:t/>
-            </a:r>
-            <a:br>
+              <a:t> </a:t>
+            </a:r>
+            <a:r>
+              <a:rPr lang="en-US" sz="1800" dirty="0" smtClean="0">
+                <a:solidFill>
+                  <a:srgbClr val="000000"/>
+                </a:solidFill>
+                <a:latin typeface="Courier"/>
+                <a:cs typeface="Courier"/>
+              </a:rPr>
+              <a:t>     </a:t>
+            </a:r>
+            <a:r>
+              <a:rPr lang="en-US" sz="1800" dirty="0" err="1" smtClean="0">
+                <a:solidFill>
+                  <a:srgbClr val="000000"/>
+                </a:solidFill>
+                <a:latin typeface="Courier"/>
+                <a:cs typeface="Courier"/>
+              </a:rPr>
+              <a:t>i</a:t>
+            </a:r>
+            <a:r>
               <a:rPr lang="en-US" sz="1800" dirty="0">
                 <a:solidFill>
                   <a:srgbClr val="000000"/>
@@ -7477,87 +7447,21 @@
                 <a:latin typeface="Courier"/>
                 <a:cs typeface="Courier"/>
               </a:rPr>
-            </a:br>
-            <a:r>
-              <a:rPr lang="en-US" sz="1800" dirty="0">
-                <a:solidFill>
-                  <a:srgbClr val="000000"/>
-                </a:solidFill>
-                <a:latin typeface="Courier"/>
-                <a:cs typeface="Courier"/>
-              </a:rPr>
-              <a:t>    </a:t>
-            </a:r>
-            <a:r>
-              <a:rPr lang="en-US" sz="1800" b="1" dirty="0">
-                <a:solidFill>
-                  <a:srgbClr val="000080"/>
-                </a:solidFill>
-                <a:latin typeface="Courier"/>
-                <a:cs typeface="Courier"/>
-              </a:rPr>
-              <a:t>if </a:t>
-            </a:r>
-            <a:r>
-              <a:rPr lang="en-US" sz="1800" dirty="0">
-                <a:solidFill>
-                  <a:srgbClr val="000000"/>
-                </a:solidFill>
-                <a:latin typeface="Courier"/>
-                <a:cs typeface="Courier"/>
-              </a:rPr>
-              <a:t>(i%</a:t>
-            </a:r>
-            <a:r>
-              <a:rPr lang="en-US" sz="1800" dirty="0">
-                <a:solidFill>
-                  <a:srgbClr val="0000FF"/>
-                </a:solidFill>
-                <a:latin typeface="Courier"/>
-                <a:cs typeface="Courier"/>
-              </a:rPr>
-              <a:t>2 </a:t>
-            </a:r>
-            <a:r>
-              <a:rPr lang="en-US" sz="1800" dirty="0">
-                <a:solidFill>
-                  <a:srgbClr val="000000"/>
-                </a:solidFill>
-                <a:latin typeface="Courier"/>
-                <a:cs typeface="Courier"/>
-              </a:rPr>
-              <a:t>== </a:t>
-            </a:r>
-            <a:r>
-              <a:rPr lang="en-US" sz="1800" dirty="0">
-                <a:solidFill>
-                  <a:srgbClr val="0000FF"/>
-                </a:solidFill>
-                <a:latin typeface="Courier"/>
-                <a:cs typeface="Courier"/>
-              </a:rPr>
-              <a:t>0 </a:t>
-            </a:r>
-            <a:r>
-              <a:rPr lang="en-US" sz="1800" dirty="0">
-                <a:solidFill>
-                  <a:srgbClr val="000000"/>
-                </a:solidFill>
-                <a:latin typeface="Courier"/>
-                <a:cs typeface="Courier"/>
-              </a:rPr>
-              <a:t>&amp;&amp; </a:t>
-            </a:r>
-            <a:endParaRPr lang="en-US" sz="1800" dirty="0" smtClean="0">
-              <a:solidFill>
-                <a:srgbClr val="000000"/>
-              </a:solidFill>
-              <a:latin typeface="Courier"/>
-              <a:cs typeface="Courier"/>
-            </a:endParaRPr>
-          </a:p>
-          <a:p>
-            <a:pPr>
+              <a:t>++) </a:t>
+            </a:r>
+            <a:r>
+              <a:rPr lang="en-US" sz="1800" dirty="0" smtClean="0">
+                <a:solidFill>
+                  <a:srgbClr val="000000"/>
+                </a:solidFill>
+                <a:latin typeface="Courier"/>
+                <a:cs typeface="Courier"/>
+              </a:rPr>
+              <a:t>{</a:t>
+            </a:r>
+          </a:p>
+          <a:p>
+            <a:pPr marL="342900" indent="-342900">
               <a:lnSpc>
                 <a:spcPct val="110000"/>
               </a:lnSpc>
@@ -7567,6 +7471,12 @@
               <a:spcAft>
                 <a:spcPts val="0"/>
               </a:spcAft>
+              <a:buClr>
+                <a:schemeClr val="tx1"/>
+              </a:buClr>
+              <a:buSzPct val="90000"/>
+              <a:buFont typeface="Wingdings" charset="2"/>
+              <a:buAutoNum type="arabicPlain"/>
               <a:tabLst>
                 <a:tab pos="581660" algn="l"/>
                 <a:tab pos="1163320" algn="l"/>
@@ -7587,9 +7497,9 @@
               </a:tabLst>
             </a:pPr>
             <a:r>
-              <a:rPr lang="en-US" sz="1800" dirty="0">
-                <a:solidFill>
-                  <a:srgbClr val="000000"/>
+              <a:rPr lang="en-US" sz="1800" dirty="0" smtClean="0">
+                <a:solidFill>
+                  <a:srgbClr val="008000"/>
                 </a:solidFill>
                 <a:latin typeface="Courier"/>
                 <a:cs typeface="Courier"/>
@@ -7597,19 +7507,19 @@
               <a:t> </a:t>
             </a:r>
             <a:r>
-              <a:rPr lang="en-US" sz="1800" dirty="0" smtClean="0">
-                <a:solidFill>
-                  <a:srgbClr val="000000"/>
-                </a:solidFill>
-                <a:latin typeface="Courier"/>
-                <a:cs typeface="Courier"/>
-              </a:rPr>
-              <a:t>       </a:t>
-            </a:r>
-            <a:r>
-              <a:rPr lang="en-US" sz="1800" dirty="0" err="1" smtClean="0">
-                <a:solidFill>
-                  <a:srgbClr val="000000"/>
+              <a:rPr lang="en-US" sz="1800" b="1" dirty="0" smtClean="0">
+                <a:solidFill>
+                  <a:srgbClr val="008000"/>
+                </a:solidFill>
+                <a:latin typeface="Courier"/>
+                <a:cs typeface="Courier"/>
+              </a:rPr>
+              <a:t>// </a:t>
+            </a:r>
+            <a:r>
+              <a:rPr lang="en-US" sz="1800" b="1" dirty="0" err="1" smtClean="0">
+                <a:solidFill>
+                  <a:srgbClr val="008000"/>
                 </a:solidFill>
                 <a:latin typeface="Courier"/>
                 <a:cs typeface="Courier"/>
@@ -7617,9 +7527,9 @@
               <a:t>list.get</a:t>
             </a:r>
             <a:r>
-              <a:rPr lang="en-US" sz="1800" dirty="0">
-                <a:solidFill>
-                  <a:srgbClr val="000000"/>
+              <a:rPr lang="en-US" sz="1800" b="1" dirty="0" smtClean="0">
+                <a:solidFill>
+                  <a:srgbClr val="008000"/>
                 </a:solidFill>
                 <a:latin typeface="Courier"/>
                 <a:cs typeface="Courier"/>
@@ -7627,9 +7537,9 @@
               <a:t>(</a:t>
             </a:r>
             <a:r>
-              <a:rPr lang="en-US" sz="1800" dirty="0" err="1">
-                <a:solidFill>
-                  <a:srgbClr val="000000"/>
+              <a:rPr lang="en-US" sz="1800" b="1" dirty="0" err="1" smtClean="0">
+                <a:solidFill>
+                  <a:srgbClr val="008000"/>
                 </a:solidFill>
                 <a:latin typeface="Courier"/>
                 <a:cs typeface="Courier"/>
@@ -7637,211 +7547,6 @@
               <a:t>i</a:t>
             </a:r>
             <a:r>
-              <a:rPr lang="en-US" sz="1800" dirty="0">
-                <a:solidFill>
-                  <a:srgbClr val="000000"/>
-                </a:solidFill>
-                <a:latin typeface="Courier"/>
-                <a:cs typeface="Courier"/>
-              </a:rPr>
-              <a:t>) == </a:t>
-            </a:r>
-            <a:r>
-              <a:rPr lang="en-US" sz="1800" dirty="0">
-                <a:solidFill>
-                  <a:srgbClr val="0000FF"/>
-                </a:solidFill>
-                <a:latin typeface="Courier"/>
-                <a:cs typeface="Courier"/>
-              </a:rPr>
-              <a:t>42</a:t>
-            </a:r>
-            <a:r>
-              <a:rPr lang="en-US" sz="1800" dirty="0" smtClean="0">
-                <a:solidFill>
-                  <a:srgbClr val="000000"/>
-                </a:solidFill>
-                <a:latin typeface="Courier"/>
-                <a:cs typeface="Courier"/>
-              </a:rPr>
-              <a:t>)</a:t>
-            </a:r>
-            <a:r>
-              <a:rPr lang="en-US" sz="1800" dirty="0">
-                <a:solidFill>
-                  <a:srgbClr val="000000"/>
-                </a:solidFill>
-                <a:latin typeface="Courier"/>
-                <a:cs typeface="Courier"/>
-              </a:rPr>
-              <a:t/>
-            </a:r>
-            <a:br>
-              <a:rPr lang="en-US" sz="1800" dirty="0">
-                <a:solidFill>
-                  <a:srgbClr val="000000"/>
-                </a:solidFill>
-                <a:latin typeface="Courier"/>
-                <a:cs typeface="Courier"/>
-              </a:rPr>
-            </a:br>
-            <a:r>
-              <a:rPr lang="en-US" sz="1800" dirty="0">
-                <a:solidFill>
-                  <a:srgbClr val="000000"/>
-                </a:solidFill>
-                <a:latin typeface="Courier"/>
-                <a:cs typeface="Courier"/>
-              </a:rPr>
-              <a:t>        </a:t>
-            </a:r>
-            <a:r>
-              <a:rPr lang="en-US" sz="1800" b="1" dirty="0">
-                <a:solidFill>
-                  <a:srgbClr val="660E7A"/>
-                </a:solidFill>
-                <a:latin typeface="Courier"/>
-                <a:cs typeface="Courier"/>
-              </a:rPr>
-              <a:t>count</a:t>
-            </a:r>
-            <a:r>
-              <a:rPr lang="en-US" sz="1800" dirty="0">
-                <a:solidFill>
-                  <a:srgbClr val="000000"/>
-                </a:solidFill>
-                <a:latin typeface="Courier"/>
-                <a:cs typeface="Courier"/>
-              </a:rPr>
-              <a:t>++;</a:t>
-            </a:r>
-            <a:br>
-              <a:rPr lang="en-US" sz="1800" dirty="0">
-                <a:solidFill>
-                  <a:srgbClr val="000000"/>
-                </a:solidFill>
-                <a:latin typeface="Courier"/>
-                <a:cs typeface="Courier"/>
-              </a:rPr>
-            </a:br>
-            <a:r>
-              <a:rPr lang="en-US" sz="1800" dirty="0">
-                <a:solidFill>
-                  <a:srgbClr val="000000"/>
-                </a:solidFill>
-                <a:latin typeface="Courier"/>
-                <a:cs typeface="Courier"/>
-              </a:rPr>
-              <a:t>    ...</a:t>
-            </a:r>
-            <a:br>
-              <a:rPr lang="en-US" sz="1800" dirty="0">
-                <a:solidFill>
-                  <a:srgbClr val="000000"/>
-                </a:solidFill>
-                <a:latin typeface="Courier"/>
-                <a:cs typeface="Courier"/>
-              </a:rPr>
-            </a:br>
-            <a:r>
-              <a:rPr lang="en-US" sz="1800" dirty="0">
-                <a:solidFill>
-                  <a:srgbClr val="000000"/>
-                </a:solidFill>
-                <a:latin typeface="Courier"/>
-                <a:cs typeface="Courier"/>
-              </a:rPr>
-              <a:t>}</a:t>
-            </a:r>
-            <a:br>
-              <a:rPr lang="en-US" sz="1800" dirty="0">
-                <a:solidFill>
-                  <a:srgbClr val="000000"/>
-                </a:solidFill>
-                <a:latin typeface="Courier"/>
-                <a:cs typeface="Courier"/>
-              </a:rPr>
-            </a:br>
-            <a:r>
-              <a:rPr lang="en-US" sz="1800" b="1" dirty="0">
-                <a:solidFill>
-                  <a:srgbClr val="000080"/>
-                </a:solidFill>
-                <a:latin typeface="Courier"/>
-                <a:cs typeface="Courier"/>
-              </a:rPr>
-              <a:t>if </a:t>
-            </a:r>
-            <a:r>
-              <a:rPr lang="en-US" sz="1800" dirty="0">
-                <a:solidFill>
-                  <a:srgbClr val="000000"/>
-                </a:solidFill>
-                <a:latin typeface="Courier"/>
-                <a:cs typeface="Courier"/>
-              </a:rPr>
-              <a:t>(</a:t>
-            </a:r>
-            <a:r>
-              <a:rPr lang="en-US" sz="1800" b="1" dirty="0">
-                <a:solidFill>
-                  <a:srgbClr val="660E7A"/>
-                </a:solidFill>
-                <a:latin typeface="Courier"/>
-                <a:cs typeface="Courier"/>
-              </a:rPr>
-              <a:t>count </a:t>
-            </a:r>
-            <a:r>
-              <a:rPr lang="en-US" sz="1800" dirty="0">
-                <a:solidFill>
-                  <a:srgbClr val="000000"/>
-                </a:solidFill>
-                <a:latin typeface="Courier"/>
-                <a:cs typeface="Courier"/>
-              </a:rPr>
-              <a:t>== </a:t>
-            </a:r>
-            <a:r>
-              <a:rPr lang="en-US" sz="1800" dirty="0">
-                <a:solidFill>
-                  <a:srgbClr val="0000FF"/>
-                </a:solidFill>
-                <a:latin typeface="Courier"/>
-                <a:cs typeface="Courier"/>
-              </a:rPr>
-              <a:t>75</a:t>
-            </a:r>
-            <a:r>
-              <a:rPr lang="en-US" sz="1800" dirty="0">
-                <a:solidFill>
-                  <a:srgbClr val="000000"/>
-                </a:solidFill>
-                <a:latin typeface="Courier"/>
-                <a:cs typeface="Courier"/>
-              </a:rPr>
-              <a:t>) {</a:t>
-            </a:r>
-            <a:br>
-              <a:rPr lang="en-US" sz="1800" dirty="0">
-                <a:solidFill>
-                  <a:srgbClr val="000000"/>
-                </a:solidFill>
-                <a:latin typeface="Courier"/>
-                <a:cs typeface="Courier"/>
-              </a:rPr>
-            </a:br>
-            <a:r>
-              <a:rPr lang="en-US" sz="1800" dirty="0">
-                <a:solidFill>
-                  <a:srgbClr val="000000"/>
-                </a:solidFill>
-                <a:latin typeface="Courier"/>
-                <a:cs typeface="Courier"/>
-              </a:rPr>
-              <a:t>    </a:t>
-            </a:r>
-            <a:r>
               <a:rPr lang="en-US" sz="1800" b="1" dirty="0" smtClean="0">
                 <a:solidFill>
                   <a:srgbClr val="008000"/>
@@ -7849,11 +7554,11 @@
                 <a:latin typeface="Courier"/>
                 <a:cs typeface="Courier"/>
               </a:rPr>
-              <a:t>//bug</a:t>
-            </a:r>
-          </a:p>
-          <a:p>
-            <a:pPr>
+              <a:t>) returns</a:t>
+            </a:r>
+          </a:p>
+          <a:p>
+            <a:pPr marL="342900" indent="-342900">
               <a:lnSpc>
                 <a:spcPct val="110000"/>
               </a:lnSpc>
@@ -7863,6 +7568,12 @@
               <a:spcAft>
                 <a:spcPts val="0"/>
               </a:spcAft>
+              <a:buClr>
+                <a:schemeClr val="tx1"/>
+              </a:buClr>
+              <a:buSzPct val="90000"/>
+              <a:buFont typeface="Wingdings" charset="2"/>
+              <a:buAutoNum type="arabicPlain"/>
               <a:tabLst>
                 <a:tab pos="581660" algn="l"/>
                 <a:tab pos="1163320" algn="l"/>
@@ -7885,12 +7596,672 @@
             <a:r>
               <a:rPr lang="en-US" sz="1800" dirty="0" smtClean="0">
                 <a:solidFill>
-                  <a:srgbClr val="000000"/>
-                </a:solidFill>
-                <a:latin typeface="Courier"/>
-                <a:cs typeface="Courier"/>
-              </a:rPr>
-              <a:t>}</a:t>
+                  <a:srgbClr val="008000"/>
+                </a:solidFill>
+                <a:latin typeface="Courier"/>
+                <a:cs typeface="Courier"/>
+              </a:rPr>
+              <a:t> </a:t>
+            </a:r>
+            <a:r>
+              <a:rPr lang="en-US" sz="1800" b="1" dirty="0" smtClean="0">
+                <a:solidFill>
+                  <a:srgbClr val="008000"/>
+                </a:solidFill>
+                <a:latin typeface="Courier"/>
+                <a:cs typeface="Courier"/>
+              </a:rPr>
+              <a:t>// symbolic integer </a:t>
+            </a:r>
+            <a:endParaRPr lang="en-US" sz="1800" dirty="0" smtClean="0">
+              <a:solidFill>
+                <a:srgbClr val="000000"/>
+              </a:solidFill>
+              <a:latin typeface="Courier"/>
+              <a:cs typeface="Courier"/>
+            </a:endParaRPr>
+          </a:p>
+          <a:p>
+            <a:pPr marL="342900" indent="-342900">
+              <a:lnSpc>
+                <a:spcPct val="110000"/>
+              </a:lnSpc>
+              <a:spcBef>
+                <a:spcPts val="0"/>
+              </a:spcBef>
+              <a:spcAft>
+                <a:spcPts val="0"/>
+              </a:spcAft>
+              <a:buClr>
+                <a:schemeClr val="tx1"/>
+              </a:buClr>
+              <a:buSzPct val="90000"/>
+              <a:buFont typeface="Wingdings" charset="2"/>
+              <a:buAutoNum type="arabicPlain"/>
+              <a:tabLst>
+                <a:tab pos="581660" algn="l"/>
+                <a:tab pos="1163320" algn="l"/>
+                <a:tab pos="1744980" algn="l"/>
+                <a:tab pos="2326640" algn="l"/>
+                <a:tab pos="2908300" algn="l"/>
+                <a:tab pos="3489960" algn="l"/>
+                <a:tab pos="4071620" algn="l"/>
+                <a:tab pos="4653280" algn="l"/>
+                <a:tab pos="5234940" algn="l"/>
+                <a:tab pos="5816600" algn="l"/>
+                <a:tab pos="6398260" algn="l"/>
+                <a:tab pos="6979920" algn="l"/>
+                <a:tab pos="7561580" algn="l"/>
+                <a:tab pos="8143240" algn="l"/>
+                <a:tab pos="8724900" algn="l"/>
+                <a:tab pos="9306560" algn="l"/>
+              </a:tabLst>
+            </a:pPr>
+            <a:r>
+              <a:rPr lang="en-US" sz="1800" dirty="0" smtClean="0">
+                <a:solidFill>
+                  <a:srgbClr val="000000"/>
+                </a:solidFill>
+                <a:latin typeface="Courier"/>
+                <a:cs typeface="Courier"/>
+              </a:rPr>
+              <a:t>    </a:t>
+            </a:r>
+            <a:r>
+              <a:rPr lang="en-US" sz="1800" b="1" dirty="0">
+                <a:solidFill>
+                  <a:srgbClr val="000080"/>
+                </a:solidFill>
+                <a:latin typeface="Courier"/>
+                <a:cs typeface="Courier"/>
+              </a:rPr>
+              <a:t>if </a:t>
+            </a:r>
+            <a:r>
+              <a:rPr lang="en-US" sz="1800" dirty="0">
+                <a:solidFill>
+                  <a:srgbClr val="000000"/>
+                </a:solidFill>
+                <a:latin typeface="Courier"/>
+                <a:cs typeface="Courier"/>
+              </a:rPr>
+              <a:t>(i%</a:t>
+            </a:r>
+            <a:r>
+              <a:rPr lang="en-US" sz="1800" dirty="0">
+                <a:solidFill>
+                  <a:srgbClr val="0000FF"/>
+                </a:solidFill>
+                <a:latin typeface="Courier"/>
+                <a:cs typeface="Courier"/>
+              </a:rPr>
+              <a:t>2 </a:t>
+            </a:r>
+            <a:r>
+              <a:rPr lang="en-US" sz="1800" dirty="0">
+                <a:solidFill>
+                  <a:srgbClr val="000000"/>
+                </a:solidFill>
+                <a:latin typeface="Courier"/>
+                <a:cs typeface="Courier"/>
+              </a:rPr>
+              <a:t>== </a:t>
+            </a:r>
+            <a:r>
+              <a:rPr lang="en-US" sz="1800" dirty="0">
+                <a:solidFill>
+                  <a:srgbClr val="0000FF"/>
+                </a:solidFill>
+                <a:latin typeface="Courier"/>
+                <a:cs typeface="Courier"/>
+              </a:rPr>
+              <a:t>0 </a:t>
+            </a:r>
+            <a:r>
+              <a:rPr lang="en-US" sz="1800" dirty="0">
+                <a:solidFill>
+                  <a:srgbClr val="000000"/>
+                </a:solidFill>
+                <a:latin typeface="Courier"/>
+                <a:cs typeface="Courier"/>
+              </a:rPr>
+              <a:t>&amp;&amp; </a:t>
+            </a:r>
+            <a:endParaRPr lang="en-US" sz="1800" dirty="0" smtClean="0">
+              <a:solidFill>
+                <a:srgbClr val="000000"/>
+              </a:solidFill>
+              <a:latin typeface="Courier"/>
+              <a:cs typeface="Courier"/>
+            </a:endParaRPr>
+          </a:p>
+          <a:p>
+            <a:pPr marL="342900" indent="-342900">
+              <a:lnSpc>
+                <a:spcPct val="110000"/>
+              </a:lnSpc>
+              <a:spcBef>
+                <a:spcPts val="0"/>
+              </a:spcBef>
+              <a:spcAft>
+                <a:spcPts val="0"/>
+              </a:spcAft>
+              <a:buClr>
+                <a:schemeClr val="tx1"/>
+              </a:buClr>
+              <a:buSzPct val="90000"/>
+              <a:buFont typeface="Wingdings" charset="2"/>
+              <a:buAutoNum type="arabicPlain"/>
+              <a:tabLst>
+                <a:tab pos="581660" algn="l"/>
+                <a:tab pos="1163320" algn="l"/>
+                <a:tab pos="1744980" algn="l"/>
+                <a:tab pos="2326640" algn="l"/>
+                <a:tab pos="2908300" algn="l"/>
+                <a:tab pos="3489960" algn="l"/>
+                <a:tab pos="4071620" algn="l"/>
+                <a:tab pos="4653280" algn="l"/>
+                <a:tab pos="5234940" algn="l"/>
+                <a:tab pos="5816600" algn="l"/>
+                <a:tab pos="6398260" algn="l"/>
+                <a:tab pos="6979920" algn="l"/>
+                <a:tab pos="7561580" algn="l"/>
+                <a:tab pos="8143240" algn="l"/>
+                <a:tab pos="8724900" algn="l"/>
+                <a:tab pos="9306560" algn="l"/>
+              </a:tabLst>
+            </a:pPr>
+            <a:r>
+              <a:rPr lang="en-US" sz="1800" dirty="0">
+                <a:solidFill>
+                  <a:srgbClr val="000000"/>
+                </a:solidFill>
+                <a:latin typeface="Courier"/>
+                <a:cs typeface="Courier"/>
+              </a:rPr>
+              <a:t> </a:t>
+            </a:r>
+            <a:r>
+              <a:rPr lang="en-US" sz="1800" dirty="0" smtClean="0">
+                <a:solidFill>
+                  <a:srgbClr val="000000"/>
+                </a:solidFill>
+                <a:latin typeface="Courier"/>
+                <a:cs typeface="Courier"/>
+              </a:rPr>
+              <a:t>       </a:t>
+            </a:r>
+            <a:r>
+              <a:rPr lang="en-US" sz="1800" dirty="0" err="1" smtClean="0">
+                <a:solidFill>
+                  <a:srgbClr val="000000"/>
+                </a:solidFill>
+                <a:latin typeface="Courier"/>
+                <a:cs typeface="Courier"/>
+              </a:rPr>
+              <a:t>list.get</a:t>
+            </a:r>
+            <a:r>
+              <a:rPr lang="en-US" sz="1800" dirty="0">
+                <a:solidFill>
+                  <a:srgbClr val="000000"/>
+                </a:solidFill>
+                <a:latin typeface="Courier"/>
+                <a:cs typeface="Courier"/>
+              </a:rPr>
+              <a:t>(</a:t>
+            </a:r>
+            <a:r>
+              <a:rPr lang="en-US" sz="1800" dirty="0" err="1">
+                <a:solidFill>
+                  <a:srgbClr val="000000"/>
+                </a:solidFill>
+                <a:latin typeface="Courier"/>
+                <a:cs typeface="Courier"/>
+              </a:rPr>
+              <a:t>i</a:t>
+            </a:r>
+            <a:r>
+              <a:rPr lang="en-US" sz="1800" dirty="0">
+                <a:solidFill>
+                  <a:srgbClr val="000000"/>
+                </a:solidFill>
+                <a:latin typeface="Courier"/>
+                <a:cs typeface="Courier"/>
+              </a:rPr>
+              <a:t>) == </a:t>
+            </a:r>
+            <a:r>
+              <a:rPr lang="en-US" sz="1800" dirty="0">
+                <a:solidFill>
+                  <a:srgbClr val="0000FF"/>
+                </a:solidFill>
+                <a:latin typeface="Courier"/>
+                <a:cs typeface="Courier"/>
+              </a:rPr>
+              <a:t>42</a:t>
+            </a:r>
+            <a:r>
+              <a:rPr lang="en-US" sz="1800" dirty="0" smtClean="0">
+                <a:solidFill>
+                  <a:srgbClr val="000000"/>
+                </a:solidFill>
+                <a:latin typeface="Courier"/>
+                <a:cs typeface="Courier"/>
+              </a:rPr>
+              <a:t>)</a:t>
+            </a:r>
+          </a:p>
+          <a:p>
+            <a:pPr marL="342900" indent="-342900">
+              <a:lnSpc>
+                <a:spcPct val="110000"/>
+              </a:lnSpc>
+              <a:spcBef>
+                <a:spcPts val="0"/>
+              </a:spcBef>
+              <a:spcAft>
+                <a:spcPts val="0"/>
+              </a:spcAft>
+              <a:buClr>
+                <a:schemeClr val="tx1"/>
+              </a:buClr>
+              <a:buSzPct val="90000"/>
+              <a:buFont typeface="Wingdings" charset="2"/>
+              <a:buAutoNum type="arabicPlain"/>
+              <a:tabLst>
+                <a:tab pos="581660" algn="l"/>
+                <a:tab pos="1163320" algn="l"/>
+                <a:tab pos="1744980" algn="l"/>
+                <a:tab pos="2326640" algn="l"/>
+                <a:tab pos="2908300" algn="l"/>
+                <a:tab pos="3489960" algn="l"/>
+                <a:tab pos="4071620" algn="l"/>
+                <a:tab pos="4653280" algn="l"/>
+                <a:tab pos="5234940" algn="l"/>
+                <a:tab pos="5816600" algn="l"/>
+                <a:tab pos="6398260" algn="l"/>
+                <a:tab pos="6979920" algn="l"/>
+                <a:tab pos="7561580" algn="l"/>
+                <a:tab pos="8143240" algn="l"/>
+                <a:tab pos="8724900" algn="l"/>
+                <a:tab pos="9306560" algn="l"/>
+              </a:tabLst>
+            </a:pPr>
+            <a:r>
+              <a:rPr lang="en-US" sz="1800" dirty="0" smtClean="0">
+                <a:solidFill>
+                  <a:srgbClr val="000000"/>
+                </a:solidFill>
+                <a:latin typeface="Courier"/>
+                <a:cs typeface="Courier"/>
+              </a:rPr>
+              <a:t>        </a:t>
+            </a:r>
+            <a:r>
+              <a:rPr lang="en-US" sz="1800" b="1" dirty="0">
+                <a:solidFill>
+                  <a:srgbClr val="660E7A"/>
+                </a:solidFill>
+                <a:latin typeface="Courier"/>
+                <a:cs typeface="Courier"/>
+              </a:rPr>
+              <a:t>count</a:t>
+            </a:r>
+            <a:r>
+              <a:rPr lang="en-US" sz="1800" dirty="0">
+                <a:solidFill>
+                  <a:srgbClr val="000000"/>
+                </a:solidFill>
+                <a:latin typeface="Courier"/>
+                <a:cs typeface="Courier"/>
+              </a:rPr>
+              <a:t>++</a:t>
+            </a:r>
+            <a:r>
+              <a:rPr lang="en-US" sz="1800" dirty="0" smtClean="0">
+                <a:solidFill>
+                  <a:srgbClr val="000000"/>
+                </a:solidFill>
+                <a:latin typeface="Courier"/>
+                <a:cs typeface="Courier"/>
+              </a:rPr>
+              <a:t>;</a:t>
+            </a:r>
+          </a:p>
+          <a:p>
+            <a:pPr marL="342900" indent="-342900">
+              <a:lnSpc>
+                <a:spcPct val="110000"/>
+              </a:lnSpc>
+              <a:spcBef>
+                <a:spcPts val="0"/>
+              </a:spcBef>
+              <a:spcAft>
+                <a:spcPts val="0"/>
+              </a:spcAft>
+              <a:buClr>
+                <a:schemeClr val="tx1"/>
+              </a:buClr>
+              <a:buSzPct val="90000"/>
+              <a:buFont typeface="Wingdings" charset="2"/>
+              <a:buAutoNum type="arabicPlain"/>
+              <a:tabLst>
+                <a:tab pos="581660" algn="l"/>
+                <a:tab pos="1163320" algn="l"/>
+                <a:tab pos="1744980" algn="l"/>
+                <a:tab pos="2326640" algn="l"/>
+                <a:tab pos="2908300" algn="l"/>
+                <a:tab pos="3489960" algn="l"/>
+                <a:tab pos="4071620" algn="l"/>
+                <a:tab pos="4653280" algn="l"/>
+                <a:tab pos="5234940" algn="l"/>
+                <a:tab pos="5816600" algn="l"/>
+                <a:tab pos="6398260" algn="l"/>
+                <a:tab pos="6979920" algn="l"/>
+                <a:tab pos="7561580" algn="l"/>
+                <a:tab pos="8143240" algn="l"/>
+                <a:tab pos="8724900" algn="l"/>
+                <a:tab pos="9306560" algn="l"/>
+              </a:tabLst>
+            </a:pPr>
+            <a:r>
+              <a:rPr lang="en-US" sz="1800" dirty="0" smtClean="0">
+                <a:solidFill>
+                  <a:srgbClr val="000000"/>
+                </a:solidFill>
+                <a:latin typeface="Courier"/>
+                <a:cs typeface="Courier"/>
+              </a:rPr>
+              <a:t>    </a:t>
+            </a:r>
+            <a:r>
+              <a:rPr lang="en-US" sz="1800" dirty="0">
+                <a:solidFill>
+                  <a:srgbClr val="000000"/>
+                </a:solidFill>
+                <a:latin typeface="Courier"/>
+                <a:cs typeface="Courier"/>
+              </a:rPr>
+              <a:t>...</a:t>
+            </a:r>
+            <a:r>
+              <a:rPr lang="en-US" sz="1800" dirty="0" smtClean="0">
+                <a:solidFill>
+                  <a:srgbClr val="000000"/>
+                </a:solidFill>
+                <a:latin typeface="Courier"/>
+                <a:cs typeface="Courier"/>
+              </a:rPr>
+              <a:t> </a:t>
+            </a:r>
+          </a:p>
+          <a:p>
+            <a:pPr marL="342900" indent="-342900">
+              <a:lnSpc>
+                <a:spcPct val="110000"/>
+              </a:lnSpc>
+              <a:spcBef>
+                <a:spcPts val="0"/>
+              </a:spcBef>
+              <a:spcAft>
+                <a:spcPts val="0"/>
+              </a:spcAft>
+              <a:buClr>
+                <a:schemeClr val="tx1"/>
+              </a:buClr>
+              <a:buSzPct val="90000"/>
+              <a:buFont typeface="Wingdings" charset="2"/>
+              <a:buAutoNum type="arabicPlain"/>
+              <a:tabLst>
+                <a:tab pos="581660" algn="l"/>
+                <a:tab pos="1163320" algn="l"/>
+                <a:tab pos="1744980" algn="l"/>
+                <a:tab pos="2326640" algn="l"/>
+                <a:tab pos="2908300" algn="l"/>
+                <a:tab pos="3489960" algn="l"/>
+                <a:tab pos="4071620" algn="l"/>
+                <a:tab pos="4653280" algn="l"/>
+                <a:tab pos="5234940" algn="l"/>
+                <a:tab pos="5816600" algn="l"/>
+                <a:tab pos="6398260" algn="l"/>
+                <a:tab pos="6979920" algn="l"/>
+                <a:tab pos="7561580" algn="l"/>
+                <a:tab pos="8143240" algn="l"/>
+                <a:tab pos="8724900" algn="l"/>
+                <a:tab pos="9306560" algn="l"/>
+              </a:tabLst>
+            </a:pPr>
+            <a:r>
+              <a:rPr lang="en-US" sz="1800" dirty="0" smtClean="0">
+                <a:solidFill>
+                  <a:srgbClr val="000000"/>
+                </a:solidFill>
+                <a:latin typeface="Courier"/>
+                <a:cs typeface="Courier"/>
+              </a:rPr>
+              <a:t> }</a:t>
+            </a:r>
+          </a:p>
+          <a:p>
+            <a:pPr marL="342900" indent="-342900">
+              <a:lnSpc>
+                <a:spcPct val="110000"/>
+              </a:lnSpc>
+              <a:spcBef>
+                <a:spcPts val="0"/>
+              </a:spcBef>
+              <a:spcAft>
+                <a:spcPts val="0"/>
+              </a:spcAft>
+              <a:buClr>
+                <a:schemeClr val="tx1"/>
+              </a:buClr>
+              <a:buSzPct val="90000"/>
+              <a:buFont typeface="Wingdings" charset="2"/>
+              <a:buAutoNum type="arabicPlain"/>
+              <a:tabLst>
+                <a:tab pos="581660" algn="l"/>
+                <a:tab pos="1163320" algn="l"/>
+                <a:tab pos="1744980" algn="l"/>
+                <a:tab pos="2326640" algn="l"/>
+                <a:tab pos="2908300" algn="l"/>
+                <a:tab pos="3489960" algn="l"/>
+                <a:tab pos="4071620" algn="l"/>
+                <a:tab pos="4653280" algn="l"/>
+                <a:tab pos="5234940" algn="l"/>
+                <a:tab pos="5816600" algn="l"/>
+                <a:tab pos="6398260" algn="l"/>
+                <a:tab pos="6979920" algn="l"/>
+                <a:tab pos="7561580" algn="l"/>
+                <a:tab pos="8143240" algn="l"/>
+                <a:tab pos="8724900" algn="l"/>
+                <a:tab pos="9306560" algn="l"/>
+              </a:tabLst>
+            </a:pPr>
+            <a:r>
+              <a:rPr lang="en-US" sz="1800" dirty="0" smtClean="0">
+                <a:solidFill>
+                  <a:srgbClr val="000080"/>
+                </a:solidFill>
+                <a:latin typeface="Courier"/>
+                <a:cs typeface="Courier"/>
+              </a:rPr>
+              <a:t> </a:t>
+            </a:r>
+            <a:r>
+              <a:rPr lang="en-US" sz="1800" b="1" dirty="0" smtClean="0">
+                <a:solidFill>
+                  <a:srgbClr val="000080"/>
+                </a:solidFill>
+                <a:latin typeface="Courier"/>
+                <a:cs typeface="Courier"/>
+              </a:rPr>
+              <a:t>if </a:t>
+            </a:r>
+            <a:r>
+              <a:rPr lang="en-US" sz="1800" dirty="0">
+                <a:solidFill>
+                  <a:srgbClr val="000000"/>
+                </a:solidFill>
+                <a:latin typeface="Courier"/>
+                <a:cs typeface="Courier"/>
+              </a:rPr>
+              <a:t>(</a:t>
+            </a:r>
+            <a:r>
+              <a:rPr lang="en-US" sz="1800" b="1" dirty="0">
+                <a:solidFill>
+                  <a:srgbClr val="660E7A"/>
+                </a:solidFill>
+                <a:latin typeface="Courier"/>
+                <a:cs typeface="Courier"/>
+              </a:rPr>
+              <a:t>count </a:t>
+            </a:r>
+            <a:r>
+              <a:rPr lang="en-US" sz="1800" dirty="0">
+                <a:solidFill>
+                  <a:srgbClr val="000000"/>
+                </a:solidFill>
+                <a:latin typeface="Courier"/>
+                <a:cs typeface="Courier"/>
+              </a:rPr>
+              <a:t>== </a:t>
+            </a:r>
+            <a:r>
+              <a:rPr lang="en-US" sz="1800" dirty="0">
+                <a:solidFill>
+                  <a:srgbClr val="0000FF"/>
+                </a:solidFill>
+                <a:latin typeface="Courier"/>
+                <a:cs typeface="Courier"/>
+              </a:rPr>
+              <a:t>75</a:t>
+            </a:r>
+            <a:r>
+              <a:rPr lang="en-US" sz="1800" dirty="0">
+                <a:solidFill>
+                  <a:srgbClr val="000000"/>
+                </a:solidFill>
+                <a:latin typeface="Courier"/>
+                <a:cs typeface="Courier"/>
+              </a:rPr>
+              <a:t>) </a:t>
+            </a:r>
+            <a:r>
+              <a:rPr lang="en-US" sz="1800" dirty="0" smtClean="0">
+                <a:solidFill>
+                  <a:srgbClr val="000000"/>
+                </a:solidFill>
+                <a:latin typeface="Courier"/>
+                <a:cs typeface="Courier"/>
+              </a:rPr>
+              <a:t>{</a:t>
+            </a:r>
+          </a:p>
+          <a:p>
+            <a:pPr marL="342900" indent="-342900">
+              <a:lnSpc>
+                <a:spcPct val="110000"/>
+              </a:lnSpc>
+              <a:spcBef>
+                <a:spcPts val="0"/>
+              </a:spcBef>
+              <a:spcAft>
+                <a:spcPts val="0"/>
+              </a:spcAft>
+              <a:buClr>
+                <a:schemeClr val="tx1"/>
+              </a:buClr>
+              <a:buSzPct val="90000"/>
+              <a:buFont typeface="Wingdings" charset="2"/>
+              <a:buAutoNum type="arabicPlain"/>
+              <a:tabLst>
+                <a:tab pos="581660" algn="l"/>
+                <a:tab pos="1163320" algn="l"/>
+                <a:tab pos="1744980" algn="l"/>
+                <a:tab pos="2326640" algn="l"/>
+                <a:tab pos="2908300" algn="l"/>
+                <a:tab pos="3489960" algn="l"/>
+                <a:tab pos="4071620" algn="l"/>
+                <a:tab pos="4653280" algn="l"/>
+                <a:tab pos="5234940" algn="l"/>
+                <a:tab pos="5816600" algn="l"/>
+                <a:tab pos="6398260" algn="l"/>
+                <a:tab pos="6979920" algn="l"/>
+                <a:tab pos="7561580" algn="l"/>
+                <a:tab pos="8143240" algn="l"/>
+                <a:tab pos="8724900" algn="l"/>
+                <a:tab pos="9306560" algn="l"/>
+              </a:tabLst>
+            </a:pPr>
+            <a:r>
+              <a:rPr lang="en-US" sz="1800" dirty="0" smtClean="0">
+                <a:solidFill>
+                  <a:srgbClr val="000000"/>
+                </a:solidFill>
+                <a:latin typeface="Courier"/>
+                <a:cs typeface="Courier"/>
+              </a:rPr>
+              <a:t>    </a:t>
+            </a:r>
+            <a:r>
+              <a:rPr lang="en-US" sz="1800" b="1" dirty="0" smtClean="0">
+                <a:solidFill>
+                  <a:srgbClr val="008000"/>
+                </a:solidFill>
+                <a:latin typeface="Courier"/>
+                <a:cs typeface="Courier"/>
+              </a:rPr>
+              <a:t>//bug</a:t>
+            </a:r>
+          </a:p>
+          <a:p>
+            <a:pPr marL="342900" indent="-342900">
+              <a:lnSpc>
+                <a:spcPct val="110000"/>
+              </a:lnSpc>
+              <a:spcBef>
+                <a:spcPts val="0"/>
+              </a:spcBef>
+              <a:spcAft>
+                <a:spcPts val="0"/>
+              </a:spcAft>
+              <a:buClr>
+                <a:schemeClr val="tx1"/>
+              </a:buClr>
+              <a:buSzPct val="90000"/>
+              <a:buFont typeface="Wingdings" charset="2"/>
+              <a:buAutoNum type="arabicPlain"/>
+              <a:tabLst>
+                <a:tab pos="581660" algn="l"/>
+                <a:tab pos="1163320" algn="l"/>
+                <a:tab pos="1744980" algn="l"/>
+                <a:tab pos="2326640" algn="l"/>
+                <a:tab pos="2908300" algn="l"/>
+                <a:tab pos="3489960" algn="l"/>
+                <a:tab pos="4071620" algn="l"/>
+                <a:tab pos="4653280" algn="l"/>
+                <a:tab pos="5234940" algn="l"/>
+                <a:tab pos="5816600" algn="l"/>
+                <a:tab pos="6398260" algn="l"/>
+                <a:tab pos="6979920" algn="l"/>
+                <a:tab pos="7561580" algn="l"/>
+                <a:tab pos="8143240" algn="l"/>
+                <a:tab pos="8724900" algn="l"/>
+                <a:tab pos="9306560" algn="l"/>
+              </a:tabLst>
+            </a:pPr>
+            <a:r>
+              <a:rPr lang="en-US" sz="1800" dirty="0" smtClean="0">
+                <a:solidFill>
+                  <a:srgbClr val="000000"/>
+                </a:solidFill>
+                <a:latin typeface="Courier"/>
+                <a:cs typeface="Courier"/>
+              </a:rPr>
+              <a:t> }</a:t>
             </a:r>
             <a:r>
               <a:rPr lang="en-US" sz="1800" dirty="0" smtClean="0">
@@ -9012,7 +9383,7 @@
         </p:nvSpPr>
         <p:spPr bwMode="auto">
           <a:xfrm>
-            <a:off x="1655411" y="3866643"/>
+            <a:off x="1983644" y="3866643"/>
             <a:ext cx="1741033" cy="399764"/>
           </a:xfrm>
           <a:prstGeom prst="rect">
@@ -9140,8 +9511,8 @@
         </p:nvCxnSpPr>
         <p:spPr bwMode="auto">
           <a:xfrm flipV="1">
-            <a:off x="3396444" y="651216"/>
-            <a:ext cx="1574911" cy="3215428"/>
+            <a:off x="3724677" y="651216"/>
+            <a:ext cx="1246678" cy="3215428"/>
           </a:xfrm>
           <a:prstGeom prst="straightConnector1">
             <a:avLst/>
@@ -9167,8 +9538,8 @@
         </p:nvCxnSpPr>
         <p:spPr bwMode="auto">
           <a:xfrm>
-            <a:off x="3396444" y="4266407"/>
-            <a:ext cx="1574911" cy="1702235"/>
+            <a:off x="3724677" y="4266407"/>
+            <a:ext cx="1246678" cy="1702235"/>
           </a:xfrm>
           <a:prstGeom prst="straightConnector1">
             <a:avLst/>

</xml_diff>

<commit_message>
Filling in the overview subsection under Technique section
</commit_message>
<xml_diff>
--- a/figures/Figures.pptx
+++ b/figures/Figures.pptx
@@ -8,6 +8,7 @@
     <p:sldId id="257" r:id="rId2"/>
     <p:sldId id="258" r:id="rId3"/>
     <p:sldId id="259" r:id="rId4"/>
+    <p:sldId id="260" r:id="rId5"/>
   </p:sldIdLst>
   <p:sldSz cx="9144000" cy="6858000" type="letter"/>
   <p:notesSz cx="9601200" cy="7315200"/>
@@ -138,7 +139,7 @@
   </p:defaultTextStyle>
   <p:extLst>
     <p:ext uri="{EFAFB233-063F-42B5-8137-9DF3F51BA10A}">
-      <p15:sldGuideLst xmlns:p15="http://schemas.microsoft.com/office/powerpoint/2012/main" xmlns="">
+      <p15:sldGuideLst xmlns="" xmlns:p15="http://schemas.microsoft.com/office/powerpoint/2012/main">
         <p15:guide id="1" orient="horz" pos="2160">
           <p15:clr>
             <a:srgbClr val="A4A3A4"/>
@@ -3507,7 +3508,6 @@
               <a:rPr lang="en-US" altLang="ko-KR" smtClean="0"/>
               <a:t>Click to edit Master title style</a:t>
             </a:r>
-            <a:endParaRPr lang="en-US" altLang="ko-KR" smtClean="0"/>
           </a:p>
         </p:txBody>
       </p:sp>
@@ -3594,7 +3594,6 @@
               <a:rPr lang="en-US" altLang="ko-KR" smtClean="0"/>
               <a:t>Fifth level</a:t>
             </a:r>
-            <a:endParaRPr lang="en-US" altLang="ko-KR" smtClean="0"/>
           </a:p>
         </p:txBody>
       </p:sp>
@@ -9591,6 +9590,1273 @@
     <p:extLst>
       <p:ext uri="{BB962C8B-B14F-4D97-AF65-F5344CB8AC3E}">
         <p14:creationId xmlns:p14="http://schemas.microsoft.com/office/powerpoint/2010/main" val="5467138"/>
+      </p:ext>
+    </p:extLst>
+  </p:cSld>
+  <p:clrMapOvr>
+    <a:masterClrMapping/>
+  </p:clrMapOvr>
+  <p:transition xmlns:p14="http://schemas.microsoft.com/office/powerpoint/2010/main">
+    <p:fade/>
+  </p:transition>
+</p:sld>
+</file>
+
+<file path=ppt/slides/slide4.xml><?xml version="1.0" encoding="utf-8"?>
+<p:sld xmlns:a="http://schemas.openxmlformats.org/drawingml/2006/main" xmlns:r="http://schemas.openxmlformats.org/officeDocument/2006/relationships" xmlns:p="http://schemas.openxmlformats.org/presentationml/2006/main">
+  <p:cSld>
+    <p:spTree>
+      <p:nvGrpSpPr>
+        <p:cNvPr id="1" name=""/>
+        <p:cNvGrpSpPr/>
+        <p:nvPr/>
+      </p:nvGrpSpPr>
+      <p:grpSpPr>
+        <a:xfrm>
+          <a:off x="0" y="0"/>
+          <a:ext cx="0" cy="0"/>
+          <a:chOff x="0" y="0"/>
+          <a:chExt cx="0" cy="0"/>
+        </a:xfrm>
+      </p:grpSpPr>
+      <p:sp>
+        <p:nvSpPr>
+          <p:cNvPr id="4" name="Slide Number Placeholder 3"/>
+          <p:cNvSpPr>
+            <a:spLocks noGrp="1"/>
+          </p:cNvSpPr>
+          <p:nvPr>
+            <p:ph type="sldNum" sz="quarter" idx="10"/>
+          </p:nvPr>
+        </p:nvSpPr>
+        <p:spPr/>
+        <p:txBody>
+          <a:bodyPr/>
+          <a:lstStyle/>
+          <a:p>
+            <a:pPr>
+              <a:defRPr/>
+            </a:pPr>
+            <a:fld id="{04115896-62BD-42FA-A8CE-89F8BA03C882}" type="slidenum">
+              <a:rPr lang="ko-KR" altLang="en-US" smtClean="0"/>
+              <a:pPr>
+                <a:defRPr/>
+              </a:pPr>
+              <a:t>4</a:t>
+            </a:fld>
+            <a:endParaRPr lang="en-US" altLang="ko-KR" dirty="0"/>
+          </a:p>
+        </p:txBody>
+      </p:sp>
+      <p:sp>
+        <p:nvSpPr>
+          <p:cNvPr id="5" name="TextBox 4"/>
+          <p:cNvSpPr txBox="1"/>
+          <p:nvPr/>
+        </p:nvSpPr>
+        <p:spPr>
+          <a:xfrm>
+            <a:off x="770627" y="1813389"/>
+            <a:ext cx="1556836" cy="646331"/>
+          </a:xfrm>
+          <a:prstGeom prst="rect">
+            <a:avLst/>
+          </a:prstGeom>
+          <a:ln w="6350" cmpd="sng"/>
+        </p:spPr>
+        <p:style>
+          <a:lnRef idx="2">
+            <a:schemeClr val="dk1"/>
+          </a:lnRef>
+          <a:fillRef idx="1">
+            <a:schemeClr val="lt1"/>
+          </a:fillRef>
+          <a:effectRef idx="0">
+            <a:schemeClr val="dk1"/>
+          </a:effectRef>
+          <a:fontRef idx="minor">
+            <a:schemeClr val="dk1"/>
+          </a:fontRef>
+        </p:style>
+        <p:txBody>
+          <a:bodyPr wrap="none" rtlCol="0">
+            <a:spAutoFit/>
+          </a:bodyPr>
+          <a:lstStyle/>
+          <a:p>
+            <a:r>
+              <a:rPr lang="en-US" sz="1800" dirty="0" smtClean="0">
+                <a:latin typeface="Times New Roman"/>
+                <a:cs typeface="Times New Roman"/>
+              </a:rPr>
+              <a:t>static</a:t>
+            </a:r>
+          </a:p>
+          <a:p>
+            <a:r>
+              <a:rPr lang="en-US" sz="1800" dirty="0" smtClean="0">
+                <a:latin typeface="Times New Roman"/>
+                <a:cs typeface="Times New Roman"/>
+              </a:rPr>
+              <a:t>summarization</a:t>
+            </a:r>
+            <a:endParaRPr lang="en-US" sz="1800" dirty="0">
+              <a:latin typeface="Times New Roman"/>
+              <a:cs typeface="Times New Roman"/>
+            </a:endParaRPr>
+          </a:p>
+        </p:txBody>
+      </p:sp>
+      <p:sp>
+        <p:nvSpPr>
+          <p:cNvPr id="6" name="TextBox 5"/>
+          <p:cNvSpPr txBox="1"/>
+          <p:nvPr/>
+        </p:nvSpPr>
+        <p:spPr>
+          <a:xfrm>
+            <a:off x="3253783" y="1536390"/>
+            <a:ext cx="1069198" cy="1200329"/>
+          </a:xfrm>
+          <a:prstGeom prst="rect">
+            <a:avLst/>
+          </a:prstGeom>
+          <a:ln w="6350" cmpd="sng"/>
+        </p:spPr>
+        <p:style>
+          <a:lnRef idx="2">
+            <a:schemeClr val="dk1"/>
+          </a:lnRef>
+          <a:fillRef idx="1">
+            <a:schemeClr val="lt1"/>
+          </a:fillRef>
+          <a:effectRef idx="0">
+            <a:schemeClr val="dk1"/>
+          </a:effectRef>
+          <a:fontRef idx="minor">
+            <a:schemeClr val="dk1"/>
+          </a:fontRef>
+        </p:style>
+        <p:txBody>
+          <a:bodyPr wrap="none" rtlCol="0">
+            <a:spAutoFit/>
+          </a:bodyPr>
+          <a:lstStyle/>
+          <a:p>
+            <a:r>
+              <a:rPr lang="en-US" sz="1800" dirty="0" smtClean="0">
+                <a:latin typeface="Times New Roman"/>
+                <a:cs typeface="Times New Roman"/>
+              </a:rPr>
+              <a:t>local</a:t>
+            </a:r>
+          </a:p>
+          <a:p>
+            <a:r>
+              <a:rPr lang="en-US" sz="1800" dirty="0" smtClean="0">
+                <a:latin typeface="Times New Roman"/>
+                <a:cs typeface="Times New Roman"/>
+              </a:rPr>
+              <a:t>variable</a:t>
+            </a:r>
+          </a:p>
+          <a:p>
+            <a:r>
+              <a:rPr lang="en-US" sz="1800" dirty="0" smtClean="0">
+                <a:latin typeface="Times New Roman"/>
+                <a:cs typeface="Times New Roman"/>
+              </a:rPr>
+              <a:t>alpha</a:t>
+            </a:r>
+          </a:p>
+          <a:p>
+            <a:r>
+              <a:rPr lang="en-US" sz="1800" dirty="0" smtClean="0">
+                <a:latin typeface="Times New Roman"/>
+                <a:cs typeface="Times New Roman"/>
+              </a:rPr>
+              <a:t>renaming</a:t>
+            </a:r>
+            <a:endParaRPr lang="en-US" sz="1800" dirty="0">
+              <a:latin typeface="Times New Roman"/>
+              <a:cs typeface="Times New Roman"/>
+            </a:endParaRPr>
+          </a:p>
+        </p:txBody>
+      </p:sp>
+      <p:sp>
+        <p:nvSpPr>
+          <p:cNvPr id="7" name="TextBox 6"/>
+          <p:cNvSpPr txBox="1"/>
+          <p:nvPr/>
+        </p:nvSpPr>
+        <p:spPr>
+          <a:xfrm>
+            <a:off x="5039457" y="1674889"/>
+            <a:ext cx="1274896" cy="923330"/>
+          </a:xfrm>
+          <a:prstGeom prst="rect">
+            <a:avLst/>
+          </a:prstGeom>
+          <a:ln w="6350" cmpd="sng"/>
+        </p:spPr>
+        <p:style>
+          <a:lnRef idx="2">
+            <a:schemeClr val="dk1"/>
+          </a:lnRef>
+          <a:fillRef idx="1">
+            <a:schemeClr val="lt1"/>
+          </a:fillRef>
+          <a:effectRef idx="0">
+            <a:schemeClr val="dk1"/>
+          </a:effectRef>
+          <a:fontRef idx="minor">
+            <a:schemeClr val="dk1"/>
+          </a:fontRef>
+        </p:style>
+        <p:txBody>
+          <a:bodyPr wrap="none" rtlCol="0">
+            <a:spAutoFit/>
+          </a:bodyPr>
+          <a:lstStyle/>
+          <a:p>
+            <a:r>
+              <a:rPr lang="en-US" sz="1800" dirty="0" smtClean="0">
+                <a:latin typeface="Times New Roman"/>
+                <a:cs typeface="Times New Roman"/>
+              </a:rPr>
+              <a:t>local</a:t>
+            </a:r>
+          </a:p>
+          <a:p>
+            <a:r>
+              <a:rPr lang="en-US" sz="1800" dirty="0" smtClean="0">
+                <a:latin typeface="Times New Roman"/>
+                <a:cs typeface="Times New Roman"/>
+              </a:rPr>
+              <a:t>variable</a:t>
+            </a:r>
+          </a:p>
+          <a:p>
+            <a:r>
+              <a:rPr lang="en-US" sz="1800" dirty="0" smtClean="0">
+                <a:latin typeface="Times New Roman"/>
+                <a:cs typeface="Times New Roman"/>
+              </a:rPr>
+              <a:t>substitution</a:t>
+            </a:r>
+            <a:endParaRPr lang="en-US" sz="1800" dirty="0">
+              <a:latin typeface="Times New Roman"/>
+              <a:cs typeface="Times New Roman"/>
+            </a:endParaRPr>
+          </a:p>
+        </p:txBody>
+      </p:sp>
+      <p:sp>
+        <p:nvSpPr>
+          <p:cNvPr id="8" name="TextBox 7"/>
+          <p:cNvSpPr txBox="1"/>
+          <p:nvPr/>
+        </p:nvSpPr>
+        <p:spPr>
+          <a:xfrm>
+            <a:off x="770627" y="3048827"/>
+            <a:ext cx="1544012" cy="923330"/>
+          </a:xfrm>
+          <a:prstGeom prst="rect">
+            <a:avLst/>
+          </a:prstGeom>
+          <a:ln w="6350" cmpd="sng"/>
+        </p:spPr>
+        <p:style>
+          <a:lnRef idx="2">
+            <a:schemeClr val="dk1"/>
+          </a:lnRef>
+          <a:fillRef idx="1">
+            <a:schemeClr val="lt1"/>
+          </a:fillRef>
+          <a:effectRef idx="0">
+            <a:schemeClr val="dk1"/>
+          </a:effectRef>
+          <a:fontRef idx="minor">
+            <a:schemeClr val="dk1"/>
+          </a:fontRef>
+        </p:style>
+        <p:txBody>
+          <a:bodyPr wrap="none" rtlCol="0">
+            <a:spAutoFit/>
+          </a:bodyPr>
+          <a:lstStyle/>
+          <a:p>
+            <a:r>
+              <a:rPr lang="en-US" sz="1800" dirty="0" smtClean="0">
+                <a:latin typeface="Times New Roman"/>
+                <a:cs typeface="Times New Roman"/>
+              </a:rPr>
+              <a:t>field</a:t>
+            </a:r>
+          </a:p>
+          <a:p>
+            <a:r>
+              <a:rPr lang="en-US" sz="1800" dirty="0" smtClean="0">
+                <a:latin typeface="Times New Roman"/>
+                <a:cs typeface="Times New Roman"/>
+              </a:rPr>
+              <a:t>references</a:t>
+            </a:r>
+          </a:p>
+          <a:p>
+            <a:r>
+              <a:rPr lang="en-US" sz="1800" dirty="0" smtClean="0">
+                <a:latin typeface="Times New Roman"/>
+                <a:cs typeface="Times New Roman"/>
+              </a:rPr>
+              <a:t>transformation</a:t>
+            </a:r>
+            <a:endParaRPr lang="en-US" sz="1800" dirty="0">
+              <a:latin typeface="Times New Roman"/>
+              <a:cs typeface="Times New Roman"/>
+            </a:endParaRPr>
+          </a:p>
+        </p:txBody>
+      </p:sp>
+      <p:sp>
+        <p:nvSpPr>
+          <p:cNvPr id="9" name="TextBox 8"/>
+          <p:cNvSpPr txBox="1"/>
+          <p:nvPr/>
+        </p:nvSpPr>
+        <p:spPr>
+          <a:xfrm>
+            <a:off x="3016376" y="3048827"/>
+            <a:ext cx="1544012" cy="923330"/>
+          </a:xfrm>
+          <a:prstGeom prst="rect">
+            <a:avLst/>
+          </a:prstGeom>
+          <a:ln w="6350" cmpd="sng"/>
+        </p:spPr>
+        <p:style>
+          <a:lnRef idx="2">
+            <a:schemeClr val="dk1"/>
+          </a:lnRef>
+          <a:fillRef idx="1">
+            <a:schemeClr val="lt1"/>
+          </a:fillRef>
+          <a:effectRef idx="0">
+            <a:schemeClr val="dk1"/>
+          </a:effectRef>
+          <a:fontRef idx="minor">
+            <a:schemeClr val="dk1"/>
+          </a:fontRef>
+        </p:style>
+        <p:txBody>
+          <a:bodyPr wrap="none" rtlCol="0">
+            <a:spAutoFit/>
+          </a:bodyPr>
+          <a:lstStyle/>
+          <a:p>
+            <a:r>
+              <a:rPr lang="en-US" sz="1800" dirty="0" smtClean="0">
+                <a:latin typeface="Times New Roman"/>
+                <a:cs typeface="Times New Roman"/>
+              </a:rPr>
+              <a:t>array</a:t>
+            </a:r>
+          </a:p>
+          <a:p>
+            <a:r>
+              <a:rPr lang="en-US" sz="1800" dirty="0" smtClean="0">
+                <a:latin typeface="Times New Roman"/>
+                <a:cs typeface="Times New Roman"/>
+              </a:rPr>
+              <a:t>references</a:t>
+            </a:r>
+          </a:p>
+          <a:p>
+            <a:r>
+              <a:rPr lang="en-US" sz="1800" dirty="0" smtClean="0">
+                <a:latin typeface="Times New Roman"/>
+                <a:cs typeface="Times New Roman"/>
+              </a:rPr>
+              <a:t>transformation</a:t>
+            </a:r>
+            <a:endParaRPr lang="en-US" sz="1800" dirty="0">
+              <a:latin typeface="Times New Roman"/>
+              <a:cs typeface="Times New Roman"/>
+            </a:endParaRPr>
+          </a:p>
+        </p:txBody>
+      </p:sp>
+      <p:sp>
+        <p:nvSpPr>
+          <p:cNvPr id="10" name="TextBox 9"/>
+          <p:cNvSpPr txBox="1"/>
+          <p:nvPr/>
+        </p:nvSpPr>
+        <p:spPr>
+          <a:xfrm>
+            <a:off x="5033139" y="3187327"/>
+            <a:ext cx="1287532" cy="646331"/>
+          </a:xfrm>
+          <a:prstGeom prst="rect">
+            <a:avLst/>
+          </a:prstGeom>
+          <a:ln w="6350" cmpd="sng"/>
+        </p:spPr>
+        <p:style>
+          <a:lnRef idx="2">
+            <a:schemeClr val="dk1"/>
+          </a:lnRef>
+          <a:fillRef idx="1">
+            <a:schemeClr val="lt1"/>
+          </a:fillRef>
+          <a:effectRef idx="0">
+            <a:schemeClr val="dk1"/>
+          </a:effectRef>
+          <a:fontRef idx="minor">
+            <a:schemeClr val="dk1"/>
+          </a:fontRef>
+        </p:style>
+        <p:txBody>
+          <a:bodyPr wrap="none" rtlCol="0">
+            <a:spAutoFit/>
+          </a:bodyPr>
+          <a:lstStyle/>
+          <a:p>
+            <a:r>
+              <a:rPr lang="en-US" sz="1800" dirty="0" smtClean="0">
+                <a:latin typeface="Times New Roman"/>
+                <a:cs typeface="Times New Roman"/>
+              </a:rPr>
+              <a:t>type</a:t>
+            </a:r>
+          </a:p>
+          <a:p>
+            <a:r>
+              <a:rPr lang="en-US" sz="1800" dirty="0" smtClean="0">
+                <a:latin typeface="Times New Roman"/>
+                <a:cs typeface="Times New Roman"/>
+              </a:rPr>
+              <a:t>propagation</a:t>
+            </a:r>
+            <a:endParaRPr lang="en-US" sz="1800" dirty="0">
+              <a:latin typeface="Times New Roman"/>
+              <a:cs typeface="Times New Roman"/>
+            </a:endParaRPr>
+          </a:p>
+        </p:txBody>
+      </p:sp>
+      <p:sp>
+        <p:nvSpPr>
+          <p:cNvPr id="11" name="TextBox 10"/>
+          <p:cNvSpPr txBox="1"/>
+          <p:nvPr/>
+        </p:nvSpPr>
+        <p:spPr>
+          <a:xfrm>
+            <a:off x="7507963" y="1813389"/>
+            <a:ext cx="902861" cy="646331"/>
+          </a:xfrm>
+          <a:prstGeom prst="rect">
+            <a:avLst/>
+          </a:prstGeom>
+          <a:ln w="6350" cmpd="sng"/>
+        </p:spPr>
+        <p:style>
+          <a:lnRef idx="2">
+            <a:schemeClr val="dk1"/>
+          </a:lnRef>
+          <a:fillRef idx="1">
+            <a:schemeClr val="lt1"/>
+          </a:fillRef>
+          <a:effectRef idx="0">
+            <a:schemeClr val="dk1"/>
+          </a:effectRef>
+          <a:fontRef idx="minor">
+            <a:schemeClr val="dk1"/>
+          </a:fontRef>
+        </p:style>
+        <p:txBody>
+          <a:bodyPr wrap="none" rtlCol="0">
+            <a:spAutoFit/>
+          </a:bodyPr>
+          <a:lstStyle/>
+          <a:p>
+            <a:r>
+              <a:rPr lang="en-US" sz="1800" dirty="0" smtClean="0">
+                <a:latin typeface="Times New Roman"/>
+                <a:cs typeface="Times New Roman"/>
+              </a:rPr>
+              <a:t>method</a:t>
+            </a:r>
+          </a:p>
+          <a:p>
+            <a:r>
+              <a:rPr lang="en-US" sz="1800" dirty="0" err="1" smtClean="0">
+                <a:latin typeface="Times New Roman"/>
+                <a:cs typeface="Times New Roman"/>
+              </a:rPr>
+              <a:t>inlining</a:t>
+            </a:r>
+            <a:endParaRPr lang="en-US" sz="1800" dirty="0">
+              <a:latin typeface="Times New Roman"/>
+              <a:cs typeface="Times New Roman"/>
+            </a:endParaRPr>
+          </a:p>
+        </p:txBody>
+      </p:sp>
+      <p:sp>
+        <p:nvSpPr>
+          <p:cNvPr id="12" name="TextBox 11"/>
+          <p:cNvSpPr txBox="1"/>
+          <p:nvPr/>
+        </p:nvSpPr>
+        <p:spPr>
+          <a:xfrm>
+            <a:off x="7007876" y="2910328"/>
+            <a:ext cx="1402948" cy="1200329"/>
+          </a:xfrm>
+          <a:prstGeom prst="rect">
+            <a:avLst/>
+          </a:prstGeom>
+          <a:ln w="6350" cmpd="sng"/>
+        </p:spPr>
+        <p:style>
+          <a:lnRef idx="2">
+            <a:schemeClr val="dk1"/>
+          </a:lnRef>
+          <a:fillRef idx="1">
+            <a:schemeClr val="lt1"/>
+          </a:fillRef>
+          <a:effectRef idx="0">
+            <a:schemeClr val="dk1"/>
+          </a:effectRef>
+          <a:fontRef idx="minor">
+            <a:schemeClr val="dk1"/>
+          </a:fontRef>
+        </p:style>
+        <p:txBody>
+          <a:bodyPr wrap="none" rtlCol="0">
+            <a:spAutoFit/>
+          </a:bodyPr>
+          <a:lstStyle/>
+          <a:p>
+            <a:r>
+              <a:rPr lang="en-US" sz="1800" dirty="0" smtClean="0">
+                <a:latin typeface="Times New Roman"/>
+                <a:cs typeface="Times New Roman"/>
+              </a:rPr>
+              <a:t>field &amp; array </a:t>
+            </a:r>
+          </a:p>
+          <a:p>
+            <a:r>
+              <a:rPr lang="en-US" sz="1800" dirty="0" smtClean="0">
+                <a:latin typeface="Times New Roman"/>
+                <a:cs typeface="Times New Roman"/>
+              </a:rPr>
+              <a:t>variables</a:t>
+            </a:r>
+          </a:p>
+          <a:p>
+            <a:r>
+              <a:rPr lang="en-US" sz="1800" dirty="0" smtClean="0">
+                <a:latin typeface="Times New Roman"/>
+                <a:cs typeface="Times New Roman"/>
+              </a:rPr>
+              <a:t>alpha</a:t>
+            </a:r>
+          </a:p>
+          <a:p>
+            <a:r>
+              <a:rPr lang="en-US" sz="1800" dirty="0" smtClean="0">
+                <a:latin typeface="Times New Roman"/>
+                <a:cs typeface="Times New Roman"/>
+              </a:rPr>
+              <a:t>renaming</a:t>
+            </a:r>
+            <a:endParaRPr lang="en-US" sz="1800" dirty="0">
+              <a:latin typeface="Times New Roman"/>
+              <a:cs typeface="Times New Roman"/>
+            </a:endParaRPr>
+          </a:p>
+        </p:txBody>
+      </p:sp>
+      <p:sp>
+        <p:nvSpPr>
+          <p:cNvPr id="13" name="TextBox 12"/>
+          <p:cNvSpPr txBox="1"/>
+          <p:nvPr/>
+        </p:nvSpPr>
+        <p:spPr>
+          <a:xfrm>
+            <a:off x="770627" y="4446317"/>
+            <a:ext cx="1544012" cy="646331"/>
+          </a:xfrm>
+          <a:prstGeom prst="rect">
+            <a:avLst/>
+          </a:prstGeom>
+          <a:ln w="6350" cmpd="sng"/>
+        </p:spPr>
+        <p:style>
+          <a:lnRef idx="2">
+            <a:schemeClr val="dk1"/>
+          </a:lnRef>
+          <a:fillRef idx="1">
+            <a:schemeClr val="lt1"/>
+          </a:fillRef>
+          <a:effectRef idx="0">
+            <a:schemeClr val="dk1"/>
+          </a:effectRef>
+          <a:fontRef idx="minor">
+            <a:schemeClr val="dk1"/>
+          </a:fontRef>
+        </p:style>
+        <p:txBody>
+          <a:bodyPr wrap="none" rtlCol="0">
+            <a:spAutoFit/>
+          </a:bodyPr>
+          <a:lstStyle/>
+          <a:p>
+            <a:r>
+              <a:rPr lang="en-US" sz="1800" dirty="0" smtClean="0">
+                <a:latin typeface="Times New Roman"/>
+                <a:cs typeface="Times New Roman"/>
+              </a:rPr>
+              <a:t>simplification</a:t>
+            </a:r>
+          </a:p>
+          <a:p>
+            <a:r>
+              <a:rPr lang="en-US" sz="1800" dirty="0" smtClean="0">
+                <a:latin typeface="Times New Roman"/>
+                <a:cs typeface="Times New Roman"/>
+              </a:rPr>
+              <a:t>transformation</a:t>
+            </a:r>
+            <a:endParaRPr lang="en-US" sz="1800" dirty="0">
+              <a:latin typeface="Times New Roman"/>
+              <a:cs typeface="Times New Roman"/>
+            </a:endParaRPr>
+          </a:p>
+        </p:txBody>
+      </p:sp>
+      <p:sp>
+        <p:nvSpPr>
+          <p:cNvPr id="14" name="TextBox 13"/>
+          <p:cNvSpPr txBox="1"/>
+          <p:nvPr/>
+        </p:nvSpPr>
+        <p:spPr>
+          <a:xfrm>
+            <a:off x="3016376" y="4307817"/>
+            <a:ext cx="1544012" cy="923330"/>
+          </a:xfrm>
+          <a:prstGeom prst="rect">
+            <a:avLst/>
+          </a:prstGeom>
+          <a:ln w="6350" cmpd="sng"/>
+        </p:spPr>
+        <p:style>
+          <a:lnRef idx="2">
+            <a:schemeClr val="dk1"/>
+          </a:lnRef>
+          <a:fillRef idx="1">
+            <a:schemeClr val="lt1"/>
+          </a:fillRef>
+          <a:effectRef idx="0">
+            <a:schemeClr val="dk1"/>
+          </a:effectRef>
+          <a:fontRef idx="minor">
+            <a:schemeClr val="dk1"/>
+          </a:fontRef>
+        </p:style>
+        <p:txBody>
+          <a:bodyPr wrap="none" rtlCol="0">
+            <a:spAutoFit/>
+          </a:bodyPr>
+          <a:lstStyle/>
+          <a:p>
+            <a:r>
+              <a:rPr lang="en-US" sz="1800" dirty="0" smtClean="0">
+                <a:latin typeface="Times New Roman"/>
+                <a:cs typeface="Times New Roman"/>
+              </a:rPr>
+              <a:t>single-path</a:t>
+            </a:r>
+          </a:p>
+          <a:p>
+            <a:r>
+              <a:rPr lang="en-US" sz="1800" dirty="0" smtClean="0">
+                <a:latin typeface="Times New Roman"/>
+                <a:cs typeface="Times New Roman"/>
+              </a:rPr>
+              <a:t>cases</a:t>
+            </a:r>
+          </a:p>
+          <a:p>
+            <a:r>
+              <a:rPr lang="en-US" sz="1800" dirty="0" smtClean="0">
+                <a:latin typeface="Times New Roman"/>
+                <a:cs typeface="Times New Roman"/>
+              </a:rPr>
+              <a:t>transformation</a:t>
+            </a:r>
+            <a:endParaRPr lang="en-US" sz="1800" dirty="0">
+              <a:latin typeface="Times New Roman"/>
+              <a:cs typeface="Times New Roman"/>
+            </a:endParaRPr>
+          </a:p>
+        </p:txBody>
+      </p:sp>
+      <p:sp>
+        <p:nvSpPr>
+          <p:cNvPr id="15" name="TextBox 14"/>
+          <p:cNvSpPr txBox="1"/>
+          <p:nvPr/>
+        </p:nvSpPr>
+        <p:spPr>
+          <a:xfrm>
+            <a:off x="5007491" y="4584816"/>
+            <a:ext cx="1338828" cy="369332"/>
+          </a:xfrm>
+          <a:prstGeom prst="rect">
+            <a:avLst/>
+          </a:prstGeom>
+          <a:ln w="6350" cmpd="sng"/>
+        </p:spPr>
+        <p:style>
+          <a:lnRef idx="2">
+            <a:schemeClr val="dk1"/>
+          </a:lnRef>
+          <a:fillRef idx="1">
+            <a:schemeClr val="lt1"/>
+          </a:fillRef>
+          <a:effectRef idx="0">
+            <a:schemeClr val="dk1"/>
+          </a:effectRef>
+          <a:fontRef idx="minor">
+            <a:schemeClr val="dk1"/>
+          </a:fontRef>
+        </p:style>
+        <p:txBody>
+          <a:bodyPr wrap="none" rtlCol="0">
+            <a:spAutoFit/>
+          </a:bodyPr>
+          <a:lstStyle/>
+          <a:p>
+            <a:r>
+              <a:rPr lang="en-US" sz="1800" dirty="0" smtClean="0">
+                <a:latin typeface="Times New Roman"/>
+                <a:cs typeface="Times New Roman"/>
+              </a:rPr>
+              <a:t>linearization</a:t>
+            </a:r>
+            <a:endParaRPr lang="en-US" sz="1800" dirty="0">
+              <a:latin typeface="Times New Roman"/>
+              <a:cs typeface="Times New Roman"/>
+            </a:endParaRPr>
+          </a:p>
+        </p:txBody>
+      </p:sp>
+      <p:sp>
+        <p:nvSpPr>
+          <p:cNvPr id="16" name="TextBox 15"/>
+          <p:cNvSpPr txBox="1"/>
+          <p:nvPr/>
+        </p:nvSpPr>
+        <p:spPr>
+          <a:xfrm>
+            <a:off x="7238708" y="4307817"/>
+            <a:ext cx="1172116" cy="923330"/>
+          </a:xfrm>
+          <a:prstGeom prst="rect">
+            <a:avLst/>
+          </a:prstGeom>
+          <a:ln w="6350" cmpd="sng"/>
+        </p:spPr>
+        <p:style>
+          <a:lnRef idx="2">
+            <a:schemeClr val="dk1"/>
+          </a:lnRef>
+          <a:fillRef idx="1">
+            <a:schemeClr val="lt1"/>
+          </a:fillRef>
+          <a:effectRef idx="0">
+            <a:schemeClr val="dk1"/>
+          </a:effectRef>
+          <a:fontRef idx="minor">
+            <a:schemeClr val="dk1"/>
+          </a:fontRef>
+        </p:style>
+        <p:txBody>
+          <a:bodyPr wrap="none" rtlCol="0">
+            <a:spAutoFit/>
+          </a:bodyPr>
+          <a:lstStyle/>
+          <a:p>
+            <a:r>
+              <a:rPr lang="en-US" sz="1800" dirty="0" smtClean="0">
+                <a:latin typeface="Times New Roman"/>
+                <a:cs typeface="Times New Roman"/>
+              </a:rPr>
+              <a:t>translation</a:t>
+            </a:r>
+          </a:p>
+          <a:p>
+            <a:r>
+              <a:rPr lang="en-US" sz="1800" dirty="0" smtClean="0">
+                <a:latin typeface="Times New Roman"/>
+                <a:cs typeface="Times New Roman"/>
+              </a:rPr>
+              <a:t>to Green</a:t>
+            </a:r>
+          </a:p>
+          <a:p>
+            <a:r>
+              <a:rPr lang="en-US" sz="1800" dirty="0" smtClean="0">
+                <a:latin typeface="Times New Roman"/>
+                <a:cs typeface="Times New Roman"/>
+              </a:rPr>
+              <a:t>expression</a:t>
+            </a:r>
+          </a:p>
+        </p:txBody>
+      </p:sp>
+      <p:cxnSp>
+        <p:nvCxnSpPr>
+          <p:cNvPr id="18" name="Straight Arrow Connector 17"/>
+          <p:cNvCxnSpPr>
+            <a:endCxn id="5" idx="1"/>
+          </p:cNvCxnSpPr>
+          <p:nvPr/>
+        </p:nvCxnSpPr>
+        <p:spPr bwMode="auto">
+          <a:xfrm>
+            <a:off x="271145" y="2136555"/>
+            <a:ext cx="499482" cy="0"/>
+          </a:xfrm>
+          <a:prstGeom prst="straightConnector1">
+            <a:avLst/>
+          </a:prstGeom>
+          <a:noFill/>
+          <a:ln w="6350" cap="flat" cmpd="sng" algn="ctr">
+            <a:solidFill>
+              <a:schemeClr val="tx1"/>
+            </a:solidFill>
+            <a:prstDash val="solid"/>
+            <a:round/>
+            <a:headEnd type="none" w="med" len="med"/>
+            <a:tailEnd type="arrow"/>
+          </a:ln>
+          <a:effectLst/>
+        </p:spPr>
+      </p:cxnSp>
+      <p:cxnSp>
+        <p:nvCxnSpPr>
+          <p:cNvPr id="20" name="Straight Arrow Connector 19"/>
+          <p:cNvCxnSpPr>
+            <a:stCxn id="5" idx="3"/>
+            <a:endCxn id="6" idx="1"/>
+          </p:cNvCxnSpPr>
+          <p:nvPr/>
+        </p:nvCxnSpPr>
+        <p:spPr bwMode="auto">
+          <a:xfrm>
+            <a:off x="2327463" y="2136555"/>
+            <a:ext cx="926320" cy="0"/>
+          </a:xfrm>
+          <a:prstGeom prst="straightConnector1">
+            <a:avLst/>
+          </a:prstGeom>
+          <a:noFill/>
+          <a:ln w="6350" cap="flat" cmpd="sng" algn="ctr">
+            <a:solidFill>
+              <a:schemeClr val="tx1"/>
+            </a:solidFill>
+            <a:prstDash val="solid"/>
+            <a:round/>
+            <a:headEnd type="none" w="med" len="med"/>
+            <a:tailEnd type="arrow"/>
+          </a:ln>
+          <a:effectLst/>
+        </p:spPr>
+      </p:cxnSp>
+      <p:cxnSp>
+        <p:nvCxnSpPr>
+          <p:cNvPr id="23" name="Straight Arrow Connector 22"/>
+          <p:cNvCxnSpPr>
+            <a:stCxn id="6" idx="3"/>
+            <a:endCxn id="7" idx="1"/>
+          </p:cNvCxnSpPr>
+          <p:nvPr/>
+        </p:nvCxnSpPr>
+        <p:spPr bwMode="auto">
+          <a:xfrm flipV="1">
+            <a:off x="4322981" y="2136554"/>
+            <a:ext cx="716476" cy="1"/>
+          </a:xfrm>
+          <a:prstGeom prst="straightConnector1">
+            <a:avLst/>
+          </a:prstGeom>
+          <a:noFill/>
+          <a:ln w="6350" cap="flat" cmpd="sng" algn="ctr">
+            <a:solidFill>
+              <a:schemeClr val="tx1"/>
+            </a:solidFill>
+            <a:prstDash val="solid"/>
+            <a:round/>
+            <a:headEnd type="none" w="med" len="med"/>
+            <a:tailEnd type="arrow"/>
+          </a:ln>
+          <a:effectLst/>
+        </p:spPr>
+      </p:cxnSp>
+      <p:cxnSp>
+        <p:nvCxnSpPr>
+          <p:cNvPr id="25" name="Straight Arrow Connector 24"/>
+          <p:cNvCxnSpPr>
+            <a:stCxn id="7" idx="3"/>
+            <a:endCxn id="11" idx="1"/>
+          </p:cNvCxnSpPr>
+          <p:nvPr/>
+        </p:nvCxnSpPr>
+        <p:spPr bwMode="auto">
+          <a:xfrm>
+            <a:off x="6314353" y="2136554"/>
+            <a:ext cx="1193610" cy="1"/>
+          </a:xfrm>
+          <a:prstGeom prst="straightConnector1">
+            <a:avLst/>
+          </a:prstGeom>
+          <a:noFill/>
+          <a:ln w="6350" cap="flat" cmpd="sng" algn="ctr">
+            <a:solidFill>
+              <a:schemeClr val="tx1"/>
+            </a:solidFill>
+            <a:prstDash val="solid"/>
+            <a:round/>
+            <a:headEnd type="none" w="med" len="med"/>
+            <a:tailEnd type="arrow"/>
+          </a:ln>
+          <a:effectLst/>
+        </p:spPr>
+      </p:cxnSp>
+      <p:cxnSp>
+        <p:nvCxnSpPr>
+          <p:cNvPr id="29" name="Curved Connector 28"/>
+          <p:cNvCxnSpPr>
+            <a:stCxn id="11" idx="3"/>
+            <a:endCxn id="6" idx="1"/>
+          </p:cNvCxnSpPr>
+          <p:nvPr/>
+        </p:nvCxnSpPr>
+        <p:spPr bwMode="auto">
+          <a:xfrm flipH="1">
+            <a:off x="3253783" y="2136555"/>
+            <a:ext cx="5157041" cy="12700"/>
+          </a:xfrm>
+          <a:prstGeom prst="curvedConnector5">
+            <a:avLst>
+              <a:gd name="adj1" fmla="val -3879"/>
+              <a:gd name="adj2" fmla="val -7181449"/>
+              <a:gd name="adj3" fmla="val 105541"/>
+            </a:avLst>
+          </a:prstGeom>
+          <a:noFill/>
+          <a:ln w="9525" cap="flat" cmpd="sng" algn="ctr">
+            <a:solidFill>
+              <a:srgbClr val="000000"/>
+            </a:solidFill>
+            <a:prstDash val="solid"/>
+            <a:round/>
+            <a:headEnd type="none" w="med" len="med"/>
+            <a:tailEnd type="arrow"/>
+          </a:ln>
+          <a:effectLst/>
+        </p:spPr>
+      </p:cxnSp>
+      <p:cxnSp>
+        <p:nvCxnSpPr>
+          <p:cNvPr id="35" name="Elbow Connector 34"/>
+          <p:cNvCxnSpPr>
+            <a:stCxn id="11" idx="3"/>
+            <a:endCxn id="8" idx="1"/>
+          </p:cNvCxnSpPr>
+          <p:nvPr/>
+        </p:nvCxnSpPr>
+        <p:spPr bwMode="auto">
+          <a:xfrm flipH="1">
+            <a:off x="770627" y="2136555"/>
+            <a:ext cx="7640197" cy="1373937"/>
+          </a:xfrm>
+          <a:prstGeom prst="bentConnector5">
+            <a:avLst>
+              <a:gd name="adj1" fmla="val -2992"/>
+              <a:gd name="adj2" fmla="val 52230"/>
+              <a:gd name="adj3" fmla="val 102992"/>
+            </a:avLst>
+          </a:prstGeom>
+          <a:noFill/>
+          <a:ln w="9525" cap="flat" cmpd="sng" algn="ctr">
+            <a:solidFill>
+              <a:srgbClr val="000000"/>
+            </a:solidFill>
+            <a:prstDash val="solid"/>
+            <a:round/>
+            <a:headEnd type="none" w="med" len="med"/>
+            <a:tailEnd type="arrow"/>
+          </a:ln>
+          <a:effectLst/>
+        </p:spPr>
+      </p:cxnSp>
+      <p:cxnSp>
+        <p:nvCxnSpPr>
+          <p:cNvPr id="39" name="Straight Arrow Connector 38"/>
+          <p:cNvCxnSpPr>
+            <a:endCxn id="9" idx="1"/>
+          </p:cNvCxnSpPr>
+          <p:nvPr/>
+        </p:nvCxnSpPr>
+        <p:spPr bwMode="auto">
+          <a:xfrm>
+            <a:off x="2327463" y="3510492"/>
+            <a:ext cx="688913" cy="0"/>
+          </a:xfrm>
+          <a:prstGeom prst="straightConnector1">
+            <a:avLst/>
+          </a:prstGeom>
+          <a:noFill/>
+          <a:ln w="6350" cap="flat" cmpd="sng" algn="ctr">
+            <a:solidFill>
+              <a:schemeClr val="tx1"/>
+            </a:solidFill>
+            <a:prstDash val="solid"/>
+            <a:round/>
+            <a:headEnd type="none" w="med" len="med"/>
+            <a:tailEnd type="arrow"/>
+          </a:ln>
+          <a:effectLst/>
+        </p:spPr>
+      </p:cxnSp>
+      <p:cxnSp>
+        <p:nvCxnSpPr>
+          <p:cNvPr id="41" name="Straight Arrow Connector 40"/>
+          <p:cNvCxnSpPr>
+            <a:stCxn id="9" idx="3"/>
+            <a:endCxn id="10" idx="1"/>
+          </p:cNvCxnSpPr>
+          <p:nvPr/>
+        </p:nvCxnSpPr>
+        <p:spPr bwMode="auto">
+          <a:xfrm>
+            <a:off x="4560388" y="3510492"/>
+            <a:ext cx="472751" cy="1"/>
+          </a:xfrm>
+          <a:prstGeom prst="straightConnector1">
+            <a:avLst/>
+          </a:prstGeom>
+          <a:noFill/>
+          <a:ln w="6350" cap="flat" cmpd="sng" algn="ctr">
+            <a:solidFill>
+              <a:schemeClr val="tx1"/>
+            </a:solidFill>
+            <a:prstDash val="solid"/>
+            <a:round/>
+            <a:headEnd type="none" w="med" len="med"/>
+            <a:tailEnd type="arrow"/>
+          </a:ln>
+          <a:effectLst/>
+        </p:spPr>
+      </p:cxnSp>
+      <p:cxnSp>
+        <p:nvCxnSpPr>
+          <p:cNvPr id="44" name="Straight Arrow Connector 43"/>
+          <p:cNvCxnSpPr>
+            <a:stCxn id="10" idx="3"/>
+            <a:endCxn id="12" idx="1"/>
+          </p:cNvCxnSpPr>
+          <p:nvPr/>
+        </p:nvCxnSpPr>
+        <p:spPr bwMode="auto">
+          <a:xfrm>
+            <a:off x="6320671" y="3510493"/>
+            <a:ext cx="687205" cy="0"/>
+          </a:xfrm>
+          <a:prstGeom prst="straightConnector1">
+            <a:avLst/>
+          </a:prstGeom>
+          <a:noFill/>
+          <a:ln w="6350" cap="flat" cmpd="sng" algn="ctr">
+            <a:solidFill>
+              <a:schemeClr val="tx1"/>
+            </a:solidFill>
+            <a:prstDash val="solid"/>
+            <a:round/>
+            <a:headEnd type="none" w="med" len="med"/>
+            <a:tailEnd type="arrow"/>
+          </a:ln>
+          <a:effectLst/>
+        </p:spPr>
+      </p:cxnSp>
+      <p:cxnSp>
+        <p:nvCxnSpPr>
+          <p:cNvPr id="48" name="Elbow Connector 47"/>
+          <p:cNvCxnSpPr>
+            <a:stCxn id="12" idx="3"/>
+            <a:endCxn id="13" idx="1"/>
+          </p:cNvCxnSpPr>
+          <p:nvPr/>
+        </p:nvCxnSpPr>
+        <p:spPr bwMode="auto">
+          <a:xfrm flipH="1">
+            <a:off x="770627" y="3510493"/>
+            <a:ext cx="7640197" cy="1258990"/>
+          </a:xfrm>
+          <a:prstGeom prst="bentConnector5">
+            <a:avLst>
+              <a:gd name="adj1" fmla="val -2992"/>
+              <a:gd name="adj2" fmla="val 55334"/>
+              <a:gd name="adj3" fmla="val 102992"/>
+            </a:avLst>
+          </a:prstGeom>
+          <a:noFill/>
+          <a:ln w="9525" cap="flat" cmpd="sng" algn="ctr">
+            <a:solidFill>
+              <a:srgbClr val="000000"/>
+            </a:solidFill>
+            <a:prstDash val="solid"/>
+            <a:round/>
+            <a:headEnd type="none" w="med" len="med"/>
+            <a:tailEnd type="arrow"/>
+          </a:ln>
+          <a:effectLst/>
+        </p:spPr>
+      </p:cxnSp>
+      <p:cxnSp>
+        <p:nvCxnSpPr>
+          <p:cNvPr id="53" name="Straight Arrow Connector 52"/>
+          <p:cNvCxnSpPr>
+            <a:stCxn id="13" idx="3"/>
+            <a:endCxn id="14" idx="1"/>
+          </p:cNvCxnSpPr>
+          <p:nvPr/>
+        </p:nvCxnSpPr>
+        <p:spPr bwMode="auto">
+          <a:xfrm flipV="1">
+            <a:off x="2314639" y="4769482"/>
+            <a:ext cx="701737" cy="1"/>
+          </a:xfrm>
+          <a:prstGeom prst="straightConnector1">
+            <a:avLst/>
+          </a:prstGeom>
+          <a:noFill/>
+          <a:ln w="6350" cap="flat" cmpd="sng" algn="ctr">
+            <a:solidFill>
+              <a:schemeClr val="tx1"/>
+            </a:solidFill>
+            <a:prstDash val="solid"/>
+            <a:round/>
+            <a:headEnd type="none" w="med" len="med"/>
+            <a:tailEnd type="arrow"/>
+          </a:ln>
+          <a:effectLst/>
+        </p:spPr>
+      </p:cxnSp>
+      <p:cxnSp>
+        <p:nvCxnSpPr>
+          <p:cNvPr id="54" name="Straight Arrow Connector 53"/>
+          <p:cNvCxnSpPr>
+            <a:stCxn id="14" idx="3"/>
+            <a:endCxn id="15" idx="1"/>
+          </p:cNvCxnSpPr>
+          <p:nvPr/>
+        </p:nvCxnSpPr>
+        <p:spPr bwMode="auto">
+          <a:xfrm>
+            <a:off x="4560388" y="4769482"/>
+            <a:ext cx="447103" cy="0"/>
+          </a:xfrm>
+          <a:prstGeom prst="straightConnector1">
+            <a:avLst/>
+          </a:prstGeom>
+          <a:noFill/>
+          <a:ln w="6350" cap="flat" cmpd="sng" algn="ctr">
+            <a:solidFill>
+              <a:schemeClr val="tx1"/>
+            </a:solidFill>
+            <a:prstDash val="solid"/>
+            <a:round/>
+            <a:headEnd type="none" w="med" len="med"/>
+            <a:tailEnd type="arrow"/>
+          </a:ln>
+          <a:effectLst/>
+        </p:spPr>
+      </p:cxnSp>
+      <p:cxnSp>
+        <p:nvCxnSpPr>
+          <p:cNvPr id="87" name="Straight Arrow Connector 86"/>
+          <p:cNvCxnSpPr>
+            <a:stCxn id="15" idx="3"/>
+            <a:endCxn id="16" idx="1"/>
+          </p:cNvCxnSpPr>
+          <p:nvPr/>
+        </p:nvCxnSpPr>
+        <p:spPr bwMode="auto">
+          <a:xfrm>
+            <a:off x="6346319" y="4769482"/>
+            <a:ext cx="892389" cy="0"/>
+          </a:xfrm>
+          <a:prstGeom prst="straightConnector1">
+            <a:avLst/>
+          </a:prstGeom>
+          <a:noFill/>
+          <a:ln w="6350" cap="flat" cmpd="sng" algn="ctr">
+            <a:solidFill>
+              <a:schemeClr val="tx1"/>
+            </a:solidFill>
+            <a:prstDash val="solid"/>
+            <a:round/>
+            <a:headEnd type="none" w="med" len="med"/>
+            <a:tailEnd type="arrow"/>
+          </a:ln>
+          <a:effectLst/>
+        </p:spPr>
+      </p:cxnSp>
+      <p:cxnSp>
+        <p:nvCxnSpPr>
+          <p:cNvPr id="91" name="Straight Arrow Connector 90"/>
+          <p:cNvCxnSpPr>
+            <a:stCxn id="16" idx="3"/>
+          </p:cNvCxnSpPr>
+          <p:nvPr/>
+        </p:nvCxnSpPr>
+        <p:spPr bwMode="auto">
+          <a:xfrm>
+            <a:off x="8410824" y="4769482"/>
+            <a:ext cx="451328" cy="0"/>
+          </a:xfrm>
+          <a:prstGeom prst="straightConnector1">
+            <a:avLst/>
+          </a:prstGeom>
+          <a:noFill/>
+          <a:ln w="6350" cap="flat" cmpd="sng" algn="ctr">
+            <a:solidFill>
+              <a:schemeClr val="tx1"/>
+            </a:solidFill>
+            <a:prstDash val="solid"/>
+            <a:round/>
+            <a:headEnd type="none" w="med" len="med"/>
+            <a:tailEnd type="arrow"/>
+          </a:ln>
+          <a:effectLst/>
+        </p:spPr>
+      </p:cxnSp>
+    </p:spTree>
+    <p:extLst>
+      <p:ext uri="{BB962C8B-B14F-4D97-AF65-F5344CB8AC3E}">
+        <p14:creationId xmlns:p14="http://schemas.microsoft.com/office/powerpoint/2010/main" val="2192269327"/>
       </p:ext>
     </p:extLst>
   </p:cSld>

</xml_diff>

<commit_message>
Minor edits to the motivating example and Introduction, fixing a broken section reference in the Technique section, adding another point to the Future Work section
</commit_message>
<xml_diff>
--- a/figures/Figures.pptx
+++ b/figures/Figures.pptx
@@ -6742,7 +6742,7 @@
         </p:nvSpPr>
         <p:spPr>
           <a:xfrm>
-            <a:off x="613639" y="513676"/>
+            <a:off x="242593" y="513676"/>
             <a:ext cx="4083169" cy="5572296"/>
           </a:xfrm>
           <a:prstGeom prst="rect">
@@ -8285,7 +8285,7 @@
         </p:nvSpPr>
         <p:spPr>
           <a:xfrm>
-            <a:off x="5889680" y="856134"/>
+            <a:off x="5418737" y="856134"/>
             <a:ext cx="2123974" cy="646331"/>
           </a:xfrm>
           <a:prstGeom prst="rect">
@@ -8405,7 +8405,7 @@
         </p:nvSpPr>
         <p:spPr>
           <a:xfrm>
-            <a:off x="5543375" y="1829916"/>
+            <a:off x="5072432" y="1829916"/>
             <a:ext cx="2816584" cy="646331"/>
           </a:xfrm>
           <a:prstGeom prst="rect">
@@ -8525,8 +8525,8 @@
         </p:nvSpPr>
         <p:spPr>
           <a:xfrm>
-            <a:off x="5021073" y="2681493"/>
-            <a:ext cx="1985452" cy="1754327"/>
+            <a:off x="4411608" y="2681493"/>
+            <a:ext cx="2262496" cy="1754327"/>
           </a:xfrm>
           <a:prstGeom prst="rect">
             <a:avLst/>
@@ -8538,6 +8538,19 @@
             <a:spAutoFit/>
           </a:bodyPr>
           <a:lstStyle/>
+          <a:p>
+            <a:pPr algn="ctr"/>
+            <a:r>
+              <a:rPr lang="en-US" sz="1800" dirty="0" smtClean="0">
+                <a:solidFill>
+                  <a:srgbClr val="000000"/>
+                </a:solidFill>
+                <a:latin typeface="Courier"/>
+                <a:cs typeface="Courier"/>
+              </a:rPr>
+              <a:t>void</a:t>
+            </a:r>
+          </a:p>
           <a:p>
             <a:pPr algn="ctr"/>
             <a:r>
@@ -8660,27 +8673,14 @@
           <a:p>
             <a:pPr algn="ctr"/>
             <a:r>
-              <a:rPr lang="en-US" sz="1800" dirty="0" smtClean="0">
-                <a:solidFill>
-                  <a:srgbClr val="000000"/>
-                </a:solidFill>
-                <a:latin typeface="Courier"/>
-                <a:cs typeface="Courier"/>
-              </a:rPr>
-              <a:t>Bounds</a:t>
-            </a:r>
-          </a:p>
-          <a:p>
-            <a:pPr algn="ctr"/>
-            <a:r>
-              <a:rPr lang="en-US" sz="1800" dirty="0" smtClean="0">
-                <a:solidFill>
-                  <a:srgbClr val="000000"/>
-                </a:solidFill>
-                <a:latin typeface="Courier"/>
-                <a:cs typeface="Courier"/>
-              </a:rPr>
-              <a:t>Exception</a:t>
+              <a:rPr lang="en-US" sz="1800" dirty="0" err="1" smtClean="0">
+                <a:solidFill>
+                  <a:srgbClr val="000000"/>
+                </a:solidFill>
+                <a:latin typeface="Courier"/>
+                <a:cs typeface="Courier"/>
+              </a:rPr>
+              <a:t>BoundsException</a:t>
             </a:r>
             <a:r>
               <a:rPr lang="en-US" sz="1800" dirty="0" smtClean="0">
@@ -8689,6 +8689,10 @@
               </a:rPr>
               <a:t> </a:t>
             </a:r>
+            <a:endParaRPr lang="en-US" sz="1800" dirty="0" smtClean="0">
+              <a:latin typeface="Courier"/>
+              <a:cs typeface="Courier"/>
+            </a:endParaRPr>
           </a:p>
         </p:txBody>
       </p:sp>
@@ -8700,8 +8704,8 @@
         </p:nvSpPr>
         <p:spPr>
           <a:xfrm>
-            <a:off x="5889680" y="4523017"/>
-            <a:ext cx="2123974" cy="646331"/>
+            <a:off x="5663438" y="4722783"/>
+            <a:ext cx="2262496" cy="646331"/>
           </a:xfrm>
           <a:prstGeom prst="rect">
             <a:avLst/>
@@ -8715,6 +8719,16 @@
           <a:lstStyle/>
           <a:p>
             <a:pPr algn="ctr"/>
+            <a:r>
+              <a:rPr lang="en-US" sz="1800" dirty="0" smtClean="0">
+                <a:solidFill>
+                  <a:srgbClr val="20999D"/>
+                </a:solidFill>
+                <a:latin typeface="Courier"/>
+                <a:cs typeface="Courier"/>
+              </a:rPr>
+              <a:t>E </a:t>
+            </a:r>
             <a:r>
               <a:rPr lang="en-US" sz="1800" dirty="0" err="1" smtClean="0">
                 <a:solidFill>
@@ -8813,7 +8827,7 @@
         </p:nvSpPr>
         <p:spPr>
           <a:xfrm>
-            <a:off x="5889680" y="5422194"/>
+            <a:off x="5732699" y="5621960"/>
             <a:ext cx="2123974" cy="646331"/>
           </a:xfrm>
           <a:prstGeom prst="rect">
@@ -8926,8 +8940,8 @@
         </p:nvSpPr>
         <p:spPr>
           <a:xfrm>
-            <a:off x="7438572" y="2681493"/>
-            <a:ext cx="1569886" cy="646331"/>
+            <a:off x="7267320" y="2681493"/>
+            <a:ext cx="1569886" cy="923330"/>
           </a:xfrm>
           <a:prstGeom prst="rect">
             <a:avLst/>
@@ -8942,7 +8956,27 @@
           <a:p>
             <a:pPr algn="ctr"/>
             <a:r>
-              <a:rPr lang="en-US" sz="1800" dirty="0">
+              <a:rPr lang="en-US" sz="1800" dirty="0" err="1" smtClean="0">
+                <a:solidFill>
+                  <a:srgbClr val="20999D"/>
+                </a:solidFill>
+                <a:latin typeface="Courier"/>
+                <a:cs typeface="Courier"/>
+              </a:rPr>
+              <a:t>int</a:t>
+            </a:r>
+            <a:endParaRPr lang="en-US" sz="1800" dirty="0" smtClean="0">
+              <a:solidFill>
+                <a:srgbClr val="000000"/>
+              </a:solidFill>
+              <a:latin typeface="Courier"/>
+              <a:cs typeface="Courier"/>
+            </a:endParaRPr>
+          </a:p>
+          <a:p>
+            <a:pPr algn="ctr"/>
+            <a:r>
+              <a:rPr lang="en-US" sz="1800" dirty="0" smtClean="0">
                 <a:solidFill>
                   <a:srgbClr val="000000"/>
                 </a:solidFill>
@@ -9009,7 +9043,7 @@
         </p:nvSpPr>
         <p:spPr>
           <a:xfrm>
-            <a:off x="7577094" y="3566994"/>
+            <a:off x="7405842" y="3952257"/>
             <a:ext cx="1292842" cy="646331"/>
           </a:xfrm>
           <a:prstGeom prst="rect">
@@ -9065,7 +9099,7 @@
         </p:nvCxnSpPr>
         <p:spPr bwMode="auto">
           <a:xfrm>
-            <a:off x="6951667" y="1502465"/>
+            <a:off x="6480724" y="1502465"/>
             <a:ext cx="0" cy="327451"/>
           </a:xfrm>
           <a:prstGeom prst="straightConnector1">
@@ -9095,7 +9129,7 @@
         </p:nvCxnSpPr>
         <p:spPr bwMode="auto">
           <a:xfrm flipH="1">
-            <a:off x="6013799" y="2476247"/>
+            <a:off x="5542856" y="2476247"/>
             <a:ext cx="937868" cy="205246"/>
           </a:xfrm>
           <a:prstGeom prst="straightConnector1">
@@ -9122,7 +9156,7 @@
         </p:nvCxnSpPr>
         <p:spPr bwMode="auto">
           <a:xfrm>
-            <a:off x="6951667" y="5169348"/>
+            <a:off x="6794686" y="5369114"/>
             <a:ext cx="0" cy="252846"/>
           </a:xfrm>
           <a:prstGeom prst="straightConnector1">
@@ -9152,8 +9186,8 @@
         </p:nvCxnSpPr>
         <p:spPr bwMode="auto">
           <a:xfrm>
-            <a:off x="8223515" y="3327824"/>
-            <a:ext cx="0" cy="239170"/>
+            <a:off x="8052263" y="3604823"/>
+            <a:ext cx="0" cy="347434"/>
           </a:xfrm>
           <a:prstGeom prst="straightConnector1">
             <a:avLst/>
@@ -9173,65 +9207,6 @@
       </p:cxnSp>
       <p:cxnSp>
         <p:nvCxnSpPr>
-          <p:cNvPr id="35" name="Straight Arrow Connector 34"/>
-          <p:cNvCxnSpPr>
-            <a:stCxn id="44" idx="0"/>
-            <a:endCxn id="24" idx="0"/>
-          </p:cNvCxnSpPr>
-          <p:nvPr/>
-        </p:nvCxnSpPr>
-        <p:spPr bwMode="auto">
-          <a:xfrm flipH="1">
-            <a:off x="6951667" y="622678"/>
-            <a:ext cx="6015" cy="233456"/>
-          </a:xfrm>
-          <a:prstGeom prst="straightConnector1">
-            <a:avLst/>
-          </a:prstGeom>
-          <a:noFill/>
-          <a:ln w="6350" cap="flat" cmpd="sng" algn="ctr">
-            <a:solidFill>
-              <a:schemeClr val="tx1"/>
-            </a:solidFill>
-            <a:prstDash val="solid"/>
-            <a:round/>
-            <a:headEnd type="none" w="med" len="med"/>
-            <a:tailEnd type="arrow"/>
-          </a:ln>
-          <a:effectLst/>
-        </p:spPr>
-      </p:cxnSp>
-      <p:cxnSp>
-        <p:nvCxnSpPr>
-          <p:cNvPr id="36" name="Straight Arrow Connector 35"/>
-          <p:cNvCxnSpPr>
-            <a:stCxn id="30" idx="2"/>
-          </p:cNvCxnSpPr>
-          <p:nvPr/>
-        </p:nvCxnSpPr>
-        <p:spPr bwMode="auto">
-          <a:xfrm>
-            <a:off x="8223515" y="4213325"/>
-            <a:ext cx="0" cy="523954"/>
-          </a:xfrm>
-          <a:prstGeom prst="straightConnector1">
-            <a:avLst/>
-          </a:prstGeom>
-          <a:noFill/>
-          <a:ln w="6350" cap="flat" cmpd="sng" algn="ctr">
-            <a:solidFill>
-              <a:schemeClr val="tx1"/>
-            </a:solidFill>
-            <a:prstDash val="solid"/>
-            <a:round/>
-            <a:headEnd type="none" w="med" len="med"/>
-            <a:tailEnd type="arrow"/>
-          </a:ln>
-          <a:effectLst/>
-        </p:spPr>
-      </p:cxnSp>
-      <p:cxnSp>
-        <p:nvCxnSpPr>
           <p:cNvPr id="37" name="Straight Arrow Connector 36"/>
           <p:cNvCxnSpPr>
             <a:stCxn id="25" idx="2"/>
@@ -9241,8 +9216,8 @@
         </p:nvCxnSpPr>
         <p:spPr bwMode="auto">
           <a:xfrm>
-            <a:off x="6951667" y="2476247"/>
-            <a:ext cx="1271848" cy="205246"/>
+            <a:off x="6480724" y="2476247"/>
+            <a:ext cx="1571539" cy="205246"/>
           </a:xfrm>
           <a:prstGeom prst="straightConnector1">
             <a:avLst/>
@@ -9268,7 +9243,7 @@
         </p:nvSpPr>
         <p:spPr>
           <a:xfrm>
-            <a:off x="5837883" y="2254487"/>
+            <a:off x="5366940" y="2254487"/>
             <a:ext cx="487408" cy="369332"/>
           </a:xfrm>
           <a:prstGeom prst="rect">
@@ -9306,7 +9281,7 @@
         </p:nvSpPr>
         <p:spPr>
           <a:xfrm>
-            <a:off x="6936559" y="4028659"/>
+            <a:off x="6779578" y="4028659"/>
             <a:ext cx="487408" cy="369332"/>
           </a:xfrm>
           <a:prstGeom prst="rect">
@@ -9344,7 +9319,7 @@
         </p:nvSpPr>
         <p:spPr>
           <a:xfrm>
-            <a:off x="7912287" y="2254487"/>
+            <a:off x="7741035" y="2254487"/>
             <a:ext cx="487408" cy="369332"/>
           </a:xfrm>
           <a:prstGeom prst="rect">
@@ -9382,7 +9357,7 @@
         </p:nvSpPr>
         <p:spPr bwMode="auto">
           <a:xfrm>
-            <a:off x="1983644" y="3866643"/>
+            <a:off x="1626869" y="3866643"/>
             <a:ext cx="1741033" cy="399764"/>
           </a:xfrm>
           <a:prstGeom prst="rect">
@@ -9446,8 +9421,8 @@
         </p:nvSpPr>
         <p:spPr bwMode="auto">
           <a:xfrm>
-            <a:off x="4992531" y="622678"/>
-            <a:ext cx="3930301" cy="5463294"/>
+            <a:off x="4478775" y="622677"/>
+            <a:ext cx="4315618" cy="5645613"/>
           </a:xfrm>
           <a:prstGeom prst="rect">
             <a:avLst/>
@@ -9510,8 +9485,8 @@
         </p:nvCxnSpPr>
         <p:spPr bwMode="auto">
           <a:xfrm flipV="1">
-            <a:off x="3724677" y="651216"/>
-            <a:ext cx="1246678" cy="3215428"/>
+            <a:off x="3367902" y="651216"/>
+            <a:ext cx="1110873" cy="3215428"/>
           </a:xfrm>
           <a:prstGeom prst="straightConnector1">
             <a:avLst/>
@@ -9537,8 +9512,8 @@
         </p:nvCxnSpPr>
         <p:spPr bwMode="auto">
           <a:xfrm>
-            <a:off x="3724677" y="4266407"/>
-            <a:ext cx="1246678" cy="1702235"/>
+            <a:off x="3367902" y="4266407"/>
+            <a:ext cx="1110873" cy="2001883"/>
           </a:xfrm>
           <a:prstGeom prst="straightConnector1">
             <a:avLst/>
@@ -9567,8 +9542,8 @@
         </p:nvCxnSpPr>
         <p:spPr bwMode="auto">
           <a:xfrm>
-            <a:off x="6951667" y="2476247"/>
-            <a:ext cx="0" cy="2046770"/>
+            <a:off x="6480724" y="2476247"/>
+            <a:ext cx="313962" cy="2246536"/>
           </a:xfrm>
           <a:prstGeom prst="straightConnector1">
             <a:avLst/>

</xml_diff>

<commit_message>
Finishing first draft of Introduction
</commit_message>
<xml_diff>
--- a/figures/Figures.pptx
+++ b/figures/Figures.pptx
@@ -5612,7 +5612,7 @@
         <p:dissolve/>
       </p:transition>
     </mc:Choice>
-    <mc:Fallback xmlns:a14="http://schemas.microsoft.com/office/drawing/2010/main" xmlns:m="http://schemas.openxmlformats.org/officeDocument/2006/math" xmlns="">
+    <mc:Fallback xmlns="" xmlns:m="http://schemas.openxmlformats.org/officeDocument/2006/math" xmlns:a14="http://schemas.microsoft.com/office/drawing/2010/main">
       <p:transition spd="med">
         <p:fade/>
       </p:transition>
@@ -5869,7 +5869,7 @@
         <p:dissolve/>
       </p:transition>
     </mc:Choice>
-    <mc:Fallback xmlns:a14="http://schemas.microsoft.com/office/drawing/2010/main" xmlns:m="http://schemas.openxmlformats.org/officeDocument/2006/math" xmlns="">
+    <mc:Fallback xmlns="" xmlns:m="http://schemas.openxmlformats.org/officeDocument/2006/math" xmlns:a14="http://schemas.microsoft.com/office/drawing/2010/main">
       <p:transition spd="med">
         <p:fade/>
       </p:transition>
@@ -5941,21 +5941,21 @@
               <a:buAutoNum type="arabicPlain"/>
             </a:pPr>
             <a:r>
-              <a:rPr lang="en-US" sz="2000" dirty="0">
+              <a:rPr lang="en-US" sz="2000">
                 <a:latin typeface="Courier"/>
                 <a:cs typeface="Courier"/>
               </a:rPr>
               <a:t> </a:t>
             </a:r>
             <a:r>
-              <a:rPr lang="en-US" sz="2000" b="1" dirty="0" err="1" smtClean="0">
+              <a:rPr lang="en-US" sz="2000" b="1" smtClean="0">
                 <a:solidFill>
                   <a:srgbClr val="BB7977"/>
                 </a:solidFill>
                 <a:latin typeface="Courier"/>
                 <a:cs typeface="Courier"/>
               </a:rPr>
-              <a:t>ArrayList</a:t>
+              <a:t>List</a:t>
             </a:r>
             <a:r>
               <a:rPr lang="en-US" sz="2000" dirty="0">
@@ -13732,7 +13732,7 @@
         <p:dissolve/>
       </p:transition>
     </mc:Choice>
-    <mc:Fallback xmlns:a14="http://schemas.microsoft.com/office/drawing/2010/main" xmlns:m="http://schemas.openxmlformats.org/officeDocument/2006/math" xmlns="">
+    <mc:Fallback xmlns="" xmlns:m="http://schemas.openxmlformats.org/officeDocument/2006/math" xmlns:a14="http://schemas.microsoft.com/office/drawing/2010/main">
       <p:transition spd="med">
         <p:fade/>
       </p:transition>

</xml_diff>

<commit_message>
Filling in a few gaps in the motivating example walkthrough, adding a reference to the workshop paper, adding references to the giant results tables in the Evaluation section, shortening again to 10 pages
</commit_message>
<xml_diff>
--- a/figures/Figures.pptx
+++ b/figures/Figures.pptx
@@ -5612,7 +5612,7 @@
         <p:dissolve/>
       </p:transition>
     </mc:Choice>
-    <mc:Fallback xmlns="" xmlns:m="http://schemas.openxmlformats.org/officeDocument/2006/math" xmlns:a14="http://schemas.microsoft.com/office/drawing/2010/main">
+    <mc:Fallback xmlns:a14="http://schemas.microsoft.com/office/drawing/2010/main" xmlns:m="http://schemas.openxmlformats.org/officeDocument/2006/math" xmlns="">
       <p:transition spd="med">
         <p:fade/>
       </p:transition>
@@ -5869,7 +5869,7 @@
         <p:dissolve/>
       </p:transition>
     </mc:Choice>
-    <mc:Fallback xmlns="" xmlns:m="http://schemas.openxmlformats.org/officeDocument/2006/math" xmlns:a14="http://schemas.microsoft.com/office/drawing/2010/main">
+    <mc:Fallback xmlns:a14="http://schemas.microsoft.com/office/drawing/2010/main" xmlns:m="http://schemas.openxmlformats.org/officeDocument/2006/math" xmlns="">
       <p:transition spd="med">
         <p:fade/>
       </p:transition>
@@ -5941,14 +5941,14 @@
               <a:buAutoNum type="arabicPlain"/>
             </a:pPr>
             <a:r>
-              <a:rPr lang="en-US" sz="2000">
+              <a:rPr lang="en-US" sz="2000" dirty="0">
                 <a:latin typeface="Courier"/>
                 <a:cs typeface="Courier"/>
               </a:rPr>
               <a:t> </a:t>
             </a:r>
             <a:r>
-              <a:rPr lang="en-US" sz="2000" b="1" smtClean="0">
+              <a:rPr lang="en-US" sz="2000" b="1" dirty="0" smtClean="0">
                 <a:solidFill>
                   <a:srgbClr val="BB7977"/>
                 </a:solidFill>
@@ -9356,6 +9356,370 @@
           <a:fontRef idx="none"/>
         </p:style>
       </p:cxnSp>
+      <p:sp>
+        <p:nvSpPr>
+          <p:cNvPr id="4" name="Rectangle 3"/>
+          <p:cNvSpPr/>
+          <p:nvPr/>
+        </p:nvSpPr>
+        <p:spPr>
+          <a:xfrm>
+            <a:off x="606777" y="2288036"/>
+            <a:ext cx="3598334" cy="943956"/>
+          </a:xfrm>
+          <a:prstGeom prst="rect">
+            <a:avLst/>
+          </a:prstGeom>
+          <a:noFill/>
+          <a:ln w="25400" cap="flat">
+            <a:solidFill>
+              <a:srgbClr val="008000"/>
+            </a:solidFill>
+            <a:prstDash val="sysDash"/>
+            <a:round/>
+          </a:ln>
+          <a:effectLst/>
+          <a:sp3d/>
+        </p:spPr>
+        <p:style>
+          <a:lnRef idx="0">
+            <a:scrgbClr r="0" g="0" b="0"/>
+          </a:lnRef>
+          <a:fillRef idx="0">
+            <a:scrgbClr r="0" g="0" b="0"/>
+          </a:fillRef>
+          <a:effectRef idx="0">
+            <a:scrgbClr r="0" g="0" b="0"/>
+          </a:effectRef>
+          <a:fontRef idx="none"/>
+        </p:style>
+        <p:txBody>
+          <a:bodyPr rot="0" spcFirstLastPara="1" vertOverflow="overflow" horzOverflow="overflow" vert="horz" wrap="square" lIns="45719" tIns="45719" rIns="45719" bIns="45719" numCol="1" spcCol="38100" rtlCol="0" anchor="t">
+            <a:spAutoFit/>
+          </a:bodyPr>
+          <a:lstStyle/>
+          <a:p>
+            <a:pPr marL="0" marR="0" indent="0" algn="l" defTabSz="914400" rtl="0" fontAlgn="auto" latinLnBrk="0" hangingPunct="0">
+              <a:lnSpc>
+                <a:spcPct val="100000"/>
+              </a:lnSpc>
+              <a:spcBef>
+                <a:spcPts val="0"/>
+              </a:spcBef>
+              <a:spcAft>
+                <a:spcPts val="0"/>
+              </a:spcAft>
+              <a:buClrTx/>
+              <a:buSzTx/>
+              <a:buFontTx/>
+              <a:buNone/>
+              <a:tabLst/>
+            </a:pPr>
+            <a:endParaRPr kumimoji="0" lang="en-US" sz="1200" b="0" i="0" u="none" strike="noStrike" cap="none" spc="0" normalizeH="0" baseline="0">
+              <a:ln>
+                <a:noFill/>
+              </a:ln>
+              <a:solidFill>
+                <a:srgbClr val="000000"/>
+              </a:solidFill>
+              <a:effectLst/>
+              <a:uFillTx/>
+              <a:latin typeface="Arial"/>
+              <a:ea typeface="Arial"/>
+              <a:cs typeface="Arial"/>
+              <a:sym typeface="Arial"/>
+            </a:endParaRPr>
+          </a:p>
+        </p:txBody>
+      </p:sp>
+      <p:sp>
+        <p:nvSpPr>
+          <p:cNvPr id="42" name="Rectangle 41"/>
+          <p:cNvSpPr/>
+          <p:nvPr/>
+        </p:nvSpPr>
+        <p:spPr>
+          <a:xfrm>
+            <a:off x="909872" y="4134827"/>
+            <a:ext cx="4680779" cy="3075624"/>
+          </a:xfrm>
+          <a:prstGeom prst="rect">
+            <a:avLst/>
+          </a:prstGeom>
+          <a:noFill/>
+          <a:ln w="25400" cap="flat">
+            <a:solidFill>
+              <a:srgbClr val="008000"/>
+            </a:solidFill>
+            <a:prstDash val="dashDot"/>
+            <a:round/>
+          </a:ln>
+          <a:effectLst/>
+          <a:sp3d/>
+        </p:spPr>
+        <p:style>
+          <a:lnRef idx="0">
+            <a:scrgbClr r="0" g="0" b="0"/>
+          </a:lnRef>
+          <a:fillRef idx="0">
+            <a:scrgbClr r="0" g="0" b="0"/>
+          </a:fillRef>
+          <a:effectRef idx="0">
+            <a:scrgbClr r="0" g="0" b="0"/>
+          </a:effectRef>
+          <a:fontRef idx="none"/>
+        </p:style>
+        <p:txBody>
+          <a:bodyPr rot="0" spcFirstLastPara="1" vertOverflow="overflow" horzOverflow="overflow" vert="horz" wrap="square" lIns="45719" tIns="45719" rIns="45719" bIns="45719" numCol="1" spcCol="38100" rtlCol="0" anchor="t">
+            <a:spAutoFit/>
+          </a:bodyPr>
+          <a:lstStyle/>
+          <a:p>
+            <a:pPr marL="0" marR="0" indent="0" algn="l" defTabSz="914400" rtl="0" fontAlgn="auto" latinLnBrk="0" hangingPunct="0">
+              <a:lnSpc>
+                <a:spcPct val="100000"/>
+              </a:lnSpc>
+              <a:spcBef>
+                <a:spcPts val="0"/>
+              </a:spcBef>
+              <a:spcAft>
+                <a:spcPts val="0"/>
+              </a:spcAft>
+              <a:buClrTx/>
+              <a:buSzTx/>
+              <a:buFontTx/>
+              <a:buNone/>
+              <a:tabLst/>
+            </a:pPr>
+            <a:endParaRPr kumimoji="0" lang="en-US" sz="1200" b="0" i="0" u="none" strike="noStrike" cap="none" spc="0" normalizeH="0" baseline="0">
+              <a:ln>
+                <a:noFill/>
+              </a:ln>
+              <a:solidFill>
+                <a:srgbClr val="000000"/>
+              </a:solidFill>
+              <a:effectLst/>
+              <a:uFillTx/>
+              <a:latin typeface="Arial"/>
+              <a:ea typeface="Arial"/>
+              <a:cs typeface="Arial"/>
+              <a:sym typeface="Arial"/>
+            </a:endParaRPr>
+          </a:p>
+        </p:txBody>
+      </p:sp>
+      <p:sp>
+        <p:nvSpPr>
+          <p:cNvPr id="5" name="TextBox 4"/>
+          <p:cNvSpPr txBox="1"/>
+          <p:nvPr/>
+        </p:nvSpPr>
+        <p:spPr>
+          <a:xfrm>
+            <a:off x="6968330" y="6371026"/>
+            <a:ext cx="1325252" cy="707884"/>
+          </a:xfrm>
+          <a:prstGeom prst="rect">
+            <a:avLst/>
+          </a:prstGeom>
+          <a:noFill/>
+          <a:ln w="12700" cap="flat">
+            <a:noFill/>
+            <a:miter lim="400000"/>
+          </a:ln>
+          <a:effectLst/>
+          <a:sp3d/>
+        </p:spPr>
+        <p:style>
+          <a:lnRef idx="0">
+            <a:scrgbClr r="0" g="0" b="0"/>
+          </a:lnRef>
+          <a:fillRef idx="0">
+            <a:scrgbClr r="0" g="0" b="0"/>
+          </a:fillRef>
+          <a:effectRef idx="0">
+            <a:scrgbClr r="0" g="0" b="0"/>
+          </a:effectRef>
+          <a:fontRef idx="none"/>
+        </p:style>
+        <p:txBody>
+          <a:bodyPr rot="0" spcFirstLastPara="1" vertOverflow="overflow" horzOverflow="overflow" vert="horz" wrap="square" lIns="45719" tIns="45719" rIns="45719" bIns="45719" numCol="1" spcCol="38100" rtlCol="0" anchor="t">
+            <a:spAutoFit/>
+          </a:bodyPr>
+          <a:lstStyle/>
+          <a:p>
+            <a:pPr marL="0" marR="0" indent="0" algn="l" defTabSz="914400" rtl="0" fontAlgn="auto" latinLnBrk="0" hangingPunct="0">
+              <a:lnSpc>
+                <a:spcPct val="100000"/>
+              </a:lnSpc>
+              <a:spcBef>
+                <a:spcPts val="0"/>
+              </a:spcBef>
+              <a:spcAft>
+                <a:spcPts val="0"/>
+              </a:spcAft>
+              <a:buClrTx/>
+              <a:buSzTx/>
+              <a:buFontTx/>
+              <a:buNone/>
+              <a:tabLst/>
+            </a:pPr>
+            <a:r>
+              <a:rPr kumimoji="0" lang="en-US" sz="2000" b="0" i="0" u="none" strike="noStrike" cap="none" spc="0" normalizeH="0" baseline="0" dirty="0" smtClean="0">
+                <a:ln>
+                  <a:noFill/>
+                </a:ln>
+                <a:solidFill>
+                  <a:srgbClr val="000000"/>
+                </a:solidFill>
+                <a:effectLst/>
+                <a:uFillTx/>
+                <a:sym typeface="Arial"/>
+              </a:rPr>
+              <a:t>region</a:t>
+            </a:r>
+            <a:r>
+              <a:rPr kumimoji="0" lang="en-US" sz="2000" b="0" i="0" u="none" strike="noStrike" cap="none" spc="0" normalizeH="0" dirty="0" smtClean="0">
+                <a:ln>
+                  <a:noFill/>
+                </a:ln>
+                <a:solidFill>
+                  <a:srgbClr val="000000"/>
+                </a:solidFill>
+                <a:effectLst/>
+                <a:uFillTx/>
+                <a:sym typeface="Arial"/>
+              </a:rPr>
+              <a:t> 1</a:t>
+            </a:r>
+          </a:p>
+          <a:p>
+            <a:pPr marL="0" marR="0" indent="0" algn="l" defTabSz="914400" rtl="0" fontAlgn="auto" latinLnBrk="0" hangingPunct="0">
+              <a:lnSpc>
+                <a:spcPct val="100000"/>
+              </a:lnSpc>
+              <a:spcBef>
+                <a:spcPts val="0"/>
+              </a:spcBef>
+              <a:spcAft>
+                <a:spcPts val="0"/>
+              </a:spcAft>
+              <a:buClrTx/>
+              <a:buSzTx/>
+              <a:buFontTx/>
+              <a:buNone/>
+              <a:tabLst/>
+            </a:pPr>
+            <a:r>
+              <a:rPr lang="en-US" sz="2000" baseline="0" dirty="0" smtClean="0"/>
+              <a:t>region</a:t>
+            </a:r>
+            <a:r>
+              <a:rPr lang="en-US" sz="2000" dirty="0" smtClean="0"/>
+              <a:t> 2</a:t>
+            </a:r>
+            <a:endParaRPr kumimoji="0" lang="en-US" sz="2000" b="0" i="0" u="none" strike="noStrike" cap="none" spc="0" normalizeH="0" baseline="0" dirty="0">
+              <a:ln>
+                <a:noFill/>
+              </a:ln>
+              <a:solidFill>
+                <a:srgbClr val="000000"/>
+              </a:solidFill>
+              <a:effectLst/>
+              <a:uFillTx/>
+              <a:sym typeface="Arial"/>
+            </a:endParaRPr>
+          </a:p>
+        </p:txBody>
+      </p:sp>
+      <p:cxnSp>
+        <p:nvCxnSpPr>
+          <p:cNvPr id="7" name="Straight Connector 6"/>
+          <p:cNvCxnSpPr/>
+          <p:nvPr/>
+        </p:nvCxnSpPr>
+        <p:spPr>
+          <a:xfrm>
+            <a:off x="6200378" y="6564739"/>
+            <a:ext cx="624701" cy="0"/>
+          </a:xfrm>
+          <a:prstGeom prst="line">
+            <a:avLst/>
+          </a:prstGeom>
+          <a:noFill/>
+          <a:ln w="25400" cap="flat">
+            <a:solidFill>
+              <a:srgbClr val="008000"/>
+            </a:solidFill>
+            <a:prstDash val="sysDash"/>
+            <a:round/>
+          </a:ln>
+          <a:effectLst>
+            <a:outerShdw blurRad="38100" dist="20000" dir="5400000" rotWithShape="0">
+              <a:srgbClr val="000000">
+                <a:alpha val="38000"/>
+              </a:srgbClr>
+            </a:outerShdw>
+          </a:effectLst>
+          <a:sp3d/>
+        </p:spPr>
+        <p:style>
+          <a:lnRef idx="0">
+            <a:scrgbClr r="0" g="0" b="0"/>
+          </a:lnRef>
+          <a:fillRef idx="0">
+            <a:scrgbClr r="0" g="0" b="0"/>
+          </a:fillRef>
+          <a:effectRef idx="0">
+            <a:scrgbClr r="0" g="0" b="0"/>
+          </a:effectRef>
+          <a:fontRef idx="none"/>
+        </p:style>
+      </p:cxnSp>
+      <p:cxnSp>
+        <p:nvCxnSpPr>
+          <p:cNvPr id="45" name="Straight Connector 44"/>
+          <p:cNvCxnSpPr/>
+          <p:nvPr/>
+        </p:nvCxnSpPr>
+        <p:spPr>
+          <a:xfrm>
+            <a:off x="6200378" y="6858000"/>
+            <a:ext cx="624701" cy="0"/>
+          </a:xfrm>
+          <a:prstGeom prst="line">
+            <a:avLst/>
+          </a:prstGeom>
+          <a:noFill/>
+          <a:ln w="25400" cap="flat">
+            <a:solidFill>
+              <a:srgbClr val="008000"/>
+            </a:solidFill>
+            <a:prstDash val="dashDot"/>
+            <a:round/>
+          </a:ln>
+          <a:effectLst>
+            <a:outerShdw blurRad="38100" dist="20000" dir="5400000" rotWithShape="0">
+              <a:srgbClr val="000000">
+                <a:alpha val="38000"/>
+              </a:srgbClr>
+            </a:outerShdw>
+          </a:effectLst>
+          <a:sp3d/>
+        </p:spPr>
+        <p:style>
+          <a:lnRef idx="0">
+            <a:scrgbClr r="0" g="0" b="0"/>
+          </a:lnRef>
+          <a:fillRef idx="0">
+            <a:scrgbClr r="0" g="0" b="0"/>
+          </a:fillRef>
+          <a:effectRef idx="0">
+            <a:scrgbClr r="0" g="0" b="0"/>
+          </a:effectRef>
+          <a:fontRef idx="none"/>
+        </p:style>
+      </p:cxnSp>
     </p:spTree>
     <p:extLst>
       <p:ext uri="{BB962C8B-B14F-4D97-AF65-F5344CB8AC3E}">
@@ -13732,7 +14096,7 @@
         <p:dissolve/>
       </p:transition>
     </mc:Choice>
-    <mc:Fallback xmlns="" xmlns:m="http://schemas.openxmlformats.org/officeDocument/2006/math" xmlns:a14="http://schemas.microsoft.com/office/drawing/2010/main">
+    <mc:Fallback xmlns:a14="http://schemas.microsoft.com/office/drawing/2010/main" xmlns:m="http://schemas.openxmlformats.org/officeDocument/2006/math" xmlns="">
       <p:transition spd="med">
         <p:fade/>
       </p:transition>

</xml_diff>

<commit_message>
Adding the new results table + updating the first half of the Evaluation + deleting old files that aren't used anymore in this paper
</commit_message>
<xml_diff>
--- a/figures/Figures.pptx
+++ b/figures/Figures.pptx
@@ -5,7 +5,7 @@
     <p:sldMasterId id="2147483648" r:id="rId1"/>
   </p:sldMasterIdLst>
   <p:notesMasterIdLst>
-    <p:notesMasterId r:id="rId9"/>
+    <p:notesMasterId r:id="rId10"/>
   </p:notesMasterIdLst>
   <p:sldIdLst>
     <p:sldId id="256" r:id="rId2"/>
@@ -15,6 +15,7 @@
     <p:sldId id="262" r:id="rId6"/>
     <p:sldId id="259" r:id="rId7"/>
     <p:sldId id="260" r:id="rId8"/>
+    <p:sldId id="263" r:id="rId9"/>
   </p:sldIdLst>
   <p:sldSz cx="9144000" cy="6858000" type="screen4x3"/>
   <p:notesSz cx="6858000" cy="9144000"/>
@@ -5612,7 +5613,7 @@
         <p:dissolve/>
       </p:transition>
     </mc:Choice>
-    <mc:Fallback xmlns:a14="http://schemas.microsoft.com/office/drawing/2010/main" xmlns:m="http://schemas.openxmlformats.org/officeDocument/2006/math" xmlns="">
+    <mc:Fallback xmlns="" xmlns:m="http://schemas.openxmlformats.org/officeDocument/2006/math" xmlns:a14="http://schemas.microsoft.com/office/drawing/2010/main">
       <p:transition spd="med">
         <p:fade/>
       </p:transition>
@@ -5869,7 +5870,7 @@
         <p:dissolve/>
       </p:transition>
     </mc:Choice>
-    <mc:Fallback xmlns:a14="http://schemas.microsoft.com/office/drawing/2010/main" xmlns:m="http://schemas.openxmlformats.org/officeDocument/2006/math" xmlns="">
+    <mc:Fallback xmlns="" xmlns:m="http://schemas.openxmlformats.org/officeDocument/2006/math" xmlns:a14="http://schemas.microsoft.com/office/drawing/2010/main">
       <p:transition spd="med">
         <p:fade/>
       </p:transition>
@@ -14096,12 +14097,918 @@
         <p:dissolve/>
       </p:transition>
     </mc:Choice>
-    <mc:Fallback xmlns:a14="http://schemas.microsoft.com/office/drawing/2010/main" xmlns:m="http://schemas.openxmlformats.org/officeDocument/2006/math" xmlns="">
+    <mc:Fallback xmlns="" xmlns:m="http://schemas.openxmlformats.org/officeDocument/2006/math" xmlns:a14="http://schemas.microsoft.com/office/drawing/2010/main">
       <p:transition spd="med">
         <p:fade/>
       </p:transition>
     </mc:Fallback>
   </mc:AlternateContent>
+</p:sld>
+</file>
+
+<file path=ppt/slides/slide8.xml><?xml version="1.0" encoding="utf-8"?>
+<p:sld xmlns:a="http://schemas.openxmlformats.org/drawingml/2006/main" xmlns:r="http://schemas.openxmlformats.org/officeDocument/2006/relationships" xmlns:p="http://schemas.openxmlformats.org/presentationml/2006/main">
+  <p:cSld>
+    <p:spTree>
+      <p:nvGrpSpPr>
+        <p:cNvPr id="1" name=""/>
+        <p:cNvGrpSpPr/>
+        <p:nvPr/>
+      </p:nvGrpSpPr>
+      <p:grpSpPr>
+        <a:xfrm>
+          <a:off x="0" y="0"/>
+          <a:ext cx="0" cy="0"/>
+          <a:chOff x="0" y="0"/>
+          <a:chExt cx="0" cy="0"/>
+        </a:xfrm>
+      </p:grpSpPr>
+      <p:sp>
+        <p:nvSpPr>
+          <p:cNvPr id="4" name="Rectangle 3"/>
+          <p:cNvSpPr/>
+          <p:nvPr/>
+        </p:nvSpPr>
+        <p:spPr>
+          <a:xfrm>
+            <a:off x="1249521" y="2088773"/>
+            <a:ext cx="4572000" cy="646331"/>
+          </a:xfrm>
+          <a:prstGeom prst="rect">
+            <a:avLst/>
+          </a:prstGeom>
+        </p:spPr>
+        <p:txBody>
+          <a:bodyPr>
+            <a:spAutoFit/>
+          </a:bodyPr>
+          <a:lstStyle/>
+          <a:p>
+            <a:pPr>
+              <a:tabLst>
+                <a:tab pos="581660" algn="l"/>
+                <a:tab pos="1163320" algn="l"/>
+                <a:tab pos="1744980" algn="l"/>
+                <a:tab pos="2326640" algn="l"/>
+                <a:tab pos="2908300" algn="l"/>
+                <a:tab pos="3489960" algn="l"/>
+                <a:tab pos="4071620" algn="l"/>
+                <a:tab pos="4653280" algn="l"/>
+                <a:tab pos="5234940" algn="l"/>
+                <a:tab pos="5816600" algn="l"/>
+                <a:tab pos="6398260" algn="l"/>
+                <a:tab pos="6979920" algn="l"/>
+                <a:tab pos="7561580" algn="l"/>
+                <a:tab pos="8143240" algn="l"/>
+                <a:tab pos="8724900" algn="l"/>
+                <a:tab pos="9306560" algn="l"/>
+              </a:tabLst>
+            </a:pPr>
+            <a:r>
+              <a:rPr lang="en-US" dirty="0" err="1">
+                <a:solidFill>
+                  <a:srgbClr val="BB7977"/>
+                </a:solidFill>
+                <a:latin typeface="Courier"/>
+                <a:ea typeface="ＭＳ 明朝"/>
+                <a:cs typeface="Courier"/>
+              </a:rPr>
+              <a:t>boolean</a:t>
+            </a:r>
+            <a:r>
+              <a:rPr lang="en-US" dirty="0">
+                <a:latin typeface="Courier"/>
+                <a:ea typeface="ＭＳ 明朝"/>
+                <a:cs typeface="Courier"/>
+              </a:rPr>
+              <a:t> </a:t>
+            </a:r>
+            <a:r>
+              <a:rPr lang="en-US" dirty="0" err="1">
+                <a:latin typeface="Courier"/>
+                <a:ea typeface="ＭＳ 明朝"/>
+                <a:cs typeface="Courier"/>
+              </a:rPr>
+              <a:t>inWord</a:t>
+            </a:r>
+            <a:r>
+              <a:rPr lang="en-US" dirty="0">
+                <a:solidFill>
+                  <a:srgbClr val="800080"/>
+                </a:solidFill>
+                <a:latin typeface="Courier"/>
+                <a:ea typeface="ＭＳ 明朝"/>
+                <a:cs typeface="Courier"/>
+              </a:rPr>
+              <a:t>;</a:t>
+            </a:r>
+            <a:r>
+              <a:rPr lang="en-US" dirty="0">
+                <a:latin typeface="Courier"/>
+                <a:ea typeface="ＭＳ 明朝"/>
+                <a:cs typeface="Courier"/>
+              </a:rPr>
+              <a:t> </a:t>
+            </a:r>
+            <a:endParaRPr lang="en-US" dirty="0" smtClean="0">
+              <a:latin typeface="Courier"/>
+              <a:ea typeface="ＭＳ 明朝"/>
+              <a:cs typeface="Courier"/>
+            </a:endParaRPr>
+          </a:p>
+          <a:p>
+            <a:pPr>
+              <a:tabLst>
+                <a:tab pos="581660" algn="l"/>
+                <a:tab pos="1163320" algn="l"/>
+                <a:tab pos="1744980" algn="l"/>
+                <a:tab pos="2326640" algn="l"/>
+                <a:tab pos="2908300" algn="l"/>
+                <a:tab pos="3489960" algn="l"/>
+                <a:tab pos="4071620" algn="l"/>
+                <a:tab pos="4653280" algn="l"/>
+                <a:tab pos="5234940" algn="l"/>
+                <a:tab pos="5816600" algn="l"/>
+                <a:tab pos="6398260" algn="l"/>
+                <a:tab pos="6979920" algn="l"/>
+                <a:tab pos="7561580" algn="l"/>
+                <a:tab pos="8143240" algn="l"/>
+                <a:tab pos="8724900" algn="l"/>
+                <a:tab pos="9306560" algn="l"/>
+              </a:tabLst>
+            </a:pPr>
+            <a:r>
+              <a:rPr lang="en-US" b="1" dirty="0" smtClean="0">
+                <a:solidFill>
+                  <a:srgbClr val="800000"/>
+                </a:solidFill>
+                <a:latin typeface="Courier"/>
+                <a:ea typeface="ＭＳ 明朝"/>
+                <a:cs typeface="Courier"/>
+              </a:rPr>
+              <a:t>if</a:t>
+            </a:r>
+            <a:r>
+              <a:rPr lang="en-US" dirty="0" smtClean="0">
+                <a:latin typeface="Courier"/>
+                <a:ea typeface="ＭＳ 明朝"/>
+                <a:cs typeface="Courier"/>
+              </a:rPr>
+              <a:t> </a:t>
+            </a:r>
+            <a:r>
+              <a:rPr lang="en-US" dirty="0">
+                <a:solidFill>
+                  <a:srgbClr val="808030"/>
+                </a:solidFill>
+                <a:latin typeface="Courier"/>
+                <a:ea typeface="ＭＳ 明朝"/>
+                <a:cs typeface="Courier"/>
+              </a:rPr>
+              <a:t>(</a:t>
+            </a:r>
+            <a:r>
+              <a:rPr lang="en-US" dirty="0" err="1">
+                <a:latin typeface="Courier"/>
+                <a:ea typeface="ＭＳ 明朝"/>
+                <a:cs typeface="Courier"/>
+              </a:rPr>
+              <a:t>firstElement</a:t>
+            </a:r>
+            <a:r>
+              <a:rPr lang="en-US" dirty="0">
+                <a:latin typeface="Courier"/>
+                <a:ea typeface="ＭＳ 明朝"/>
+                <a:cs typeface="Courier"/>
+              </a:rPr>
+              <a:t> </a:t>
+            </a:r>
+            <a:r>
+              <a:rPr lang="en-US" dirty="0">
+                <a:solidFill>
+                  <a:srgbClr val="808030"/>
+                </a:solidFill>
+                <a:latin typeface="Courier"/>
+                <a:ea typeface="ＭＳ 明朝"/>
+                <a:cs typeface="Courier"/>
+              </a:rPr>
+              <a:t>==</a:t>
+            </a:r>
+            <a:r>
+              <a:rPr lang="en-US" dirty="0">
+                <a:latin typeface="Courier"/>
+                <a:ea typeface="ＭＳ 明朝"/>
+                <a:cs typeface="Courier"/>
+              </a:rPr>
+              <a:t> </a:t>
+            </a:r>
+            <a:r>
+              <a:rPr lang="en-US" dirty="0">
+                <a:solidFill>
+                  <a:srgbClr val="008C00"/>
+                </a:solidFill>
+                <a:latin typeface="Courier"/>
+                <a:ea typeface="ＭＳ 明朝"/>
+                <a:cs typeface="Courier"/>
+              </a:rPr>
+              <a:t>0</a:t>
+            </a:r>
+            <a:r>
+              <a:rPr lang="en-US" dirty="0">
+                <a:solidFill>
+                  <a:srgbClr val="808030"/>
+                </a:solidFill>
+                <a:latin typeface="Courier"/>
+                <a:ea typeface="ＭＳ 明朝"/>
+                <a:cs typeface="Courier"/>
+              </a:rPr>
+              <a:t>)</a:t>
+            </a:r>
+            <a:r>
+              <a:rPr lang="en-US" dirty="0">
+                <a:latin typeface="Courier"/>
+                <a:ea typeface="ＭＳ 明朝"/>
+                <a:cs typeface="Courier"/>
+              </a:rPr>
+              <a:t> </a:t>
+            </a:r>
+            <a:r>
+              <a:rPr lang="en-US" dirty="0" err="1">
+                <a:latin typeface="Courier"/>
+                <a:ea typeface="ＭＳ 明朝"/>
+                <a:cs typeface="Courier"/>
+              </a:rPr>
+              <a:t>inWord</a:t>
+            </a:r>
+            <a:r>
+              <a:rPr lang="en-US" dirty="0">
+                <a:latin typeface="Courier"/>
+                <a:ea typeface="ＭＳ 明朝"/>
+                <a:cs typeface="Courier"/>
+              </a:rPr>
+              <a:t> </a:t>
+            </a:r>
+            <a:r>
+              <a:rPr lang="en-US" dirty="0">
+                <a:solidFill>
+                  <a:srgbClr val="808030"/>
+                </a:solidFill>
+                <a:latin typeface="Courier"/>
+                <a:ea typeface="ＭＳ 明朝"/>
+                <a:cs typeface="Courier"/>
+              </a:rPr>
+              <a:t>=</a:t>
+            </a:r>
+            <a:r>
+              <a:rPr lang="en-US" dirty="0">
+                <a:latin typeface="Courier"/>
+                <a:ea typeface="ＭＳ 明朝"/>
+                <a:cs typeface="Courier"/>
+              </a:rPr>
+              <a:t> </a:t>
+            </a:r>
+            <a:r>
+              <a:rPr lang="en-US" b="1" dirty="0">
+                <a:solidFill>
+                  <a:srgbClr val="800000"/>
+                </a:solidFill>
+                <a:latin typeface="Courier"/>
+                <a:ea typeface="ＭＳ 明朝"/>
+                <a:cs typeface="Courier"/>
+              </a:rPr>
+              <a:t>false</a:t>
+            </a:r>
+            <a:r>
+              <a:rPr lang="en-US" dirty="0">
+                <a:solidFill>
+                  <a:srgbClr val="800080"/>
+                </a:solidFill>
+                <a:latin typeface="Courier"/>
+                <a:ea typeface="ＭＳ 明朝"/>
+                <a:cs typeface="Courier"/>
+              </a:rPr>
+              <a:t>;</a:t>
+            </a:r>
+            <a:r>
+              <a:rPr lang="en-US" dirty="0">
+                <a:latin typeface="Courier"/>
+                <a:ea typeface="ＭＳ 明朝"/>
+                <a:cs typeface="Courier"/>
+              </a:rPr>
+              <a:t> </a:t>
+            </a:r>
+            <a:endParaRPr lang="en-US" dirty="0" smtClean="0">
+              <a:latin typeface="Courier"/>
+              <a:ea typeface="ＭＳ 明朝"/>
+              <a:cs typeface="Courier"/>
+            </a:endParaRPr>
+          </a:p>
+          <a:p>
+            <a:pPr>
+              <a:tabLst>
+                <a:tab pos="581660" algn="l"/>
+                <a:tab pos="1163320" algn="l"/>
+                <a:tab pos="1744980" algn="l"/>
+                <a:tab pos="2326640" algn="l"/>
+                <a:tab pos="2908300" algn="l"/>
+                <a:tab pos="3489960" algn="l"/>
+                <a:tab pos="4071620" algn="l"/>
+                <a:tab pos="4653280" algn="l"/>
+                <a:tab pos="5234940" algn="l"/>
+                <a:tab pos="5816600" algn="l"/>
+                <a:tab pos="6398260" algn="l"/>
+                <a:tab pos="6979920" algn="l"/>
+                <a:tab pos="7561580" algn="l"/>
+                <a:tab pos="8143240" algn="l"/>
+                <a:tab pos="8724900" algn="l"/>
+                <a:tab pos="9306560" algn="l"/>
+              </a:tabLst>
+            </a:pPr>
+            <a:r>
+              <a:rPr lang="en-US" b="1" dirty="0" smtClean="0">
+                <a:solidFill>
+                  <a:srgbClr val="800000"/>
+                </a:solidFill>
+                <a:latin typeface="Courier"/>
+                <a:ea typeface="ＭＳ 明朝"/>
+                <a:cs typeface="Courier"/>
+              </a:rPr>
+              <a:t>else</a:t>
+            </a:r>
+            <a:r>
+              <a:rPr lang="en-US" dirty="0" smtClean="0">
+                <a:latin typeface="Courier"/>
+                <a:ea typeface="ＭＳ 明朝"/>
+                <a:cs typeface="Courier"/>
+              </a:rPr>
+              <a:t> </a:t>
+            </a:r>
+            <a:r>
+              <a:rPr lang="en-US" dirty="0" err="1">
+                <a:latin typeface="Courier"/>
+                <a:ea typeface="ＭＳ 明朝"/>
+                <a:cs typeface="Courier"/>
+              </a:rPr>
+              <a:t>inWord</a:t>
+            </a:r>
+            <a:r>
+              <a:rPr lang="en-US" dirty="0">
+                <a:latin typeface="Courier"/>
+                <a:ea typeface="ＭＳ 明朝"/>
+                <a:cs typeface="Courier"/>
+              </a:rPr>
+              <a:t> </a:t>
+            </a:r>
+            <a:r>
+              <a:rPr lang="en-US" dirty="0">
+                <a:solidFill>
+                  <a:srgbClr val="808030"/>
+                </a:solidFill>
+                <a:latin typeface="Courier"/>
+                <a:ea typeface="ＭＳ 明朝"/>
+                <a:cs typeface="Courier"/>
+              </a:rPr>
+              <a:t>=</a:t>
+            </a:r>
+            <a:r>
+              <a:rPr lang="en-US" dirty="0">
+                <a:latin typeface="Courier"/>
+                <a:ea typeface="ＭＳ 明朝"/>
+                <a:cs typeface="Courier"/>
+              </a:rPr>
+              <a:t> </a:t>
+            </a:r>
+            <a:r>
+              <a:rPr lang="en-US" b="1" dirty="0">
+                <a:solidFill>
+                  <a:srgbClr val="800000"/>
+                </a:solidFill>
+                <a:latin typeface="Courier"/>
+                <a:ea typeface="ＭＳ 明朝"/>
+                <a:cs typeface="Courier"/>
+              </a:rPr>
+              <a:t>true</a:t>
+            </a:r>
+            <a:r>
+              <a:rPr lang="en-US" dirty="0">
+                <a:solidFill>
+                  <a:srgbClr val="800080"/>
+                </a:solidFill>
+                <a:latin typeface="Courier"/>
+                <a:ea typeface="ＭＳ 明朝"/>
+                <a:cs typeface="Courier"/>
+              </a:rPr>
+              <a:t>;</a:t>
+            </a:r>
+            <a:endParaRPr lang="en-US" sz="1800" dirty="0">
+              <a:latin typeface="Cambria"/>
+              <a:ea typeface="ＭＳ 明朝"/>
+              <a:cs typeface="Times New Roman"/>
+            </a:endParaRPr>
+          </a:p>
+        </p:txBody>
+      </p:sp>
+      <p:sp>
+        <p:nvSpPr>
+          <p:cNvPr id="5" name="TextBox 4"/>
+          <p:cNvSpPr txBox="1"/>
+          <p:nvPr/>
+        </p:nvSpPr>
+        <p:spPr>
+          <a:xfrm>
+            <a:off x="1703959" y="3226006"/>
+            <a:ext cx="3730647" cy="461663"/>
+          </a:xfrm>
+          <a:prstGeom prst="rect">
+            <a:avLst/>
+          </a:prstGeom>
+          <a:ln w="6350"/>
+        </p:spPr>
+        <p:style>
+          <a:lnRef idx="2">
+            <a:schemeClr val="dk1"/>
+          </a:lnRef>
+          <a:fillRef idx="1">
+            <a:schemeClr val="lt1"/>
+          </a:fillRef>
+          <a:effectRef idx="0">
+            <a:schemeClr val="dk1"/>
+          </a:effectRef>
+          <a:fontRef idx="minor">
+            <a:schemeClr val="dk1"/>
+          </a:fontRef>
+        </p:style>
+        <p:txBody>
+          <a:bodyPr rot="0" spcFirstLastPara="1" vertOverflow="overflow" horzOverflow="overflow" vert="horz" wrap="none" lIns="45719" tIns="45719" rIns="45719" bIns="45719" numCol="1" spcCol="38100" rtlCol="0" anchor="t">
+            <a:spAutoFit/>
+          </a:bodyPr>
+          <a:lstStyle/>
+          <a:p>
+            <a:pPr algn="ctr"/>
+            <a:r>
+              <a:rPr lang="en-US" dirty="0"/>
+              <a:t>BB22</a:t>
+            </a:r>
+            <a:br>
+              <a:rPr lang="en-US" dirty="0"/>
+            </a:br>
+            <a:r>
+              <a:rPr lang="en-US" dirty="0" smtClean="0"/>
+              <a:t> 51: conditional </a:t>
+            </a:r>
+            <a:r>
+              <a:rPr lang="en-US" dirty="0"/>
+              <a:t>branch(ne, to </a:t>
+            </a:r>
+            <a:r>
+              <a:rPr lang="en-US" dirty="0" err="1"/>
+              <a:t>iindex</a:t>
+            </a:r>
+            <a:r>
+              <a:rPr lang="en-US" dirty="0"/>
+              <a:t>=55) v39,v12:#0 </a:t>
+            </a:r>
+            <a:endParaRPr lang="en-US" dirty="0"/>
+          </a:p>
+        </p:txBody>
+      </p:sp>
+      <p:sp>
+        <p:nvSpPr>
+          <p:cNvPr id="6" name="TextBox 5"/>
+          <p:cNvSpPr txBox="1"/>
+          <p:nvPr/>
+        </p:nvSpPr>
+        <p:spPr>
+          <a:xfrm>
+            <a:off x="1757392" y="4086376"/>
+            <a:ext cx="468786" cy="276997"/>
+          </a:xfrm>
+          <a:prstGeom prst="rect">
+            <a:avLst/>
+          </a:prstGeom>
+          <a:ln w="6350"/>
+        </p:spPr>
+        <p:style>
+          <a:lnRef idx="2">
+            <a:schemeClr val="dk1"/>
+          </a:lnRef>
+          <a:fillRef idx="1">
+            <a:schemeClr val="lt1"/>
+          </a:fillRef>
+          <a:effectRef idx="0">
+            <a:schemeClr val="dk1"/>
+          </a:effectRef>
+          <a:fontRef idx="minor">
+            <a:schemeClr val="dk1"/>
+          </a:fontRef>
+        </p:style>
+        <p:txBody>
+          <a:bodyPr rot="0" spcFirstLastPara="1" vertOverflow="overflow" horzOverflow="overflow" vert="horz" wrap="none" lIns="45719" tIns="45719" rIns="45719" bIns="45719" numCol="1" spcCol="38100" rtlCol="0" anchor="t">
+            <a:spAutoFit/>
+          </a:bodyPr>
+          <a:lstStyle/>
+          <a:p>
+            <a:pPr algn="ctr"/>
+            <a:r>
+              <a:rPr lang="en-US" dirty="0" smtClean="0"/>
+              <a:t>BB24</a:t>
+            </a:r>
+            <a:endParaRPr lang="en-US" dirty="0"/>
+          </a:p>
+        </p:txBody>
+      </p:sp>
+      <p:sp>
+        <p:nvSpPr>
+          <p:cNvPr id="7" name="TextBox 6"/>
+          <p:cNvSpPr txBox="1"/>
+          <p:nvPr/>
+        </p:nvSpPr>
+        <p:spPr>
+          <a:xfrm>
+            <a:off x="3625921" y="4086376"/>
+            <a:ext cx="2978037" cy="461663"/>
+          </a:xfrm>
+          <a:prstGeom prst="rect">
+            <a:avLst/>
+          </a:prstGeom>
+          <a:ln w="6350"/>
+        </p:spPr>
+        <p:style>
+          <a:lnRef idx="2">
+            <a:schemeClr val="dk1"/>
+          </a:lnRef>
+          <a:fillRef idx="1">
+            <a:schemeClr val="lt1"/>
+          </a:fillRef>
+          <a:effectRef idx="0">
+            <a:schemeClr val="dk1"/>
+          </a:effectRef>
+          <a:fontRef idx="minor">
+            <a:schemeClr val="dk1"/>
+          </a:fontRef>
+        </p:style>
+        <p:txBody>
+          <a:bodyPr rot="0" spcFirstLastPara="1" vertOverflow="overflow" horzOverflow="overflow" vert="horz" wrap="none" lIns="45719" tIns="45719" rIns="45719" bIns="45719" numCol="1" spcCol="38100" rtlCol="0" anchor="t">
+            <a:spAutoFit/>
+          </a:bodyPr>
+          <a:lstStyle/>
+          <a:p>
+            <a:pPr algn="ctr"/>
+            <a:r>
+              <a:rPr lang="en-US" dirty="0" smtClean="0"/>
+              <a:t>BB23</a:t>
+            </a:r>
+          </a:p>
+          <a:p>
+            <a:pPr algn="ctr"/>
+            <a:r>
+              <a:rPr lang="en-US" dirty="0" smtClean="0"/>
+              <a:t> 54: </a:t>
+            </a:r>
+            <a:r>
+              <a:rPr lang="en-US" dirty="0" err="1" smtClean="0"/>
+              <a:t>goto</a:t>
+            </a:r>
+            <a:r>
+              <a:rPr lang="en-US" dirty="0" smtClean="0"/>
+              <a:t> </a:t>
+            </a:r>
+            <a:r>
+              <a:rPr lang="en-US" dirty="0"/>
+              <a:t>(from </a:t>
+            </a:r>
+            <a:r>
+              <a:rPr lang="en-US" dirty="0" err="1"/>
+              <a:t>iindex</a:t>
+            </a:r>
+            <a:r>
+              <a:rPr lang="en-US" dirty="0"/>
+              <a:t>= 54 to </a:t>
+            </a:r>
+            <a:r>
+              <a:rPr lang="en-US" dirty="0" err="1"/>
+              <a:t>iindex</a:t>
+            </a:r>
+            <a:r>
+              <a:rPr lang="en-US" dirty="0"/>
+              <a:t> = 57) </a:t>
+            </a:r>
+            <a:endParaRPr lang="en-US" dirty="0"/>
+          </a:p>
+        </p:txBody>
+      </p:sp>
+      <p:sp>
+        <p:nvSpPr>
+          <p:cNvPr id="8" name="TextBox 7"/>
+          <p:cNvSpPr txBox="1"/>
+          <p:nvPr/>
+        </p:nvSpPr>
+        <p:spPr>
+          <a:xfrm>
+            <a:off x="2735215" y="4735085"/>
+            <a:ext cx="1604464" cy="461663"/>
+          </a:xfrm>
+          <a:prstGeom prst="rect">
+            <a:avLst/>
+          </a:prstGeom>
+          <a:ln w="6350"/>
+        </p:spPr>
+        <p:style>
+          <a:lnRef idx="2">
+            <a:schemeClr val="dk1"/>
+          </a:lnRef>
+          <a:fillRef idx="1">
+            <a:schemeClr val="lt1"/>
+          </a:fillRef>
+          <a:effectRef idx="0">
+            <a:schemeClr val="dk1"/>
+          </a:effectRef>
+          <a:fontRef idx="minor">
+            <a:schemeClr val="dk1"/>
+          </a:fontRef>
+        </p:style>
+        <p:txBody>
+          <a:bodyPr rot="0" spcFirstLastPara="1" vertOverflow="overflow" horzOverflow="overflow" vert="horz" wrap="none" lIns="45719" tIns="45719" rIns="45719" bIns="45719" numCol="1" spcCol="38100" rtlCol="0" anchor="t">
+            <a:spAutoFit/>
+          </a:bodyPr>
+          <a:lstStyle/>
+          <a:p>
+            <a:pPr algn="ctr"/>
+            <a:r>
+              <a:rPr lang="en-US" dirty="0" smtClean="0"/>
+              <a:t>BB25</a:t>
+            </a:r>
+          </a:p>
+          <a:p>
+            <a:pPr algn="ctr"/>
+            <a:r>
+              <a:rPr lang="en-US" dirty="0" smtClean="0"/>
+              <a:t> 57: v40 = phi #0, #1</a:t>
+            </a:r>
+          </a:p>
+        </p:txBody>
+      </p:sp>
+      <p:cxnSp>
+        <p:nvCxnSpPr>
+          <p:cNvPr id="12" name="Straight Arrow Connector 11"/>
+          <p:cNvCxnSpPr>
+            <a:endCxn id="5" idx="0"/>
+          </p:cNvCxnSpPr>
+          <p:nvPr/>
+        </p:nvCxnSpPr>
+        <p:spPr>
+          <a:xfrm>
+            <a:off x="3569283" y="2882969"/>
+            <a:ext cx="0" cy="343037"/>
+          </a:xfrm>
+          <a:prstGeom prst="straightConnector1">
+            <a:avLst/>
+          </a:prstGeom>
+          <a:noFill/>
+          <a:ln w="6350" cap="flat">
+            <a:solidFill>
+              <a:schemeClr val="tx1"/>
+            </a:solidFill>
+            <a:prstDash val="solid"/>
+            <a:round/>
+            <a:tailEnd type="arrow"/>
+          </a:ln>
+          <a:effectLst/>
+          <a:sp3d/>
+        </p:spPr>
+        <p:style>
+          <a:lnRef idx="0">
+            <a:scrgbClr r="0" g="0" b="0"/>
+          </a:lnRef>
+          <a:fillRef idx="0">
+            <a:scrgbClr r="0" g="0" b="0"/>
+          </a:fillRef>
+          <a:effectRef idx="0">
+            <a:scrgbClr r="0" g="0" b="0"/>
+          </a:effectRef>
+          <a:fontRef idx="none"/>
+        </p:style>
+      </p:cxnSp>
+      <p:cxnSp>
+        <p:nvCxnSpPr>
+          <p:cNvPr id="15" name="Straight Arrow Connector 14"/>
+          <p:cNvCxnSpPr>
+            <a:stCxn id="5" idx="2"/>
+            <a:endCxn id="6" idx="0"/>
+          </p:cNvCxnSpPr>
+          <p:nvPr/>
+        </p:nvCxnSpPr>
+        <p:spPr>
+          <a:xfrm flipH="1">
+            <a:off x="1991785" y="3687669"/>
+            <a:ext cx="1577498" cy="398707"/>
+          </a:xfrm>
+          <a:prstGeom prst="straightConnector1">
+            <a:avLst/>
+          </a:prstGeom>
+          <a:noFill/>
+          <a:ln w="6350" cap="flat">
+            <a:solidFill>
+              <a:schemeClr val="tx1"/>
+            </a:solidFill>
+            <a:prstDash val="solid"/>
+            <a:round/>
+            <a:tailEnd type="arrow"/>
+          </a:ln>
+          <a:effectLst/>
+          <a:sp3d/>
+        </p:spPr>
+        <p:style>
+          <a:lnRef idx="0">
+            <a:scrgbClr r="0" g="0" b="0"/>
+          </a:lnRef>
+          <a:fillRef idx="0">
+            <a:scrgbClr r="0" g="0" b="0"/>
+          </a:fillRef>
+          <a:effectRef idx="0">
+            <a:scrgbClr r="0" g="0" b="0"/>
+          </a:effectRef>
+          <a:fontRef idx="none"/>
+        </p:style>
+      </p:cxnSp>
+      <p:cxnSp>
+        <p:nvCxnSpPr>
+          <p:cNvPr id="17" name="Straight Arrow Connector 16"/>
+          <p:cNvCxnSpPr>
+            <a:stCxn id="5" idx="2"/>
+            <a:endCxn id="7" idx="0"/>
+          </p:cNvCxnSpPr>
+          <p:nvPr/>
+        </p:nvCxnSpPr>
+        <p:spPr>
+          <a:xfrm>
+            <a:off x="3569283" y="3687669"/>
+            <a:ext cx="1545657" cy="398707"/>
+          </a:xfrm>
+          <a:prstGeom prst="straightConnector1">
+            <a:avLst/>
+          </a:prstGeom>
+          <a:noFill/>
+          <a:ln w="6350" cap="flat">
+            <a:solidFill>
+              <a:schemeClr val="tx1"/>
+            </a:solidFill>
+            <a:prstDash val="solid"/>
+            <a:round/>
+            <a:tailEnd type="arrow"/>
+          </a:ln>
+          <a:effectLst/>
+          <a:sp3d/>
+        </p:spPr>
+        <p:style>
+          <a:lnRef idx="0">
+            <a:scrgbClr r="0" g="0" b="0"/>
+          </a:lnRef>
+          <a:fillRef idx="0">
+            <a:scrgbClr r="0" g="0" b="0"/>
+          </a:fillRef>
+          <a:effectRef idx="0">
+            <a:scrgbClr r="0" g="0" b="0"/>
+          </a:effectRef>
+          <a:fontRef idx="none"/>
+        </p:style>
+      </p:cxnSp>
+      <p:cxnSp>
+        <p:nvCxnSpPr>
+          <p:cNvPr id="19" name="Straight Arrow Connector 18"/>
+          <p:cNvCxnSpPr>
+            <a:stCxn id="7" idx="2"/>
+            <a:endCxn id="8" idx="0"/>
+          </p:cNvCxnSpPr>
+          <p:nvPr/>
+        </p:nvCxnSpPr>
+        <p:spPr>
+          <a:xfrm flipH="1">
+            <a:off x="3537447" y="4548039"/>
+            <a:ext cx="1577493" cy="187046"/>
+          </a:xfrm>
+          <a:prstGeom prst="straightConnector1">
+            <a:avLst/>
+          </a:prstGeom>
+          <a:noFill/>
+          <a:ln w="6350" cap="flat">
+            <a:solidFill>
+              <a:schemeClr val="tx1"/>
+            </a:solidFill>
+            <a:prstDash val="solid"/>
+            <a:round/>
+            <a:tailEnd type="arrow"/>
+          </a:ln>
+          <a:effectLst/>
+          <a:sp3d/>
+        </p:spPr>
+        <p:style>
+          <a:lnRef idx="0">
+            <a:scrgbClr r="0" g="0" b="0"/>
+          </a:lnRef>
+          <a:fillRef idx="0">
+            <a:scrgbClr r="0" g="0" b="0"/>
+          </a:fillRef>
+          <a:effectRef idx="0">
+            <a:scrgbClr r="0" g="0" b="0"/>
+          </a:effectRef>
+          <a:fontRef idx="none"/>
+        </p:style>
+      </p:cxnSp>
+      <p:cxnSp>
+        <p:nvCxnSpPr>
+          <p:cNvPr id="21" name="Straight Arrow Connector 20"/>
+          <p:cNvCxnSpPr>
+            <a:stCxn id="6" idx="2"/>
+            <a:endCxn id="8" idx="0"/>
+          </p:cNvCxnSpPr>
+          <p:nvPr/>
+        </p:nvCxnSpPr>
+        <p:spPr>
+          <a:xfrm>
+            <a:off x="1991785" y="4363373"/>
+            <a:ext cx="1545662" cy="371712"/>
+          </a:xfrm>
+          <a:prstGeom prst="straightConnector1">
+            <a:avLst/>
+          </a:prstGeom>
+          <a:noFill/>
+          <a:ln w="6350" cap="flat">
+            <a:solidFill>
+              <a:schemeClr val="tx1"/>
+            </a:solidFill>
+            <a:prstDash val="solid"/>
+            <a:round/>
+            <a:tailEnd type="arrow"/>
+          </a:ln>
+          <a:effectLst/>
+          <a:sp3d/>
+        </p:spPr>
+        <p:style>
+          <a:lnRef idx="0">
+            <a:scrgbClr r="0" g="0" b="0"/>
+          </a:lnRef>
+          <a:fillRef idx="0">
+            <a:scrgbClr r="0" g="0" b="0"/>
+          </a:fillRef>
+          <a:effectRef idx="0">
+            <a:scrgbClr r="0" g="0" b="0"/>
+          </a:effectRef>
+          <a:fontRef idx="none"/>
+        </p:style>
+      </p:cxnSp>
+      <p:cxnSp>
+        <p:nvCxnSpPr>
+          <p:cNvPr id="23" name="Straight Arrow Connector 22"/>
+          <p:cNvCxnSpPr>
+            <a:stCxn id="8" idx="2"/>
+          </p:cNvCxnSpPr>
+          <p:nvPr/>
+        </p:nvCxnSpPr>
+        <p:spPr>
+          <a:xfrm>
+            <a:off x="3537447" y="5196748"/>
+            <a:ext cx="0" cy="299140"/>
+          </a:xfrm>
+          <a:prstGeom prst="straightConnector1">
+            <a:avLst/>
+          </a:prstGeom>
+          <a:noFill/>
+          <a:ln w="6350" cap="flat">
+            <a:solidFill>
+              <a:schemeClr val="tx1"/>
+            </a:solidFill>
+            <a:prstDash val="solid"/>
+            <a:round/>
+            <a:tailEnd type="arrow"/>
+          </a:ln>
+          <a:effectLst/>
+          <a:sp3d/>
+        </p:spPr>
+        <p:style>
+          <a:lnRef idx="0">
+            <a:scrgbClr r="0" g="0" b="0"/>
+          </a:lnRef>
+          <a:fillRef idx="0">
+            <a:scrgbClr r="0" g="0" b="0"/>
+          </a:fillRef>
+          <a:effectRef idx="0">
+            <a:scrgbClr r="0" g="0" b="0"/>
+          </a:effectRef>
+          <a:fontRef idx="none"/>
+        </p:style>
+      </p:cxnSp>
+    </p:spTree>
+    <p:extLst>
+      <p:ext uri="{BB962C8B-B14F-4D97-AF65-F5344CB8AC3E}">
+        <p14:creationId xmlns:p14="http://schemas.microsoft.com/office/powerpoint/2010/main" val="832355576"/>
+      </p:ext>
+    </p:extLst>
+  </p:cSld>
+  <p:clrMapOvr>
+    <a:masterClrMapping/>
+  </p:clrMapOvr>
+  <p:transition xmlns:p14="http://schemas.microsoft.com/office/powerpoint/2010/main" spd="med"/>
 </p:sld>
 </file>
 
@@ -14599,287 +15506,19 @@
     <a:lnDef>
       <a:spPr>
         <a:noFill/>
-        <a:ln w="25400" cap="flat">
+        <a:ln w="6350" cap="flat">
           <a:solidFill>
-            <a:schemeClr val="accent1"/>
+            <a:schemeClr val="tx1"/>
           </a:solidFill>
           <a:prstDash val="solid"/>
           <a:round/>
+          <a:tailEnd type="arrow"/>
         </a:ln>
-        <a:effectLst>
-          <a:outerShdw blurRad="38100" dist="20000" dir="5400000" rotWithShape="0">
-            <a:srgbClr val="000000">
-              <a:alpha val="38000"/>
-            </a:srgbClr>
-          </a:outerShdw>
-        </a:effectLst>
+        <a:effectLst/>
         <a:sp3d/>
       </a:spPr>
-      <a:bodyPr rot="0" spcFirstLastPara="1" vertOverflow="overflow" horzOverflow="overflow" vert="horz" wrap="square" lIns="91439" tIns="45719" rIns="91439" bIns="45719" numCol="1" spcCol="38100" rtlCol="0" anchor="t">
-        <a:noAutofit/>
-      </a:bodyPr>
-      <a:lstStyle>
-        <a:defPPr marL="0" marR="0" indent="0" algn="l" defTabSz="914400" rtl="0" fontAlgn="auto" latinLnBrk="1" hangingPunct="0">
-          <a:lnSpc>
-            <a:spcPct val="100000"/>
-          </a:lnSpc>
-          <a:spcBef>
-            <a:spcPts val="0"/>
-          </a:spcBef>
-          <a:spcAft>
-            <a:spcPts val="0"/>
-          </a:spcAft>
-          <a:buClrTx/>
-          <a:buSzTx/>
-          <a:buFontTx/>
-          <a:buNone/>
-          <a:tabLst/>
-          <a:defRPr kumimoji="0" sz="1800" b="0" i="0" u="none" strike="noStrike" cap="none" spc="0" normalizeH="0" baseline="0">
-            <a:ln>
-              <a:noFill/>
-            </a:ln>
-            <a:solidFill>
-              <a:srgbClr val="000000"/>
-            </a:solidFill>
-            <a:effectLst/>
-            <a:uFillTx/>
-          </a:defRPr>
-        </a:defPPr>
-        <a:lvl1pPr marL="0" marR="0" indent="0" algn="l" defTabSz="914400" rtl="0" fontAlgn="auto" latinLnBrk="1" hangingPunct="0">
-          <a:lnSpc>
-            <a:spcPct val="100000"/>
-          </a:lnSpc>
-          <a:spcBef>
-            <a:spcPts val="0"/>
-          </a:spcBef>
-          <a:spcAft>
-            <a:spcPts val="0"/>
-          </a:spcAft>
-          <a:buClrTx/>
-          <a:buSzTx/>
-          <a:buFontTx/>
-          <a:buNone/>
-          <a:tabLst/>
-          <a:defRPr kumimoji="0" sz="1800" b="0" i="0" u="none" strike="noStrike" cap="none" spc="0" normalizeH="0" baseline="0">
-            <a:ln>
-              <a:noFill/>
-            </a:ln>
-            <a:solidFill>
-              <a:srgbClr val="000000"/>
-            </a:solidFill>
-            <a:effectLst/>
-            <a:uFillTx/>
-          </a:defRPr>
-        </a:lvl1pPr>
-        <a:lvl2pPr marL="0" marR="0" indent="0" algn="l" defTabSz="914400" rtl="0" fontAlgn="auto" latinLnBrk="1" hangingPunct="0">
-          <a:lnSpc>
-            <a:spcPct val="100000"/>
-          </a:lnSpc>
-          <a:spcBef>
-            <a:spcPts val="0"/>
-          </a:spcBef>
-          <a:spcAft>
-            <a:spcPts val="0"/>
-          </a:spcAft>
-          <a:buClrTx/>
-          <a:buSzTx/>
-          <a:buFontTx/>
-          <a:buNone/>
-          <a:tabLst/>
-          <a:defRPr kumimoji="0" sz="1800" b="0" i="0" u="none" strike="noStrike" cap="none" spc="0" normalizeH="0" baseline="0">
-            <a:ln>
-              <a:noFill/>
-            </a:ln>
-            <a:solidFill>
-              <a:srgbClr val="000000"/>
-            </a:solidFill>
-            <a:effectLst/>
-            <a:uFillTx/>
-          </a:defRPr>
-        </a:lvl2pPr>
-        <a:lvl3pPr marL="0" marR="0" indent="0" algn="l" defTabSz="914400" rtl="0" fontAlgn="auto" latinLnBrk="1" hangingPunct="0">
-          <a:lnSpc>
-            <a:spcPct val="100000"/>
-          </a:lnSpc>
-          <a:spcBef>
-            <a:spcPts val="0"/>
-          </a:spcBef>
-          <a:spcAft>
-            <a:spcPts val="0"/>
-          </a:spcAft>
-          <a:buClrTx/>
-          <a:buSzTx/>
-          <a:buFontTx/>
-          <a:buNone/>
-          <a:tabLst/>
-          <a:defRPr kumimoji="0" sz="1800" b="0" i="0" u="none" strike="noStrike" cap="none" spc="0" normalizeH="0" baseline="0">
-            <a:ln>
-              <a:noFill/>
-            </a:ln>
-            <a:solidFill>
-              <a:srgbClr val="000000"/>
-            </a:solidFill>
-            <a:effectLst/>
-            <a:uFillTx/>
-          </a:defRPr>
-        </a:lvl3pPr>
-        <a:lvl4pPr marL="0" marR="0" indent="0" algn="l" defTabSz="914400" rtl="0" fontAlgn="auto" latinLnBrk="1" hangingPunct="0">
-          <a:lnSpc>
-            <a:spcPct val="100000"/>
-          </a:lnSpc>
-          <a:spcBef>
-            <a:spcPts val="0"/>
-          </a:spcBef>
-          <a:spcAft>
-            <a:spcPts val="0"/>
-          </a:spcAft>
-          <a:buClrTx/>
-          <a:buSzTx/>
-          <a:buFontTx/>
-          <a:buNone/>
-          <a:tabLst/>
-          <a:defRPr kumimoji="0" sz="1800" b="0" i="0" u="none" strike="noStrike" cap="none" spc="0" normalizeH="0" baseline="0">
-            <a:ln>
-              <a:noFill/>
-            </a:ln>
-            <a:solidFill>
-              <a:srgbClr val="000000"/>
-            </a:solidFill>
-            <a:effectLst/>
-            <a:uFillTx/>
-          </a:defRPr>
-        </a:lvl4pPr>
-        <a:lvl5pPr marL="0" marR="0" indent="0" algn="l" defTabSz="914400" rtl="0" fontAlgn="auto" latinLnBrk="1" hangingPunct="0">
-          <a:lnSpc>
-            <a:spcPct val="100000"/>
-          </a:lnSpc>
-          <a:spcBef>
-            <a:spcPts val="0"/>
-          </a:spcBef>
-          <a:spcAft>
-            <a:spcPts val="0"/>
-          </a:spcAft>
-          <a:buClrTx/>
-          <a:buSzTx/>
-          <a:buFontTx/>
-          <a:buNone/>
-          <a:tabLst/>
-          <a:defRPr kumimoji="0" sz="1800" b="0" i="0" u="none" strike="noStrike" cap="none" spc="0" normalizeH="0" baseline="0">
-            <a:ln>
-              <a:noFill/>
-            </a:ln>
-            <a:solidFill>
-              <a:srgbClr val="000000"/>
-            </a:solidFill>
-            <a:effectLst/>
-            <a:uFillTx/>
-          </a:defRPr>
-        </a:lvl5pPr>
-        <a:lvl6pPr marL="0" marR="0" indent="0" algn="l" defTabSz="914400" rtl="0" fontAlgn="auto" latinLnBrk="1" hangingPunct="0">
-          <a:lnSpc>
-            <a:spcPct val="100000"/>
-          </a:lnSpc>
-          <a:spcBef>
-            <a:spcPts val="0"/>
-          </a:spcBef>
-          <a:spcAft>
-            <a:spcPts val="0"/>
-          </a:spcAft>
-          <a:buClrTx/>
-          <a:buSzTx/>
-          <a:buFontTx/>
-          <a:buNone/>
-          <a:tabLst/>
-          <a:defRPr kumimoji="0" sz="1800" b="0" i="0" u="none" strike="noStrike" cap="none" spc="0" normalizeH="0" baseline="0">
-            <a:ln>
-              <a:noFill/>
-            </a:ln>
-            <a:solidFill>
-              <a:srgbClr val="000000"/>
-            </a:solidFill>
-            <a:effectLst/>
-            <a:uFillTx/>
-          </a:defRPr>
-        </a:lvl6pPr>
-        <a:lvl7pPr marL="0" marR="0" indent="0" algn="l" defTabSz="914400" rtl="0" fontAlgn="auto" latinLnBrk="1" hangingPunct="0">
-          <a:lnSpc>
-            <a:spcPct val="100000"/>
-          </a:lnSpc>
-          <a:spcBef>
-            <a:spcPts val="0"/>
-          </a:spcBef>
-          <a:spcAft>
-            <a:spcPts val="0"/>
-          </a:spcAft>
-          <a:buClrTx/>
-          <a:buSzTx/>
-          <a:buFontTx/>
-          <a:buNone/>
-          <a:tabLst/>
-          <a:defRPr kumimoji="0" sz="1800" b="0" i="0" u="none" strike="noStrike" cap="none" spc="0" normalizeH="0" baseline="0">
-            <a:ln>
-              <a:noFill/>
-            </a:ln>
-            <a:solidFill>
-              <a:srgbClr val="000000"/>
-            </a:solidFill>
-            <a:effectLst/>
-            <a:uFillTx/>
-          </a:defRPr>
-        </a:lvl7pPr>
-        <a:lvl8pPr marL="0" marR="0" indent="0" algn="l" defTabSz="914400" rtl="0" fontAlgn="auto" latinLnBrk="1" hangingPunct="0">
-          <a:lnSpc>
-            <a:spcPct val="100000"/>
-          </a:lnSpc>
-          <a:spcBef>
-            <a:spcPts val="0"/>
-          </a:spcBef>
-          <a:spcAft>
-            <a:spcPts val="0"/>
-          </a:spcAft>
-          <a:buClrTx/>
-          <a:buSzTx/>
-          <a:buFontTx/>
-          <a:buNone/>
-          <a:tabLst/>
-          <a:defRPr kumimoji="0" sz="1800" b="0" i="0" u="none" strike="noStrike" cap="none" spc="0" normalizeH="0" baseline="0">
-            <a:ln>
-              <a:noFill/>
-            </a:ln>
-            <a:solidFill>
-              <a:srgbClr val="000000"/>
-            </a:solidFill>
-            <a:effectLst/>
-            <a:uFillTx/>
-          </a:defRPr>
-        </a:lvl8pPr>
-        <a:lvl9pPr marL="0" marR="0" indent="0" algn="l" defTabSz="914400" rtl="0" fontAlgn="auto" latinLnBrk="1" hangingPunct="0">
-          <a:lnSpc>
-            <a:spcPct val="100000"/>
-          </a:lnSpc>
-          <a:spcBef>
-            <a:spcPts val="0"/>
-          </a:spcBef>
-          <a:spcAft>
-            <a:spcPts val="0"/>
-          </a:spcAft>
-          <a:buClrTx/>
-          <a:buSzTx/>
-          <a:buFontTx/>
-          <a:buNone/>
-          <a:tabLst/>
-          <a:defRPr kumimoji="0" sz="1800" b="0" i="0" u="none" strike="noStrike" cap="none" spc="0" normalizeH="0" baseline="0">
-            <a:ln>
-              <a:noFill/>
-            </a:ln>
-            <a:solidFill>
-              <a:srgbClr val="000000"/>
-            </a:solidFill>
-            <a:effectLst/>
-            <a:uFillTx/>
-          </a:defRPr>
-        </a:lvl9pPr>
-      </a:lstStyle>
+      <a:bodyPr/>
+      <a:lstStyle/>
       <a:style>
         <a:lnRef idx="0">
           <a:scrgbClr r="0" g="0" b="0"/>

</xml_diff>